<commit_message>
Updated the scripts and slides
</commit_message>
<xml_diff>
--- a/intermediate-r-rna-seq/Intermediate_RNA-seq.pptx
+++ b/intermediate-r-rna-seq/Intermediate_RNA-seq.pptx
@@ -5,7 +5,7 @@
     <p:sldMasterId id="2147483648" r:id="rId1"/>
   </p:sldMasterIdLst>
   <p:notesMasterIdLst>
-    <p:notesMasterId r:id="rId19"/>
+    <p:notesMasterId r:id="rId21"/>
   </p:notesMasterIdLst>
   <p:sldIdLst>
     <p:sldId id="471" r:id="rId2"/>
@@ -18,13 +18,15 @@
     <p:sldId id="615" r:id="rId9"/>
     <p:sldId id="631" r:id="rId10"/>
     <p:sldId id="633" r:id="rId11"/>
-    <p:sldId id="634" r:id="rId12"/>
-    <p:sldId id="637" r:id="rId13"/>
-    <p:sldId id="638" r:id="rId14"/>
-    <p:sldId id="639" r:id="rId15"/>
-    <p:sldId id="642" r:id="rId16"/>
-    <p:sldId id="528" r:id="rId17"/>
-    <p:sldId id="645" r:id="rId18"/>
+    <p:sldId id="646" r:id="rId12"/>
+    <p:sldId id="647" r:id="rId13"/>
+    <p:sldId id="634" r:id="rId14"/>
+    <p:sldId id="637" r:id="rId15"/>
+    <p:sldId id="638" r:id="rId16"/>
+    <p:sldId id="639" r:id="rId17"/>
+    <p:sldId id="642" r:id="rId18"/>
+    <p:sldId id="528" r:id="rId19"/>
+    <p:sldId id="645" r:id="rId20"/>
   </p:sldIdLst>
   <p:sldSz cx="12192000" cy="6858000"/>
   <p:notesSz cx="6858000" cy="9144000"/>
@@ -213,7 +215,7 @@
           <a:p>
             <a:fld id="{86774E32-DB12-6143-B5EF-64609B596D14}" type="datetimeFigureOut">
               <a:rPr lang="en-US" smtClean="0"/>
-              <a:t>3/25/20</a:t>
+              <a:t>7/19/20</a:t>
             </a:fld>
             <a:endParaRPr lang="en-US"/>
           </a:p>
@@ -970,7 +972,7 @@
           <a:p>
             <a:fld id="{12573026-7AF8-9B4C-89E3-A4FB0E5697A1}" type="slidenum">
               <a:rPr lang="en-US" smtClean="0"/>
-              <a:t>12</a:t>
+              <a:t>14</a:t>
             </a:fld>
             <a:endParaRPr lang="en-US"/>
           </a:p>
@@ -1018,182 +1020,2172 @@
         </p:nvSpPr>
         <p:spPr/>
       </p:sp>
-      <p:sp>
-        <p:nvSpPr>
-          <p:cNvPr id="3" name="Notes Placeholder 2"/>
-          <p:cNvSpPr>
-            <a:spLocks noGrp="1"/>
-          </p:cNvSpPr>
-          <p:nvPr>
-            <p:ph type="body" idx="1"/>
-          </p:nvPr>
-        </p:nvSpPr>
-        <p:spPr/>
-        <p:txBody>
-          <a:bodyPr/>
-          <a:lstStyle/>
-          <a:p>
-            <a:r>
-              <a:rPr lang="en-US" sz="1200" b="0" i="0" u="none" strike="noStrike" kern="1200" dirty="0">
-                <a:solidFill>
-                  <a:schemeClr val="tx1"/>
-                </a:solidFill>
-                <a:effectLst/>
-                <a:latin typeface="+mn-lt"/>
-                <a:ea typeface="+mn-ea"/>
-                <a:cs typeface="+mn-cs"/>
-              </a:rPr>
-              <a:t>Anders, S, Huber, W (2010). Differential expression analysis for sequence count data. </a:t>
-            </a:r>
-            <a:r>
-              <a:rPr lang="en-US" sz="1200" b="0" i="1" u="none" strike="noStrike" kern="1200" dirty="0">
-                <a:solidFill>
-                  <a:schemeClr val="tx1"/>
-                </a:solidFill>
-                <a:effectLst/>
-                <a:latin typeface="+mn-lt"/>
-                <a:ea typeface="+mn-ea"/>
-                <a:cs typeface="+mn-cs"/>
-              </a:rPr>
-              <a:t>Genome Biology</a:t>
-            </a:r>
-            <a:r>
-              <a:rPr lang="en-US" sz="1200" b="0" i="0" u="none" strike="noStrike" kern="1200" dirty="0">
-                <a:solidFill>
-                  <a:schemeClr val="tx1"/>
-                </a:solidFill>
-                <a:effectLst/>
-                <a:latin typeface="+mn-lt"/>
-                <a:ea typeface="+mn-ea"/>
-                <a:cs typeface="+mn-cs"/>
-              </a:rPr>
-              <a:t> 11, R106.</a:t>
-            </a:r>
-          </a:p>
-          <a:p>
-            <a:endParaRPr lang="en-US" sz="1200" b="0" i="0" u="none" strike="noStrike" kern="1200" dirty="0">
-              <a:solidFill>
-                <a:schemeClr val="tx1"/>
-              </a:solidFill>
-              <a:effectLst/>
-              <a:latin typeface="+mn-lt"/>
-              <a:ea typeface="+mn-ea"/>
-              <a:cs typeface="+mn-cs"/>
-            </a:endParaRPr>
-          </a:p>
-          <a:p>
-            <a:r>
-              <a:rPr lang="en-US" sz="1200" b="0" i="0" u="none" strike="noStrike" kern="1200" dirty="0">
-                <a:solidFill>
-                  <a:schemeClr val="tx1"/>
-                </a:solidFill>
-                <a:effectLst/>
-                <a:latin typeface="+mn-lt"/>
-                <a:ea typeface="+mn-ea"/>
-                <a:cs typeface="+mn-cs"/>
-              </a:rPr>
-              <a:t>Bullard JH, </a:t>
-            </a:r>
-            <a:r>
-              <a:rPr lang="en-US" sz="1200" b="0" i="0" u="none" strike="noStrike" kern="1200" dirty="0" err="1">
-                <a:solidFill>
-                  <a:schemeClr val="tx1"/>
-                </a:solidFill>
-                <a:effectLst/>
-                <a:latin typeface="+mn-lt"/>
-                <a:ea typeface="+mn-ea"/>
-                <a:cs typeface="+mn-cs"/>
-              </a:rPr>
-              <a:t>Purdom</a:t>
-            </a:r>
-            <a:r>
-              <a:rPr lang="en-US" sz="1200" b="0" i="0" u="none" strike="noStrike" kern="1200" dirty="0">
-                <a:solidFill>
-                  <a:schemeClr val="tx1"/>
-                </a:solidFill>
-                <a:effectLst/>
-                <a:latin typeface="+mn-lt"/>
-                <a:ea typeface="+mn-ea"/>
-                <a:cs typeface="+mn-cs"/>
-              </a:rPr>
-              <a:t> E, Hansen KD, </a:t>
-            </a:r>
-            <a:r>
-              <a:rPr lang="en-US" sz="1200" b="0" i="0" u="none" strike="noStrike" kern="1200" dirty="0" err="1">
-                <a:solidFill>
-                  <a:schemeClr val="tx1"/>
-                </a:solidFill>
-                <a:effectLst/>
-                <a:latin typeface="+mn-lt"/>
-                <a:ea typeface="+mn-ea"/>
-                <a:cs typeface="+mn-cs"/>
-              </a:rPr>
-              <a:t>Dudoit</a:t>
-            </a:r>
-            <a:r>
-              <a:rPr lang="en-US" sz="1200" b="0" i="0" u="none" strike="noStrike" kern="1200" dirty="0">
-                <a:solidFill>
-                  <a:schemeClr val="tx1"/>
-                </a:solidFill>
-                <a:effectLst/>
-                <a:latin typeface="+mn-lt"/>
-                <a:ea typeface="+mn-ea"/>
-                <a:cs typeface="+mn-cs"/>
-              </a:rPr>
-              <a:t> S. (2010) Evaluation of statistical methods for normalization and differential expression in mRNA-</a:t>
-            </a:r>
-            <a:r>
-              <a:rPr lang="en-US" sz="1200" b="0" i="0" u="none" strike="noStrike" kern="1200" dirty="0" err="1">
-                <a:solidFill>
-                  <a:schemeClr val="tx1"/>
-                </a:solidFill>
-                <a:effectLst/>
-                <a:latin typeface="+mn-lt"/>
-                <a:ea typeface="+mn-ea"/>
-                <a:cs typeface="+mn-cs"/>
-              </a:rPr>
-              <a:t>Seq</a:t>
-            </a:r>
-            <a:r>
-              <a:rPr lang="en-US" sz="1200" b="0" i="0" u="none" strike="noStrike" kern="1200" dirty="0">
-                <a:solidFill>
-                  <a:schemeClr val="tx1"/>
-                </a:solidFill>
-                <a:effectLst/>
-                <a:latin typeface="+mn-lt"/>
-                <a:ea typeface="+mn-ea"/>
-                <a:cs typeface="+mn-cs"/>
-              </a:rPr>
-              <a:t> experiments. </a:t>
-            </a:r>
-            <a:r>
-              <a:rPr lang="en-US" sz="1200" b="0" i="1" u="none" strike="noStrike" kern="1200" dirty="0">
-                <a:solidFill>
-                  <a:schemeClr val="tx1"/>
-                </a:solidFill>
-                <a:effectLst/>
-                <a:latin typeface="+mn-lt"/>
-                <a:ea typeface="+mn-ea"/>
-                <a:cs typeface="+mn-cs"/>
-              </a:rPr>
-              <a:t>BMC Bioinformatics</a:t>
-            </a:r>
-            <a:r>
-              <a:rPr lang="en-US" sz="1200" b="0" i="0" u="none" strike="noStrike" kern="1200" dirty="0">
-                <a:solidFill>
-                  <a:schemeClr val="tx1"/>
-                </a:solidFill>
-                <a:effectLst/>
-                <a:latin typeface="+mn-lt"/>
-                <a:ea typeface="+mn-ea"/>
-                <a:cs typeface="+mn-cs"/>
-              </a:rPr>
-              <a:t> 11, 94.</a:t>
-            </a:r>
-            <a:endParaRPr lang="en-US" dirty="0"/>
-          </a:p>
-        </p:txBody>
-      </p:sp>
+      <mc:AlternateContent xmlns:mc="http://schemas.openxmlformats.org/markup-compatibility/2006" xmlns:a14="http://schemas.microsoft.com/office/drawing/2010/main">
+        <mc:Choice Requires="a14">
+          <p:sp>
+            <p:nvSpPr>
+              <p:cNvPr id="3" name="Notes Placeholder 2"/>
+              <p:cNvSpPr>
+                <a:spLocks noGrp="1"/>
+              </p:cNvSpPr>
+              <p:nvPr>
+                <p:ph type="body" idx="1"/>
+              </p:nvPr>
+            </p:nvSpPr>
+            <p:spPr/>
+            <p:txBody>
+              <a:bodyPr/>
+              <a:lstStyle/>
+              <a:p>
+                <a:r>
+                  <a:rPr lang="en-US" sz="2000" dirty="0"/>
+                  <a:t>To see how the weights are calculated:</a:t>
+                </a:r>
+              </a:p>
+              <a:p>
+                <a:endParaRPr lang="en-US" sz="2000" dirty="0"/>
+              </a:p>
+              <a:p>
+                <a:pPr marL="457200" indent="-457200">
+                  <a:buAutoNum type="arabicPeriod"/>
+                </a:pPr>
+                <a14:m>
+                  <m:oMath xmlns:m="http://schemas.openxmlformats.org/officeDocument/2006/math">
+                    <m:r>
+                      <a:rPr lang="en-US" sz="2000" b="0" i="1" smtClean="0">
+                        <a:latin typeface="Cambria Math" panose="02040503050406030204" pitchFamily="18" charset="0"/>
+                      </a:rPr>
+                      <m:t>𝑀</m:t>
+                    </m:r>
+                    <m:r>
+                      <a:rPr lang="en-US" sz="2000" b="0" i="1" smtClean="0">
+                        <a:latin typeface="Cambria Math" panose="02040503050406030204" pitchFamily="18" charset="0"/>
+                      </a:rPr>
+                      <m:t>=</m:t>
+                    </m:r>
+                    <m:func>
+                      <m:funcPr>
+                        <m:ctrlPr>
+                          <a:rPr lang="en-US" sz="2000" b="0" i="1" smtClean="0">
+                            <a:latin typeface="Cambria Math" panose="02040503050406030204" pitchFamily="18" charset="0"/>
+                          </a:rPr>
+                        </m:ctrlPr>
+                      </m:funcPr>
+                      <m:fName>
+                        <m:sSub>
+                          <m:sSubPr>
+                            <m:ctrlPr>
+                              <a:rPr lang="en-US" sz="2000" b="0" i="1" smtClean="0">
+                                <a:latin typeface="Cambria Math" panose="02040503050406030204" pitchFamily="18" charset="0"/>
+                              </a:rPr>
+                            </m:ctrlPr>
+                          </m:sSubPr>
+                          <m:e>
+                            <m:r>
+                              <m:rPr>
+                                <m:sty m:val="p"/>
+                              </m:rPr>
+                              <a:rPr lang="en-US" sz="2000" b="0" i="0" smtClean="0">
+                                <a:latin typeface="Cambria Math" panose="02040503050406030204" pitchFamily="18" charset="0"/>
+                              </a:rPr>
+                              <m:t>log</m:t>
+                            </m:r>
+                          </m:e>
+                          <m:sub>
+                            <m:r>
+                              <a:rPr lang="en-US" sz="2000" b="0" i="1" smtClean="0">
+                                <a:latin typeface="Cambria Math" panose="02040503050406030204" pitchFamily="18" charset="0"/>
+                              </a:rPr>
+                              <m:t>2</m:t>
+                            </m:r>
+                          </m:sub>
+                        </m:sSub>
+                      </m:fName>
+                      <m:e>
+                        <m:d>
+                          <m:dPr>
+                            <m:ctrlPr>
+                              <a:rPr lang="en-US" sz="2000" b="0" i="1" smtClean="0">
+                                <a:latin typeface="Cambria Math" panose="02040503050406030204" pitchFamily="18" charset="0"/>
+                              </a:rPr>
+                            </m:ctrlPr>
+                          </m:dPr>
+                          <m:e>
+                            <m:f>
+                              <m:fPr>
+                                <m:ctrlPr>
+                                  <a:rPr lang="en-US" sz="2000" b="0" i="1" smtClean="0">
+                                    <a:latin typeface="Cambria Math" panose="02040503050406030204" pitchFamily="18" charset="0"/>
+                                  </a:rPr>
+                                </m:ctrlPr>
+                              </m:fPr>
+                              <m:num>
+                                <m:sSub>
+                                  <m:sSubPr>
+                                    <m:ctrlPr>
+                                      <a:rPr lang="en-US" sz="2000" b="0" i="1" smtClean="0">
+                                        <a:latin typeface="Cambria Math" panose="02040503050406030204" pitchFamily="18" charset="0"/>
+                                      </a:rPr>
+                                    </m:ctrlPr>
+                                  </m:sSubPr>
+                                  <m:e>
+                                    <m:r>
+                                      <a:rPr lang="en-US" sz="2000" b="0" i="1" smtClean="0">
+                                        <a:latin typeface="Cambria Math" panose="02040503050406030204" pitchFamily="18" charset="0"/>
+                                      </a:rPr>
+                                      <m:t>𝑋</m:t>
+                                    </m:r>
+                                  </m:e>
+                                  <m:sub>
+                                    <m:r>
+                                      <a:rPr lang="en-US" sz="2000" b="0" i="1" smtClean="0">
+                                        <a:latin typeface="Cambria Math" panose="02040503050406030204" pitchFamily="18" charset="0"/>
+                                      </a:rPr>
+                                      <m:t>2</m:t>
+                                    </m:r>
+                                  </m:sub>
+                                </m:sSub>
+                              </m:num>
+                              <m:den>
+                                <m:sSub>
+                                  <m:sSubPr>
+                                    <m:ctrlPr>
+                                      <a:rPr lang="en-US" sz="2000" b="0" i="1" smtClean="0">
+                                        <a:latin typeface="Cambria Math" panose="02040503050406030204" pitchFamily="18" charset="0"/>
+                                      </a:rPr>
+                                    </m:ctrlPr>
+                                  </m:sSubPr>
+                                  <m:e>
+                                    <m:r>
+                                      <a:rPr lang="en-US" sz="2000" b="0" i="1" smtClean="0">
+                                        <a:latin typeface="Cambria Math" panose="02040503050406030204" pitchFamily="18" charset="0"/>
+                                      </a:rPr>
+                                      <m:t>𝑁</m:t>
+                                    </m:r>
+                                  </m:e>
+                                  <m:sub>
+                                    <m:r>
+                                      <a:rPr lang="en-US" sz="2000" b="0" i="1" smtClean="0">
+                                        <a:latin typeface="Cambria Math" panose="02040503050406030204" pitchFamily="18" charset="0"/>
+                                      </a:rPr>
+                                      <m:t>2</m:t>
+                                    </m:r>
+                                  </m:sub>
+                                </m:sSub>
+                              </m:den>
+                            </m:f>
+                          </m:e>
+                        </m:d>
+                      </m:e>
+                    </m:func>
+                    <m:r>
+                      <a:rPr lang="en-US" sz="2000" b="0" i="1" smtClean="0">
+                        <a:latin typeface="Cambria Math" panose="02040503050406030204" pitchFamily="18" charset="0"/>
+                      </a:rPr>
+                      <m:t>−</m:t>
+                    </m:r>
+                    <m:func>
+                      <m:funcPr>
+                        <m:ctrlPr>
+                          <a:rPr lang="en-US" sz="2000" b="0" i="1" smtClean="0">
+                            <a:latin typeface="Cambria Math" panose="02040503050406030204" pitchFamily="18" charset="0"/>
+                          </a:rPr>
+                        </m:ctrlPr>
+                      </m:funcPr>
+                      <m:fName>
+                        <m:sSub>
+                          <m:sSubPr>
+                            <m:ctrlPr>
+                              <a:rPr lang="en-US" sz="2000" b="0" i="1" smtClean="0">
+                                <a:latin typeface="Cambria Math" panose="02040503050406030204" pitchFamily="18" charset="0"/>
+                              </a:rPr>
+                            </m:ctrlPr>
+                          </m:sSubPr>
+                          <m:e>
+                            <m:r>
+                              <m:rPr>
+                                <m:sty m:val="p"/>
+                              </m:rPr>
+                              <a:rPr lang="en-US" sz="2000" b="0" i="0" smtClean="0">
+                                <a:latin typeface="Cambria Math" panose="02040503050406030204" pitchFamily="18" charset="0"/>
+                              </a:rPr>
+                              <m:t>log</m:t>
+                            </m:r>
+                          </m:e>
+                          <m:sub>
+                            <m:r>
+                              <a:rPr lang="en-US" sz="2000" b="0" i="1" smtClean="0">
+                                <a:latin typeface="Cambria Math" panose="02040503050406030204" pitchFamily="18" charset="0"/>
+                              </a:rPr>
+                              <m:t>2</m:t>
+                            </m:r>
+                          </m:sub>
+                        </m:sSub>
+                      </m:fName>
+                      <m:e>
+                        <m:d>
+                          <m:dPr>
+                            <m:ctrlPr>
+                              <a:rPr lang="en-US" sz="2000" b="0" i="1" smtClean="0">
+                                <a:latin typeface="Cambria Math" panose="02040503050406030204" pitchFamily="18" charset="0"/>
+                              </a:rPr>
+                            </m:ctrlPr>
+                          </m:dPr>
+                          <m:e>
+                            <m:f>
+                              <m:fPr>
+                                <m:ctrlPr>
+                                  <a:rPr lang="en-US" sz="2000" b="0" i="1" smtClean="0">
+                                    <a:latin typeface="Cambria Math" panose="02040503050406030204" pitchFamily="18" charset="0"/>
+                                  </a:rPr>
+                                </m:ctrlPr>
+                              </m:fPr>
+                              <m:num>
+                                <m:sSub>
+                                  <m:sSubPr>
+                                    <m:ctrlPr>
+                                      <a:rPr lang="en-US" sz="2000" b="0" i="1" smtClean="0">
+                                        <a:latin typeface="Cambria Math" panose="02040503050406030204" pitchFamily="18" charset="0"/>
+                                      </a:rPr>
+                                    </m:ctrlPr>
+                                  </m:sSubPr>
+                                  <m:e>
+                                    <m:r>
+                                      <a:rPr lang="en-US" sz="2000" b="0" i="1" smtClean="0">
+                                        <a:latin typeface="Cambria Math" panose="02040503050406030204" pitchFamily="18" charset="0"/>
+                                      </a:rPr>
+                                      <m:t>𝑋</m:t>
+                                    </m:r>
+                                  </m:e>
+                                  <m:sub>
+                                    <m:r>
+                                      <a:rPr lang="en-US" sz="2000" b="0" i="1" smtClean="0">
+                                        <a:latin typeface="Cambria Math" panose="02040503050406030204" pitchFamily="18" charset="0"/>
+                                      </a:rPr>
+                                      <m:t>𝑟𝑒𝑓</m:t>
+                                    </m:r>
+                                  </m:sub>
+                                </m:sSub>
+                              </m:num>
+                              <m:den>
+                                <m:sSub>
+                                  <m:sSubPr>
+                                    <m:ctrlPr>
+                                      <a:rPr lang="en-US" sz="2000" b="0" i="1" smtClean="0">
+                                        <a:latin typeface="Cambria Math" panose="02040503050406030204" pitchFamily="18" charset="0"/>
+                                      </a:rPr>
+                                    </m:ctrlPr>
+                                  </m:sSubPr>
+                                  <m:e>
+                                    <m:r>
+                                      <a:rPr lang="en-US" sz="2000" b="0" i="1" smtClean="0">
+                                        <a:latin typeface="Cambria Math" panose="02040503050406030204" pitchFamily="18" charset="0"/>
+                                      </a:rPr>
+                                      <m:t>𝑁</m:t>
+                                    </m:r>
+                                  </m:e>
+                                  <m:sub>
+                                    <m:r>
+                                      <a:rPr lang="en-US" sz="2000" b="0" i="1" smtClean="0">
+                                        <a:latin typeface="Cambria Math" panose="02040503050406030204" pitchFamily="18" charset="0"/>
+                                      </a:rPr>
+                                      <m:t>𝑟𝑒𝑓</m:t>
+                                    </m:r>
+                                  </m:sub>
+                                </m:sSub>
+                              </m:den>
+                            </m:f>
+                          </m:e>
+                        </m:d>
+                      </m:e>
+                    </m:func>
+                  </m:oMath>
+                </a14:m>
+                <a:endParaRPr lang="en-US" sz="2000" dirty="0"/>
+              </a:p>
+              <a:p>
+                <a:pPr marL="457200" indent="-457200">
+                  <a:buAutoNum type="arabicPeriod"/>
+                </a:pPr>
+                <a14:m>
+                  <m:oMath xmlns:m="http://schemas.openxmlformats.org/officeDocument/2006/math">
+                    <m:r>
+                      <a:rPr lang="en-US" sz="2000" b="0" i="1" smtClean="0">
+                        <a:latin typeface="Cambria Math" panose="02040503050406030204" pitchFamily="18" charset="0"/>
+                        <a:ea typeface="Cambria Math" panose="02040503050406030204" pitchFamily="18" charset="0"/>
+                      </a:rPr>
+                      <m:t>⇒</m:t>
+                    </m:r>
+                    <m:r>
+                      <a:rPr lang="en-US" sz="2000" b="0" i="1" smtClean="0">
+                        <a:latin typeface="Cambria Math" panose="02040503050406030204" pitchFamily="18" charset="0"/>
+                      </a:rPr>
+                      <m:t>𝑉𝑎𝑟</m:t>
+                    </m:r>
+                    <m:d>
+                      <m:dPr>
+                        <m:ctrlPr>
+                          <a:rPr lang="en-US" sz="2000" b="0" i="1" smtClean="0">
+                            <a:latin typeface="Cambria Math" panose="02040503050406030204" pitchFamily="18" charset="0"/>
+                          </a:rPr>
+                        </m:ctrlPr>
+                      </m:dPr>
+                      <m:e>
+                        <m:r>
+                          <a:rPr lang="en-US" sz="2000" b="0" i="1" smtClean="0">
+                            <a:latin typeface="Cambria Math" panose="02040503050406030204" pitchFamily="18" charset="0"/>
+                          </a:rPr>
+                          <m:t>𝑀</m:t>
+                        </m:r>
+                      </m:e>
+                    </m:d>
+                    <m:r>
+                      <a:rPr lang="en-US" sz="2000" b="0" i="1" smtClean="0">
+                        <a:latin typeface="Cambria Math" panose="02040503050406030204" pitchFamily="18" charset="0"/>
+                      </a:rPr>
+                      <m:t>=</m:t>
+                    </m:r>
+                    <m:r>
+                      <a:rPr lang="en-US" sz="2000" b="0" i="1" smtClean="0">
+                        <a:latin typeface="Cambria Math" panose="02040503050406030204" pitchFamily="18" charset="0"/>
+                      </a:rPr>
+                      <m:t>𝑉𝑎</m:t>
+                    </m:r>
+                    <m:sSub>
+                      <m:sSubPr>
+                        <m:ctrlPr>
+                          <a:rPr lang="en-US" sz="2000" b="0" i="1" smtClean="0">
+                            <a:latin typeface="Cambria Math" panose="02040503050406030204" pitchFamily="18" charset="0"/>
+                          </a:rPr>
+                        </m:ctrlPr>
+                      </m:sSubPr>
+                      <m:e>
+                        <m:r>
+                          <a:rPr lang="en-US" sz="2000" b="0" i="1" smtClean="0">
+                            <a:latin typeface="Cambria Math" panose="02040503050406030204" pitchFamily="18" charset="0"/>
+                          </a:rPr>
+                          <m:t>𝑟</m:t>
+                        </m:r>
+                      </m:e>
+                      <m:sub>
+                        <m:r>
+                          <a:rPr lang="en-US" sz="2000" b="0" i="1" smtClean="0">
+                            <a:latin typeface="Cambria Math" panose="02040503050406030204" pitchFamily="18" charset="0"/>
+                          </a:rPr>
+                          <m:t>2</m:t>
+                        </m:r>
+                      </m:sub>
+                    </m:sSub>
+                    <m:r>
+                      <a:rPr lang="en-US" sz="2000" b="0" i="1" smtClean="0">
+                        <a:latin typeface="Cambria Math" panose="02040503050406030204" pitchFamily="18" charset="0"/>
+                      </a:rPr>
+                      <m:t>+</m:t>
+                    </m:r>
+                    <m:r>
+                      <a:rPr lang="en-US" sz="2000" b="0" i="1" smtClean="0">
+                        <a:latin typeface="Cambria Math" panose="02040503050406030204" pitchFamily="18" charset="0"/>
+                      </a:rPr>
+                      <m:t>𝑉𝑎</m:t>
+                    </m:r>
+                    <m:sSub>
+                      <m:sSubPr>
+                        <m:ctrlPr>
+                          <a:rPr lang="en-US" sz="2000" b="0" i="1" smtClean="0">
+                            <a:latin typeface="Cambria Math" panose="02040503050406030204" pitchFamily="18" charset="0"/>
+                          </a:rPr>
+                        </m:ctrlPr>
+                      </m:sSubPr>
+                      <m:e>
+                        <m:r>
+                          <a:rPr lang="en-US" sz="2000" b="0" i="1" smtClean="0">
+                            <a:latin typeface="Cambria Math" panose="02040503050406030204" pitchFamily="18" charset="0"/>
+                          </a:rPr>
+                          <m:t>𝑟</m:t>
+                        </m:r>
+                      </m:e>
+                      <m:sub>
+                        <m:r>
+                          <a:rPr lang="en-US" sz="2000" b="0" i="1" smtClean="0">
+                            <a:latin typeface="Cambria Math" panose="02040503050406030204" pitchFamily="18" charset="0"/>
+                          </a:rPr>
+                          <m:t>𝑟𝑒𝑓</m:t>
+                        </m:r>
+                      </m:sub>
+                    </m:sSub>
+                    <m:r>
+                      <a:rPr lang="en-US" sz="2000" b="0" i="1" smtClean="0">
+                        <a:latin typeface="Cambria Math" panose="02040503050406030204" pitchFamily="18" charset="0"/>
+                      </a:rPr>
+                      <m:t>,              </m:t>
+                    </m:r>
+                  </m:oMath>
+                </a14:m>
+                <a:r>
+                  <a:rPr lang="en-US" sz="2000" dirty="0"/>
+                  <a:t>where     </a:t>
+                </a:r>
+                <a14:m>
+                  <m:oMath xmlns:m="http://schemas.openxmlformats.org/officeDocument/2006/math">
+                    <m:r>
+                      <a:rPr lang="en-US" sz="2000" b="0" i="1" smtClean="0">
+                        <a:latin typeface="Cambria Math" panose="02040503050406030204" pitchFamily="18" charset="0"/>
+                      </a:rPr>
+                      <m:t>𝑉𝑎</m:t>
+                    </m:r>
+                    <m:sSub>
+                      <m:sSubPr>
+                        <m:ctrlPr>
+                          <a:rPr lang="en-US" sz="2000" b="0" i="1" smtClean="0">
+                            <a:latin typeface="Cambria Math" panose="02040503050406030204" pitchFamily="18" charset="0"/>
+                          </a:rPr>
+                        </m:ctrlPr>
+                      </m:sSubPr>
+                      <m:e>
+                        <m:r>
+                          <a:rPr lang="en-US" sz="2000" b="0" i="1" smtClean="0">
+                            <a:latin typeface="Cambria Math" panose="02040503050406030204" pitchFamily="18" charset="0"/>
+                          </a:rPr>
+                          <m:t>𝑟</m:t>
+                        </m:r>
+                      </m:e>
+                      <m:sub>
+                        <m:r>
+                          <a:rPr lang="en-US" sz="2000" b="0" i="1" smtClean="0">
+                            <a:latin typeface="Cambria Math" panose="02040503050406030204" pitchFamily="18" charset="0"/>
+                          </a:rPr>
+                          <m:t>𝑟𝑒𝑓</m:t>
+                        </m:r>
+                      </m:sub>
+                    </m:sSub>
+                    <m:r>
+                      <a:rPr lang="en-US" sz="2000" b="0" i="1" smtClean="0">
+                        <a:latin typeface="Cambria Math" panose="02040503050406030204" pitchFamily="18" charset="0"/>
+                      </a:rPr>
+                      <m:t>=</m:t>
+                    </m:r>
+                    <m:r>
+                      <a:rPr lang="en-US" sz="2000" b="0" i="1" smtClean="0">
+                        <a:latin typeface="Cambria Math" panose="02040503050406030204" pitchFamily="18" charset="0"/>
+                      </a:rPr>
+                      <m:t>𝑉𝑎𝑟</m:t>
+                    </m:r>
+                    <m:d>
+                      <m:dPr>
+                        <m:ctrlPr>
+                          <a:rPr lang="en-US" sz="2000" b="0" i="1" smtClean="0">
+                            <a:latin typeface="Cambria Math" panose="02040503050406030204" pitchFamily="18" charset="0"/>
+                          </a:rPr>
+                        </m:ctrlPr>
+                      </m:dPr>
+                      <m:e>
+                        <m:func>
+                          <m:funcPr>
+                            <m:ctrlPr>
+                              <a:rPr lang="en-US" sz="2000" b="0" i="1" smtClean="0">
+                                <a:latin typeface="Cambria Math" panose="02040503050406030204" pitchFamily="18" charset="0"/>
+                              </a:rPr>
+                            </m:ctrlPr>
+                          </m:funcPr>
+                          <m:fName>
+                            <m:sSub>
+                              <m:sSubPr>
+                                <m:ctrlPr>
+                                  <a:rPr lang="en-US" sz="2000" b="0" i="1" smtClean="0">
+                                    <a:latin typeface="Cambria Math" panose="02040503050406030204" pitchFamily="18" charset="0"/>
+                                  </a:rPr>
+                                </m:ctrlPr>
+                              </m:sSubPr>
+                              <m:e>
+                                <m:r>
+                                  <m:rPr>
+                                    <m:sty m:val="p"/>
+                                  </m:rPr>
+                                  <a:rPr lang="en-US" sz="2000" b="0" i="0" smtClean="0">
+                                    <a:latin typeface="Cambria Math" panose="02040503050406030204" pitchFamily="18" charset="0"/>
+                                  </a:rPr>
+                                  <m:t>log</m:t>
+                                </m:r>
+                              </m:e>
+                              <m:sub>
+                                <m:r>
+                                  <a:rPr lang="en-US" sz="2000" b="0" i="1" smtClean="0">
+                                    <a:latin typeface="Cambria Math" panose="02040503050406030204" pitchFamily="18" charset="0"/>
+                                  </a:rPr>
+                                  <m:t>2</m:t>
+                                </m:r>
+                              </m:sub>
+                            </m:sSub>
+                          </m:fName>
+                          <m:e>
+                            <m:d>
+                              <m:dPr>
+                                <m:ctrlPr>
+                                  <a:rPr lang="en-US" sz="2000" b="0" i="1" smtClean="0">
+                                    <a:latin typeface="Cambria Math" panose="02040503050406030204" pitchFamily="18" charset="0"/>
+                                  </a:rPr>
+                                </m:ctrlPr>
+                              </m:dPr>
+                              <m:e>
+                                <m:f>
+                                  <m:fPr>
+                                    <m:ctrlPr>
+                                      <a:rPr lang="en-US" sz="2000" b="0" i="1" smtClean="0">
+                                        <a:latin typeface="Cambria Math" panose="02040503050406030204" pitchFamily="18" charset="0"/>
+                                      </a:rPr>
+                                    </m:ctrlPr>
+                                  </m:fPr>
+                                  <m:num>
+                                    <m:sSub>
+                                      <m:sSubPr>
+                                        <m:ctrlPr>
+                                          <a:rPr lang="en-US" sz="2000" b="0" i="1" smtClean="0">
+                                            <a:latin typeface="Cambria Math" panose="02040503050406030204" pitchFamily="18" charset="0"/>
+                                          </a:rPr>
+                                        </m:ctrlPr>
+                                      </m:sSubPr>
+                                      <m:e>
+                                        <m:r>
+                                          <a:rPr lang="en-US" sz="2000" b="0" i="1" smtClean="0">
+                                            <a:latin typeface="Cambria Math" panose="02040503050406030204" pitchFamily="18" charset="0"/>
+                                          </a:rPr>
+                                          <m:t>𝑋</m:t>
+                                        </m:r>
+                                      </m:e>
+                                      <m:sub>
+                                        <m:r>
+                                          <a:rPr lang="en-US" sz="2000" b="0" i="1" smtClean="0">
+                                            <a:latin typeface="Cambria Math" panose="02040503050406030204" pitchFamily="18" charset="0"/>
+                                          </a:rPr>
+                                          <m:t>𝑟𝑒𝑓</m:t>
+                                        </m:r>
+                                      </m:sub>
+                                    </m:sSub>
+                                  </m:num>
+                                  <m:den>
+                                    <m:sSub>
+                                      <m:sSubPr>
+                                        <m:ctrlPr>
+                                          <a:rPr lang="en-US" sz="2000" b="0" i="1" smtClean="0">
+                                            <a:latin typeface="Cambria Math" panose="02040503050406030204" pitchFamily="18" charset="0"/>
+                                          </a:rPr>
+                                        </m:ctrlPr>
+                                      </m:sSubPr>
+                                      <m:e>
+                                        <m:r>
+                                          <a:rPr lang="en-US" sz="2000" b="0" i="1" smtClean="0">
+                                            <a:latin typeface="Cambria Math" panose="02040503050406030204" pitchFamily="18" charset="0"/>
+                                          </a:rPr>
+                                          <m:t>𝑁</m:t>
+                                        </m:r>
+                                      </m:e>
+                                      <m:sub>
+                                        <m:r>
+                                          <a:rPr lang="en-US" sz="2000" b="0" i="1" smtClean="0">
+                                            <a:latin typeface="Cambria Math" panose="02040503050406030204" pitchFamily="18" charset="0"/>
+                                          </a:rPr>
+                                          <m:t>𝑟𝑒𝑓</m:t>
+                                        </m:r>
+                                      </m:sub>
+                                    </m:sSub>
+                                  </m:den>
+                                </m:f>
+                              </m:e>
+                            </m:d>
+                          </m:e>
+                        </m:func>
+                      </m:e>
+                    </m:d>
+                  </m:oMath>
+                </a14:m>
+                <a:endParaRPr lang="en-US" sz="2000" b="0" dirty="0"/>
+              </a:p>
+              <a:p>
+                <a:pPr marL="2743200" lvl="6" indent="0">
+                  <a:buNone/>
+                </a:pPr>
+                <a:r>
+                  <a:rPr lang="en-US" sz="2000" b="0" dirty="0"/>
+                  <a:t>   </a:t>
+                </a:r>
+                <a:r>
+                  <a:rPr lang="en-US" sz="2000" dirty="0"/>
+                  <a:t>and	</a:t>
+                </a:r>
+                <a14:m>
+                  <m:oMath xmlns:m="http://schemas.openxmlformats.org/officeDocument/2006/math">
+                    <m:r>
+                      <a:rPr lang="en-US" sz="2000" b="0" i="1" smtClean="0">
+                        <a:latin typeface="Cambria Math" panose="02040503050406030204" pitchFamily="18" charset="0"/>
+                      </a:rPr>
+                      <m:t>𝑉𝑎</m:t>
+                    </m:r>
+                    <m:sSub>
+                      <m:sSubPr>
+                        <m:ctrlPr>
+                          <a:rPr lang="en-US" sz="2000" b="0" i="1" smtClean="0">
+                            <a:latin typeface="Cambria Math" panose="02040503050406030204" pitchFamily="18" charset="0"/>
+                          </a:rPr>
+                        </m:ctrlPr>
+                      </m:sSubPr>
+                      <m:e>
+                        <m:r>
+                          <a:rPr lang="en-US" sz="2000" b="0" i="1" smtClean="0">
+                            <a:latin typeface="Cambria Math" panose="02040503050406030204" pitchFamily="18" charset="0"/>
+                          </a:rPr>
+                          <m:t>𝑟</m:t>
+                        </m:r>
+                      </m:e>
+                      <m:sub>
+                        <m:r>
+                          <a:rPr lang="en-US" sz="2000" b="0" i="1" smtClean="0">
+                            <a:latin typeface="Cambria Math" panose="02040503050406030204" pitchFamily="18" charset="0"/>
+                          </a:rPr>
+                          <m:t>2</m:t>
+                        </m:r>
+                      </m:sub>
+                    </m:sSub>
+                    <m:r>
+                      <a:rPr lang="en-US" sz="2000" b="0" i="1" smtClean="0">
+                        <a:latin typeface="Cambria Math" panose="02040503050406030204" pitchFamily="18" charset="0"/>
+                      </a:rPr>
+                      <m:t>=</m:t>
+                    </m:r>
+                    <m:r>
+                      <a:rPr lang="en-US" sz="2000" b="0" i="1" smtClean="0">
+                        <a:latin typeface="Cambria Math" panose="02040503050406030204" pitchFamily="18" charset="0"/>
+                      </a:rPr>
+                      <m:t>𝑉𝑎𝑟</m:t>
+                    </m:r>
+                    <m:d>
+                      <m:dPr>
+                        <m:ctrlPr>
+                          <a:rPr lang="en-US" sz="2000" b="0" i="1" smtClean="0">
+                            <a:latin typeface="Cambria Math" panose="02040503050406030204" pitchFamily="18" charset="0"/>
+                          </a:rPr>
+                        </m:ctrlPr>
+                      </m:dPr>
+                      <m:e>
+                        <m:func>
+                          <m:funcPr>
+                            <m:ctrlPr>
+                              <a:rPr lang="en-US" sz="2000" b="0" i="1" smtClean="0">
+                                <a:latin typeface="Cambria Math" panose="02040503050406030204" pitchFamily="18" charset="0"/>
+                              </a:rPr>
+                            </m:ctrlPr>
+                          </m:funcPr>
+                          <m:fName>
+                            <m:sSub>
+                              <m:sSubPr>
+                                <m:ctrlPr>
+                                  <a:rPr lang="en-US" sz="2000" b="0" i="1" smtClean="0">
+                                    <a:latin typeface="Cambria Math" panose="02040503050406030204" pitchFamily="18" charset="0"/>
+                                  </a:rPr>
+                                </m:ctrlPr>
+                              </m:sSubPr>
+                              <m:e>
+                                <m:r>
+                                  <m:rPr>
+                                    <m:sty m:val="p"/>
+                                  </m:rPr>
+                                  <a:rPr lang="en-US" sz="2000" b="0" i="0" smtClean="0">
+                                    <a:latin typeface="Cambria Math" panose="02040503050406030204" pitchFamily="18" charset="0"/>
+                                  </a:rPr>
+                                  <m:t>log</m:t>
+                                </m:r>
+                              </m:e>
+                              <m:sub>
+                                <m:r>
+                                  <a:rPr lang="en-US" sz="2000" b="0" i="1" smtClean="0">
+                                    <a:latin typeface="Cambria Math" panose="02040503050406030204" pitchFamily="18" charset="0"/>
+                                  </a:rPr>
+                                  <m:t>2</m:t>
+                                </m:r>
+                              </m:sub>
+                            </m:sSub>
+                          </m:fName>
+                          <m:e>
+                            <m:d>
+                              <m:dPr>
+                                <m:ctrlPr>
+                                  <a:rPr lang="en-US" sz="2000" b="0" i="1" smtClean="0">
+                                    <a:latin typeface="Cambria Math" panose="02040503050406030204" pitchFamily="18" charset="0"/>
+                                  </a:rPr>
+                                </m:ctrlPr>
+                              </m:dPr>
+                              <m:e>
+                                <m:f>
+                                  <m:fPr>
+                                    <m:ctrlPr>
+                                      <a:rPr lang="en-US" sz="2000" b="0" i="1" smtClean="0">
+                                        <a:latin typeface="Cambria Math" panose="02040503050406030204" pitchFamily="18" charset="0"/>
+                                      </a:rPr>
+                                    </m:ctrlPr>
+                                  </m:fPr>
+                                  <m:num>
+                                    <m:sSub>
+                                      <m:sSubPr>
+                                        <m:ctrlPr>
+                                          <a:rPr lang="en-US" sz="2000" b="0" i="1" smtClean="0">
+                                            <a:latin typeface="Cambria Math" panose="02040503050406030204" pitchFamily="18" charset="0"/>
+                                          </a:rPr>
+                                        </m:ctrlPr>
+                                      </m:sSubPr>
+                                      <m:e>
+                                        <m:r>
+                                          <a:rPr lang="en-US" sz="2000" b="0" i="1" smtClean="0">
+                                            <a:latin typeface="Cambria Math" panose="02040503050406030204" pitchFamily="18" charset="0"/>
+                                          </a:rPr>
+                                          <m:t>𝑋</m:t>
+                                        </m:r>
+                                      </m:e>
+                                      <m:sub>
+                                        <m:r>
+                                          <a:rPr lang="en-US" sz="2000" b="0" i="1" smtClean="0">
+                                            <a:latin typeface="Cambria Math" panose="02040503050406030204" pitchFamily="18" charset="0"/>
+                                          </a:rPr>
+                                          <m:t>2</m:t>
+                                        </m:r>
+                                      </m:sub>
+                                    </m:sSub>
+                                  </m:num>
+                                  <m:den>
+                                    <m:sSub>
+                                      <m:sSubPr>
+                                        <m:ctrlPr>
+                                          <a:rPr lang="en-US" sz="2000" b="0" i="1" smtClean="0">
+                                            <a:latin typeface="Cambria Math" panose="02040503050406030204" pitchFamily="18" charset="0"/>
+                                          </a:rPr>
+                                        </m:ctrlPr>
+                                      </m:sSubPr>
+                                      <m:e>
+                                        <m:r>
+                                          <a:rPr lang="en-US" sz="2000" b="0" i="1" smtClean="0">
+                                            <a:latin typeface="Cambria Math" panose="02040503050406030204" pitchFamily="18" charset="0"/>
+                                          </a:rPr>
+                                          <m:t>𝑁</m:t>
+                                        </m:r>
+                                      </m:e>
+                                      <m:sub>
+                                        <m:r>
+                                          <a:rPr lang="en-US" sz="2000" b="0" i="1" smtClean="0">
+                                            <a:latin typeface="Cambria Math" panose="02040503050406030204" pitchFamily="18" charset="0"/>
+                                          </a:rPr>
+                                          <m:t>2</m:t>
+                                        </m:r>
+                                      </m:sub>
+                                    </m:sSub>
+                                  </m:den>
+                                </m:f>
+                              </m:e>
+                            </m:d>
+                          </m:e>
+                        </m:func>
+                      </m:e>
+                    </m:d>
+                  </m:oMath>
+                </a14:m>
+                <a:r>
+                  <a:rPr lang="en-US" sz="2000" dirty="0"/>
+                  <a:t>.</a:t>
+                </a:r>
+              </a:p>
+              <a:p>
+                <a:pPr marL="0" lvl="0" indent="0">
+                  <a:buNone/>
+                </a:pPr>
+                <a:r>
+                  <a:rPr lang="en-US" sz="2000" dirty="0"/>
+                  <a:t>Assume </a:t>
+                </a:r>
+                <a14:m>
+                  <m:oMath xmlns:m="http://schemas.openxmlformats.org/officeDocument/2006/math">
+                    <m:sSub>
+                      <m:sSubPr>
+                        <m:ctrlPr>
+                          <a:rPr lang="en-US" sz="2000" b="0" i="1" smtClean="0">
+                            <a:latin typeface="Cambria Math" panose="02040503050406030204" pitchFamily="18" charset="0"/>
+                          </a:rPr>
+                        </m:ctrlPr>
+                      </m:sSubPr>
+                      <m:e>
+                        <m:r>
+                          <a:rPr lang="en-US" sz="2000" b="0" i="1" smtClean="0">
+                            <a:latin typeface="Cambria Math" panose="02040503050406030204" pitchFamily="18" charset="0"/>
+                          </a:rPr>
+                          <m:t>𝑁</m:t>
+                        </m:r>
+                      </m:e>
+                      <m:sub>
+                        <m:r>
+                          <a:rPr lang="en-US" sz="2000" b="0" i="1" smtClean="0">
+                            <a:latin typeface="Cambria Math" panose="02040503050406030204" pitchFamily="18" charset="0"/>
+                          </a:rPr>
+                          <m:t>2</m:t>
+                        </m:r>
+                      </m:sub>
+                    </m:sSub>
+                  </m:oMath>
+                </a14:m>
+                <a:r>
+                  <a:rPr lang="en-US" sz="2000" dirty="0"/>
+                  <a:t> and </a:t>
+                </a:r>
+                <a14:m>
+                  <m:oMath xmlns:m="http://schemas.openxmlformats.org/officeDocument/2006/math">
+                    <m:sSub>
+                      <m:sSubPr>
+                        <m:ctrlPr>
+                          <a:rPr lang="en-US" sz="2000" b="0" i="1" smtClean="0">
+                            <a:latin typeface="Cambria Math" panose="02040503050406030204" pitchFamily="18" charset="0"/>
+                          </a:rPr>
+                        </m:ctrlPr>
+                      </m:sSubPr>
+                      <m:e>
+                        <m:r>
+                          <a:rPr lang="en-US" sz="2000" b="0" i="1" smtClean="0">
+                            <a:latin typeface="Cambria Math" panose="02040503050406030204" pitchFamily="18" charset="0"/>
+                          </a:rPr>
+                          <m:t>𝑁</m:t>
+                        </m:r>
+                      </m:e>
+                      <m:sub>
+                        <m:r>
+                          <a:rPr lang="en-US" sz="2000" b="0" i="1" smtClean="0">
+                            <a:latin typeface="Cambria Math" panose="02040503050406030204" pitchFamily="18" charset="0"/>
+                          </a:rPr>
+                          <m:t>𝑟𝑒𝑓</m:t>
+                        </m:r>
+                      </m:sub>
+                    </m:sSub>
+                  </m:oMath>
+                </a14:m>
+                <a:r>
+                  <a:rPr lang="en-US" sz="2000" dirty="0"/>
+                  <a:t> are constant. </a:t>
+                </a:r>
+              </a:p>
+              <a:p>
+                <a:pPr marL="0" lvl="0" indent="0">
+                  <a:buNone/>
+                </a:pPr>
+                <a:endParaRPr lang="en-US" sz="2000" dirty="0"/>
+              </a:p>
+              <a:p>
+                <a:pPr marL="0" lvl="0" indent="0">
+                  <a:buNone/>
+                </a:pPr>
+                <a14:m>
+                  <m:oMathPara xmlns:m="http://schemas.openxmlformats.org/officeDocument/2006/math">
+                    <m:oMathParaPr>
+                      <m:jc m:val="centerGroup"/>
+                    </m:oMathParaPr>
+                    <m:oMath xmlns:m="http://schemas.openxmlformats.org/officeDocument/2006/math">
+                      <m:r>
+                        <a:rPr lang="en-US" sz="2000" i="1" smtClean="0">
+                          <a:latin typeface="Cambria Math" panose="02040503050406030204" pitchFamily="18" charset="0"/>
+                          <a:ea typeface="Cambria Math" panose="02040503050406030204" pitchFamily="18" charset="0"/>
+                        </a:rPr>
+                        <m:t>⇒</m:t>
+                      </m:r>
+                      <m:r>
+                        <a:rPr lang="en-US" sz="2000" b="0" i="1" smtClean="0">
+                          <a:latin typeface="Cambria Math" panose="02040503050406030204" pitchFamily="18" charset="0"/>
+                        </a:rPr>
+                        <m:t>𝑉𝑎</m:t>
+                      </m:r>
+                      <m:sSub>
+                        <m:sSubPr>
+                          <m:ctrlPr>
+                            <a:rPr lang="en-US" sz="2000" b="0" i="1" smtClean="0">
+                              <a:latin typeface="Cambria Math" panose="02040503050406030204" pitchFamily="18" charset="0"/>
+                            </a:rPr>
+                          </m:ctrlPr>
+                        </m:sSubPr>
+                        <m:e>
+                          <m:r>
+                            <a:rPr lang="en-US" sz="2000" b="0" i="1" smtClean="0">
+                              <a:latin typeface="Cambria Math" panose="02040503050406030204" pitchFamily="18" charset="0"/>
+                            </a:rPr>
+                            <m:t>𝑟</m:t>
+                          </m:r>
+                        </m:e>
+                        <m:sub>
+                          <m:r>
+                            <a:rPr lang="en-US" sz="2000" b="0" i="1" smtClean="0">
+                              <a:latin typeface="Cambria Math" panose="02040503050406030204" pitchFamily="18" charset="0"/>
+                            </a:rPr>
+                            <m:t>2</m:t>
+                          </m:r>
+                        </m:sub>
+                      </m:sSub>
+                      <m:r>
+                        <a:rPr lang="en-US" sz="2000" b="0" i="1" smtClean="0">
+                          <a:latin typeface="Cambria Math" panose="02040503050406030204" pitchFamily="18" charset="0"/>
+                        </a:rPr>
+                        <m:t>=</m:t>
+                      </m:r>
+                      <m:r>
+                        <a:rPr lang="en-US" sz="2000" b="0" i="1" smtClean="0">
+                          <a:latin typeface="Cambria Math" panose="02040503050406030204" pitchFamily="18" charset="0"/>
+                        </a:rPr>
+                        <m:t>𝑉𝑎𝑟</m:t>
+                      </m:r>
+                      <m:d>
+                        <m:dPr>
+                          <m:ctrlPr>
+                            <a:rPr lang="en-US" sz="2000" b="0" i="1" smtClean="0">
+                              <a:latin typeface="Cambria Math" panose="02040503050406030204" pitchFamily="18" charset="0"/>
+                            </a:rPr>
+                          </m:ctrlPr>
+                        </m:dPr>
+                        <m:e>
+                          <m:func>
+                            <m:funcPr>
+                              <m:ctrlPr>
+                                <a:rPr lang="en-US" sz="2000" b="0" i="1" smtClean="0">
+                                  <a:latin typeface="Cambria Math" panose="02040503050406030204" pitchFamily="18" charset="0"/>
+                                </a:rPr>
+                              </m:ctrlPr>
+                            </m:funcPr>
+                            <m:fName>
+                              <m:sSub>
+                                <m:sSubPr>
+                                  <m:ctrlPr>
+                                    <a:rPr lang="en-US" sz="2000" b="0" i="1" smtClean="0">
+                                      <a:latin typeface="Cambria Math" panose="02040503050406030204" pitchFamily="18" charset="0"/>
+                                    </a:rPr>
+                                  </m:ctrlPr>
+                                </m:sSubPr>
+                                <m:e>
+                                  <m:r>
+                                    <m:rPr>
+                                      <m:sty m:val="p"/>
+                                    </m:rPr>
+                                    <a:rPr lang="en-US" sz="2000" b="0" i="0" smtClean="0">
+                                      <a:latin typeface="Cambria Math" panose="02040503050406030204" pitchFamily="18" charset="0"/>
+                                    </a:rPr>
+                                    <m:t>log</m:t>
+                                  </m:r>
+                                </m:e>
+                                <m:sub>
+                                  <m:r>
+                                    <a:rPr lang="en-US" sz="2000" b="0" i="1" smtClean="0">
+                                      <a:latin typeface="Cambria Math" panose="02040503050406030204" pitchFamily="18" charset="0"/>
+                                    </a:rPr>
+                                    <m:t>2</m:t>
+                                  </m:r>
+                                </m:sub>
+                              </m:sSub>
+                            </m:fName>
+                            <m:e>
+                              <m:d>
+                                <m:dPr>
+                                  <m:ctrlPr>
+                                    <a:rPr lang="en-US" sz="2000" b="0" i="1" smtClean="0">
+                                      <a:latin typeface="Cambria Math" panose="02040503050406030204" pitchFamily="18" charset="0"/>
+                                    </a:rPr>
+                                  </m:ctrlPr>
+                                </m:dPr>
+                                <m:e>
+                                  <m:sSub>
+                                    <m:sSubPr>
+                                      <m:ctrlPr>
+                                        <a:rPr lang="en-US" sz="2000" b="0" i="1" smtClean="0">
+                                          <a:latin typeface="Cambria Math" panose="02040503050406030204" pitchFamily="18" charset="0"/>
+                                        </a:rPr>
+                                      </m:ctrlPr>
+                                    </m:sSubPr>
+                                    <m:e>
+                                      <m:r>
+                                        <a:rPr lang="en-US" sz="2000" b="0" i="1" smtClean="0">
+                                          <a:latin typeface="Cambria Math" panose="02040503050406030204" pitchFamily="18" charset="0"/>
+                                        </a:rPr>
+                                        <m:t>𝑋</m:t>
+                                      </m:r>
+                                    </m:e>
+                                    <m:sub>
+                                      <m:r>
+                                        <a:rPr lang="en-US" sz="2000" b="0" i="1" smtClean="0">
+                                          <a:latin typeface="Cambria Math" panose="02040503050406030204" pitchFamily="18" charset="0"/>
+                                        </a:rPr>
+                                        <m:t>2</m:t>
+                                      </m:r>
+                                    </m:sub>
+                                  </m:sSub>
+                                </m:e>
+                              </m:d>
+                            </m:e>
+                          </m:func>
+                        </m:e>
+                      </m:d>
+                    </m:oMath>
+                  </m:oMathPara>
+                </a14:m>
+                <a:endParaRPr lang="en-US" sz="2000" dirty="0"/>
+              </a:p>
+              <a:p>
+                <a:pPr marL="0" lvl="0" indent="0">
+                  <a:buNone/>
+                </a:pPr>
+                <a14:m>
+                  <m:oMathPara xmlns:m="http://schemas.openxmlformats.org/officeDocument/2006/math">
+                    <m:oMathParaPr>
+                      <m:jc m:val="centerGroup"/>
+                    </m:oMathParaPr>
+                    <m:oMath xmlns:m="http://schemas.openxmlformats.org/officeDocument/2006/math">
+                      <m:r>
+                        <m:rPr>
+                          <m:sty m:val="p"/>
+                        </m:rPr>
+                        <a:rPr lang="en-US" sz="2000" b="0" i="1" smtClean="0">
+                          <a:latin typeface="Cambria Math" panose="02040503050406030204" pitchFamily="18" charset="0"/>
+                          <a:ea typeface="Cambria Math" panose="02040503050406030204" pitchFamily="18" charset="0"/>
+                        </a:rPr>
+                        <m:t>a</m:t>
+                      </m:r>
+                      <m:r>
+                        <m:rPr>
+                          <m:sty m:val="p"/>
+                        </m:rPr>
+                        <a:rPr lang="en-US" sz="2000" b="0" i="0" smtClean="0">
+                          <a:latin typeface="Cambria Math" panose="02040503050406030204" pitchFamily="18" charset="0"/>
+                          <a:ea typeface="Cambria Math" panose="02040503050406030204" pitchFamily="18" charset="0"/>
+                        </a:rPr>
+                        <m:t>nd</m:t>
+                      </m:r>
+                      <m:r>
+                        <a:rPr lang="en-US" sz="2000" b="0" i="0" smtClean="0">
+                          <a:latin typeface="Cambria Math" panose="02040503050406030204" pitchFamily="18" charset="0"/>
+                          <a:ea typeface="Cambria Math" panose="02040503050406030204" pitchFamily="18" charset="0"/>
+                        </a:rPr>
+                        <m:t>, </m:t>
+                      </m:r>
+                      <m:r>
+                        <a:rPr lang="en-US" sz="2000" b="0" i="1" smtClean="0">
+                          <a:latin typeface="Cambria Math" panose="02040503050406030204" pitchFamily="18" charset="0"/>
+                        </a:rPr>
+                        <m:t>𝑉𝑎</m:t>
+                      </m:r>
+                      <m:sSub>
+                        <m:sSubPr>
+                          <m:ctrlPr>
+                            <a:rPr lang="en-US" sz="2000" b="0" i="1" smtClean="0">
+                              <a:latin typeface="Cambria Math" panose="02040503050406030204" pitchFamily="18" charset="0"/>
+                            </a:rPr>
+                          </m:ctrlPr>
+                        </m:sSubPr>
+                        <m:e>
+                          <m:r>
+                            <a:rPr lang="en-US" sz="2000" b="0" i="1" smtClean="0">
+                              <a:latin typeface="Cambria Math" panose="02040503050406030204" pitchFamily="18" charset="0"/>
+                            </a:rPr>
+                            <m:t>𝑟</m:t>
+                          </m:r>
+                        </m:e>
+                        <m:sub>
+                          <m:r>
+                            <a:rPr lang="en-US" sz="2000" b="0" i="1" smtClean="0">
+                              <a:latin typeface="Cambria Math" panose="02040503050406030204" pitchFamily="18" charset="0"/>
+                            </a:rPr>
+                            <m:t>𝑟𝑒𝑓</m:t>
+                          </m:r>
+                        </m:sub>
+                      </m:sSub>
+                      <m:r>
+                        <a:rPr lang="en-US" sz="2000" b="0" i="1" smtClean="0">
+                          <a:latin typeface="Cambria Math" panose="02040503050406030204" pitchFamily="18" charset="0"/>
+                        </a:rPr>
+                        <m:t>=</m:t>
+                      </m:r>
+                      <m:r>
+                        <a:rPr lang="en-US" sz="2000" b="0" i="1" smtClean="0">
+                          <a:latin typeface="Cambria Math" panose="02040503050406030204" pitchFamily="18" charset="0"/>
+                        </a:rPr>
+                        <m:t>𝑉𝑎𝑟</m:t>
+                      </m:r>
+                      <m:d>
+                        <m:dPr>
+                          <m:ctrlPr>
+                            <a:rPr lang="en-US" sz="2000" b="0" i="1" smtClean="0">
+                              <a:latin typeface="Cambria Math" panose="02040503050406030204" pitchFamily="18" charset="0"/>
+                            </a:rPr>
+                          </m:ctrlPr>
+                        </m:dPr>
+                        <m:e>
+                          <m:func>
+                            <m:funcPr>
+                              <m:ctrlPr>
+                                <a:rPr lang="en-US" sz="2000" b="0" i="1" smtClean="0">
+                                  <a:latin typeface="Cambria Math" panose="02040503050406030204" pitchFamily="18" charset="0"/>
+                                </a:rPr>
+                              </m:ctrlPr>
+                            </m:funcPr>
+                            <m:fName>
+                              <m:sSub>
+                                <m:sSubPr>
+                                  <m:ctrlPr>
+                                    <a:rPr lang="en-US" sz="2000" b="0" i="1" smtClean="0">
+                                      <a:latin typeface="Cambria Math" panose="02040503050406030204" pitchFamily="18" charset="0"/>
+                                    </a:rPr>
+                                  </m:ctrlPr>
+                                </m:sSubPr>
+                                <m:e>
+                                  <m:r>
+                                    <m:rPr>
+                                      <m:sty m:val="p"/>
+                                    </m:rPr>
+                                    <a:rPr lang="en-US" sz="2000" b="0" i="0" smtClean="0">
+                                      <a:latin typeface="Cambria Math" panose="02040503050406030204" pitchFamily="18" charset="0"/>
+                                    </a:rPr>
+                                    <m:t>log</m:t>
+                                  </m:r>
+                                </m:e>
+                                <m:sub>
+                                  <m:r>
+                                    <a:rPr lang="en-US" sz="2000" b="0" i="1" smtClean="0">
+                                      <a:latin typeface="Cambria Math" panose="02040503050406030204" pitchFamily="18" charset="0"/>
+                                    </a:rPr>
+                                    <m:t>2</m:t>
+                                  </m:r>
+                                </m:sub>
+                              </m:sSub>
+                            </m:fName>
+                            <m:e>
+                              <m:d>
+                                <m:dPr>
+                                  <m:ctrlPr>
+                                    <a:rPr lang="en-US" sz="2000" b="0" i="1" smtClean="0">
+                                      <a:latin typeface="Cambria Math" panose="02040503050406030204" pitchFamily="18" charset="0"/>
+                                    </a:rPr>
+                                  </m:ctrlPr>
+                                </m:dPr>
+                                <m:e>
+                                  <m:sSub>
+                                    <m:sSubPr>
+                                      <m:ctrlPr>
+                                        <a:rPr lang="en-US" sz="2000" b="0" i="1" smtClean="0">
+                                          <a:latin typeface="Cambria Math" panose="02040503050406030204" pitchFamily="18" charset="0"/>
+                                        </a:rPr>
+                                      </m:ctrlPr>
+                                    </m:sSubPr>
+                                    <m:e>
+                                      <m:r>
+                                        <a:rPr lang="en-US" sz="2000" b="0" i="1" smtClean="0">
+                                          <a:latin typeface="Cambria Math" panose="02040503050406030204" pitchFamily="18" charset="0"/>
+                                        </a:rPr>
+                                        <m:t>𝑋</m:t>
+                                      </m:r>
+                                    </m:e>
+                                    <m:sub>
+                                      <m:r>
+                                        <a:rPr lang="en-US" sz="2000" b="0" i="1" smtClean="0">
+                                          <a:latin typeface="Cambria Math" panose="02040503050406030204" pitchFamily="18" charset="0"/>
+                                        </a:rPr>
+                                        <m:t>𝑟𝑒𝑓</m:t>
+                                      </m:r>
+                                    </m:sub>
+                                  </m:sSub>
+                                </m:e>
+                              </m:d>
+                            </m:e>
+                          </m:func>
+                        </m:e>
+                      </m:d>
+                    </m:oMath>
+                  </m:oMathPara>
+                </a14:m>
+                <a:endParaRPr lang="en-US" sz="2000" dirty="0"/>
+              </a:p>
+              <a:p>
+                <a:pPr marL="0" lvl="0" indent="0">
+                  <a:buNone/>
+                </a:pPr>
+                <a:endParaRPr lang="en-US" sz="2000" dirty="0"/>
+              </a:p>
+              <a:p>
+                <a:pPr marL="0" lvl="0" indent="0">
+                  <a:buNone/>
+                </a:pPr>
+                <a:r>
+                  <a:rPr lang="en-US" sz="2000" dirty="0"/>
+                  <a:t>Note:</a:t>
+                </a:r>
+              </a:p>
+              <a:p>
+                <a:pPr marL="0" lvl="0" indent="0">
+                  <a:buNone/>
+                </a:pPr>
+                <a:endParaRPr lang="en-US" sz="2000" dirty="0"/>
+              </a:p>
+              <a:p>
+                <a:pPr marL="0" lvl="0" indent="0">
+                  <a:buNone/>
+                </a:pPr>
+                <a:r>
+                  <a:rPr lang="en-US" sz="2000" dirty="0"/>
+                  <a:t>a. </a:t>
+                </a:r>
+                <a14:m>
+                  <m:oMath xmlns:m="http://schemas.openxmlformats.org/officeDocument/2006/math">
+                    <m:r>
+                      <a:rPr lang="en-US" sz="2000" b="0" i="1" smtClean="0">
+                        <a:latin typeface="Cambria Math" panose="02040503050406030204" pitchFamily="18" charset="0"/>
+                      </a:rPr>
+                      <m:t>𝑉𝑎𝑟</m:t>
+                    </m:r>
+                    <m:d>
+                      <m:dPr>
+                        <m:ctrlPr>
+                          <a:rPr lang="en-US" sz="2000" b="0" i="1" smtClean="0">
+                            <a:latin typeface="Cambria Math" panose="02040503050406030204" pitchFamily="18" charset="0"/>
+                          </a:rPr>
+                        </m:ctrlPr>
+                      </m:dPr>
+                      <m:e>
+                        <m:r>
+                          <a:rPr lang="en-US" sz="2000" b="0" i="1" smtClean="0">
+                            <a:latin typeface="Cambria Math" panose="02040503050406030204" pitchFamily="18" charset="0"/>
+                          </a:rPr>
+                          <m:t>𝑋</m:t>
+                        </m:r>
+                      </m:e>
+                    </m:d>
+                    <m:r>
+                      <a:rPr lang="en-US" sz="2000" b="0" i="1" smtClean="0">
+                        <a:latin typeface="Cambria Math" panose="02040503050406030204" pitchFamily="18" charset="0"/>
+                      </a:rPr>
+                      <m:t>=</m:t>
+                    </m:r>
+                    <m:r>
+                      <a:rPr lang="en-US" sz="2000" b="0" i="1" smtClean="0">
+                        <a:latin typeface="Cambria Math" panose="02040503050406030204" pitchFamily="18" charset="0"/>
+                      </a:rPr>
+                      <m:t>𝑋</m:t>
+                    </m:r>
+                    <m:d>
+                      <m:dPr>
+                        <m:ctrlPr>
+                          <a:rPr lang="en-US" sz="2000" b="0" i="1" smtClean="0">
+                            <a:latin typeface="Cambria Math" panose="02040503050406030204" pitchFamily="18" charset="0"/>
+                          </a:rPr>
+                        </m:ctrlPr>
+                      </m:dPr>
+                      <m:e>
+                        <m:r>
+                          <a:rPr lang="en-US" sz="2000" b="0" i="1" smtClean="0">
+                            <a:latin typeface="Cambria Math" panose="02040503050406030204" pitchFamily="18" charset="0"/>
+                          </a:rPr>
+                          <m:t>1−</m:t>
+                        </m:r>
+                        <m:f>
+                          <m:fPr>
+                            <m:ctrlPr>
+                              <a:rPr lang="en-US" sz="2000" b="0" i="1" smtClean="0">
+                                <a:latin typeface="Cambria Math" panose="02040503050406030204" pitchFamily="18" charset="0"/>
+                              </a:rPr>
+                            </m:ctrlPr>
+                          </m:fPr>
+                          <m:num>
+                            <m:r>
+                              <a:rPr lang="en-US" sz="2000" b="0" i="1" smtClean="0">
+                                <a:latin typeface="Cambria Math" panose="02040503050406030204" pitchFamily="18" charset="0"/>
+                              </a:rPr>
+                              <m:t>𝑋</m:t>
+                            </m:r>
+                          </m:num>
+                          <m:den>
+                            <m:r>
+                              <a:rPr lang="en-US" sz="2000" b="0" i="1" smtClean="0">
+                                <a:latin typeface="Cambria Math" panose="02040503050406030204" pitchFamily="18" charset="0"/>
+                              </a:rPr>
+                              <m:t>𝑁</m:t>
+                            </m:r>
+                          </m:den>
+                        </m:f>
+                      </m:e>
+                    </m:d>
+                  </m:oMath>
+                </a14:m>
+                <a:r>
+                  <a:rPr lang="en-US" sz="2000" dirty="0"/>
+                  <a:t> if </a:t>
+                </a:r>
+                <a14:m>
+                  <m:oMath xmlns:m="http://schemas.openxmlformats.org/officeDocument/2006/math">
+                    <m:r>
+                      <a:rPr lang="en-US" sz="2000" b="0" i="1" smtClean="0">
+                        <a:latin typeface="Cambria Math" panose="02040503050406030204" pitchFamily="18" charset="0"/>
+                      </a:rPr>
+                      <m:t>𝑋</m:t>
+                    </m:r>
+                  </m:oMath>
+                </a14:m>
+                <a:r>
+                  <a:rPr lang="en-US" sz="2000" dirty="0"/>
+                  <a:t> is binomially distributed.</a:t>
+                </a:r>
+              </a:p>
+              <a:p>
+                <a:pPr marL="0" lvl="0" indent="0">
+                  <a:buNone/>
+                </a:pPr>
+                <a:r>
+                  <a:rPr lang="en-US" sz="2000" dirty="0"/>
+                  <a:t>b. In general, if </a:t>
+                </a:r>
+                <a14:m>
+                  <m:oMath xmlns:m="http://schemas.openxmlformats.org/officeDocument/2006/math">
+                    <m:r>
+                      <a:rPr lang="en-US" sz="2000" b="0" i="1" smtClean="0">
+                        <a:latin typeface="Cambria Math" panose="02040503050406030204" pitchFamily="18" charset="0"/>
+                      </a:rPr>
+                      <m:t>𝑌</m:t>
+                    </m:r>
+                    <m:r>
+                      <a:rPr lang="en-US" sz="2000" b="0" i="1" smtClean="0">
+                        <a:latin typeface="Cambria Math" panose="02040503050406030204" pitchFamily="18" charset="0"/>
+                      </a:rPr>
+                      <m:t>=</m:t>
+                    </m:r>
+                    <m:r>
+                      <a:rPr lang="en-US" sz="2000" b="0" i="1" smtClean="0">
+                        <a:latin typeface="Cambria Math" panose="02040503050406030204" pitchFamily="18" charset="0"/>
+                      </a:rPr>
+                      <m:t>𝑎𝑋</m:t>
+                    </m:r>
+                  </m:oMath>
+                </a14:m>
+                <a:r>
+                  <a:rPr lang="en-US" sz="2000" dirty="0"/>
+                  <a:t>, then </a:t>
+                </a:r>
+                <a14:m>
+                  <m:oMath xmlns:m="http://schemas.openxmlformats.org/officeDocument/2006/math">
+                    <m:r>
+                      <a:rPr lang="en-US" sz="2000" b="0" i="1" smtClean="0">
+                        <a:latin typeface="Cambria Math" panose="02040503050406030204" pitchFamily="18" charset="0"/>
+                      </a:rPr>
+                      <m:t>𝑉𝑎𝑟</m:t>
+                    </m:r>
+                    <m:d>
+                      <m:dPr>
+                        <m:ctrlPr>
+                          <a:rPr lang="en-US" sz="2000" b="0" i="1" smtClean="0">
+                            <a:latin typeface="Cambria Math" panose="02040503050406030204" pitchFamily="18" charset="0"/>
+                          </a:rPr>
+                        </m:ctrlPr>
+                      </m:dPr>
+                      <m:e>
+                        <m:r>
+                          <a:rPr lang="en-US" sz="2000" b="0" i="1" smtClean="0">
+                            <a:latin typeface="Cambria Math" panose="02040503050406030204" pitchFamily="18" charset="0"/>
+                          </a:rPr>
+                          <m:t>𝑌</m:t>
+                        </m:r>
+                      </m:e>
+                    </m:d>
+                    <m:r>
+                      <a:rPr lang="en-US" sz="2000" b="0" i="1" smtClean="0">
+                        <a:latin typeface="Cambria Math" panose="02040503050406030204" pitchFamily="18" charset="0"/>
+                      </a:rPr>
+                      <m:t>=</m:t>
+                    </m:r>
+                    <m:sSup>
+                      <m:sSupPr>
+                        <m:ctrlPr>
+                          <a:rPr lang="en-US" sz="2000" b="0" i="1" smtClean="0">
+                            <a:latin typeface="Cambria Math" panose="02040503050406030204" pitchFamily="18" charset="0"/>
+                          </a:rPr>
+                        </m:ctrlPr>
+                      </m:sSupPr>
+                      <m:e>
+                        <m:r>
+                          <a:rPr lang="en-US" sz="2000" b="0" i="1" smtClean="0">
+                            <a:latin typeface="Cambria Math" panose="02040503050406030204" pitchFamily="18" charset="0"/>
+                          </a:rPr>
+                          <m:t>𝑎</m:t>
+                        </m:r>
+                      </m:e>
+                      <m:sup>
+                        <m:r>
+                          <a:rPr lang="en-US" sz="2000" b="0" i="1" smtClean="0">
+                            <a:latin typeface="Cambria Math" panose="02040503050406030204" pitchFamily="18" charset="0"/>
+                          </a:rPr>
+                          <m:t>2</m:t>
+                        </m:r>
+                      </m:sup>
+                    </m:sSup>
+                    <m:r>
+                      <a:rPr lang="en-US" sz="2000" b="0" i="1" smtClean="0">
+                        <a:latin typeface="Cambria Math" panose="02040503050406030204" pitchFamily="18" charset="0"/>
+                      </a:rPr>
+                      <m:t>𝑉𝑎𝑟</m:t>
+                    </m:r>
+                    <m:r>
+                      <a:rPr lang="en-US" sz="2000" b="0" i="1" smtClean="0">
+                        <a:latin typeface="Cambria Math" panose="02040503050406030204" pitchFamily="18" charset="0"/>
+                      </a:rPr>
+                      <m:t>(</m:t>
+                    </m:r>
+                    <m:r>
+                      <a:rPr lang="en-US" sz="2000" b="0" i="1" smtClean="0">
+                        <a:latin typeface="Cambria Math" panose="02040503050406030204" pitchFamily="18" charset="0"/>
+                      </a:rPr>
+                      <m:t>𝑋</m:t>
+                    </m:r>
+                    <m:r>
+                      <a:rPr lang="en-US" sz="2000" b="0" i="1" smtClean="0">
+                        <a:latin typeface="Cambria Math" panose="02040503050406030204" pitchFamily="18" charset="0"/>
+                      </a:rPr>
+                      <m:t>)</m:t>
+                    </m:r>
+                  </m:oMath>
+                </a14:m>
+                <a:r>
+                  <a:rPr lang="en-US" sz="2000" dirty="0"/>
+                  <a:t>.</a:t>
+                </a:r>
+              </a:p>
+              <a:p>
+                <a:pPr marL="0" lvl="0" indent="0">
+                  <a:buNone/>
+                </a:pPr>
+                <a:r>
+                  <a:rPr lang="en-US" sz="2000" dirty="0"/>
+                  <a:t>c. The slope of </a:t>
+                </a:r>
+                <a14:m>
+                  <m:oMath xmlns:m="http://schemas.openxmlformats.org/officeDocument/2006/math">
+                    <m:func>
+                      <m:funcPr>
+                        <m:ctrlPr>
+                          <a:rPr lang="en-US" sz="2000" b="0" i="1" smtClean="0">
+                            <a:latin typeface="Cambria Math" panose="02040503050406030204" pitchFamily="18" charset="0"/>
+                          </a:rPr>
+                        </m:ctrlPr>
+                      </m:funcPr>
+                      <m:fName>
+                        <m:sSub>
+                          <m:sSubPr>
+                            <m:ctrlPr>
+                              <a:rPr lang="en-US" sz="2000" b="0" i="1" smtClean="0">
+                                <a:latin typeface="Cambria Math" panose="02040503050406030204" pitchFamily="18" charset="0"/>
+                              </a:rPr>
+                            </m:ctrlPr>
+                          </m:sSubPr>
+                          <m:e>
+                            <m:r>
+                              <m:rPr>
+                                <m:sty m:val="p"/>
+                              </m:rPr>
+                              <a:rPr lang="en-US" sz="2000" b="0" i="0" smtClean="0">
+                                <a:latin typeface="Cambria Math" panose="02040503050406030204" pitchFamily="18" charset="0"/>
+                              </a:rPr>
+                              <m:t>log</m:t>
+                            </m:r>
+                          </m:e>
+                          <m:sub>
+                            <m:r>
+                              <a:rPr lang="en-US" sz="2000" b="0" i="0" smtClean="0">
+                                <a:latin typeface="Cambria Math" panose="02040503050406030204" pitchFamily="18" charset="0"/>
+                              </a:rPr>
+                              <m:t>2</m:t>
+                            </m:r>
+                          </m:sub>
+                        </m:sSub>
+                      </m:fName>
+                      <m:e>
+                        <m:r>
+                          <a:rPr lang="en-US" sz="2000" b="0" i="1" smtClean="0">
+                            <a:latin typeface="Cambria Math" panose="02040503050406030204" pitchFamily="18" charset="0"/>
+                          </a:rPr>
+                          <m:t>(</m:t>
+                        </m:r>
+                        <m:r>
+                          <a:rPr lang="en-US" sz="2000" b="0" i="1" smtClean="0">
+                            <a:latin typeface="Cambria Math" panose="02040503050406030204" pitchFamily="18" charset="0"/>
+                          </a:rPr>
+                          <m:t>𝑥</m:t>
+                        </m:r>
+                        <m:r>
+                          <a:rPr lang="en-US" sz="2000" b="0" i="1" smtClean="0">
+                            <a:latin typeface="Cambria Math" panose="02040503050406030204" pitchFamily="18" charset="0"/>
+                          </a:rPr>
+                          <m:t>)</m:t>
+                        </m:r>
+                      </m:e>
+                    </m:func>
+                  </m:oMath>
+                </a14:m>
+                <a:r>
+                  <a:rPr lang="en-US" sz="2000" dirty="0"/>
+                  <a:t> at some </a:t>
+                </a:r>
+                <a14:m>
+                  <m:oMath xmlns:m="http://schemas.openxmlformats.org/officeDocument/2006/math">
+                    <m:sSub>
+                      <m:sSubPr>
+                        <m:ctrlPr>
+                          <a:rPr lang="en-US" sz="2000" b="0" i="1" smtClean="0">
+                            <a:latin typeface="Cambria Math" panose="02040503050406030204" pitchFamily="18" charset="0"/>
+                          </a:rPr>
+                        </m:ctrlPr>
+                      </m:sSubPr>
+                      <m:e>
+                        <m:r>
+                          <a:rPr lang="en-US" sz="2000" b="0" i="1" smtClean="0">
+                            <a:latin typeface="Cambria Math" panose="02040503050406030204" pitchFamily="18" charset="0"/>
+                          </a:rPr>
+                          <m:t>𝑥</m:t>
+                        </m:r>
+                      </m:e>
+                      <m:sub>
+                        <m:r>
+                          <a:rPr lang="en-US" sz="2000" b="0" i="1" smtClean="0">
+                            <a:latin typeface="Cambria Math" panose="02040503050406030204" pitchFamily="18" charset="0"/>
+                          </a:rPr>
+                          <m:t>0</m:t>
+                        </m:r>
+                      </m:sub>
+                    </m:sSub>
+                  </m:oMath>
+                </a14:m>
+                <a:r>
+                  <a:rPr lang="en-US" sz="2000" dirty="0"/>
+                  <a:t> is proportional to </a:t>
+                </a:r>
+                <a14:m>
+                  <m:oMath xmlns:m="http://schemas.openxmlformats.org/officeDocument/2006/math">
+                    <m:f>
+                      <m:fPr>
+                        <m:ctrlPr>
+                          <a:rPr lang="en-US" sz="2000" i="1" smtClean="0">
+                            <a:latin typeface="Cambria Math" panose="02040503050406030204" pitchFamily="18" charset="0"/>
+                          </a:rPr>
+                        </m:ctrlPr>
+                      </m:fPr>
+                      <m:num>
+                        <m:r>
+                          <a:rPr lang="en-US" sz="2000" b="0" i="1" smtClean="0">
+                            <a:latin typeface="Cambria Math" panose="02040503050406030204" pitchFamily="18" charset="0"/>
+                          </a:rPr>
+                          <m:t>1</m:t>
+                        </m:r>
+                      </m:num>
+                      <m:den>
+                        <m:sSub>
+                          <m:sSubPr>
+                            <m:ctrlPr>
+                              <a:rPr lang="en-US" sz="2000" b="0" i="1" smtClean="0">
+                                <a:latin typeface="Cambria Math" panose="02040503050406030204" pitchFamily="18" charset="0"/>
+                              </a:rPr>
+                            </m:ctrlPr>
+                          </m:sSubPr>
+                          <m:e>
+                            <m:r>
+                              <a:rPr lang="en-US" sz="2000" b="0" i="1" smtClean="0">
+                                <a:latin typeface="Cambria Math" panose="02040503050406030204" pitchFamily="18" charset="0"/>
+                              </a:rPr>
+                              <m:t>𝑥</m:t>
+                            </m:r>
+                          </m:e>
+                          <m:sub>
+                            <m:r>
+                              <a:rPr lang="en-US" sz="2000" b="0" i="1" smtClean="0">
+                                <a:latin typeface="Cambria Math" panose="02040503050406030204" pitchFamily="18" charset="0"/>
+                              </a:rPr>
+                              <m:t>0</m:t>
+                            </m:r>
+                          </m:sub>
+                        </m:sSub>
+                      </m:den>
+                    </m:f>
+                  </m:oMath>
+                </a14:m>
+                <a:r>
+                  <a:rPr lang="en-US" sz="2000" dirty="0"/>
+                  <a:t>.</a:t>
+                </a:r>
+              </a:p>
+              <a:p>
+                <a:pPr marL="0" lvl="0" indent="0">
+                  <a:buNone/>
+                </a:pPr>
+                <a:endParaRPr lang="en-US" sz="2000" dirty="0"/>
+              </a:p>
+              <a:p>
+                <a:pPr marL="0" lvl="0" indent="0">
+                  <a:buNone/>
+                </a:pPr>
+                <a14:m>
+                  <m:oMathPara xmlns:m="http://schemas.openxmlformats.org/officeDocument/2006/math">
+                    <m:oMathParaPr>
+                      <m:jc m:val="centerGroup"/>
+                    </m:oMathParaPr>
+                    <m:oMath xmlns:m="http://schemas.openxmlformats.org/officeDocument/2006/math">
+                      <m:r>
+                        <a:rPr lang="en-US" sz="2000" i="1" smtClean="0">
+                          <a:latin typeface="Cambria Math" panose="02040503050406030204" pitchFamily="18" charset="0"/>
+                          <a:ea typeface="Cambria Math" panose="02040503050406030204" pitchFamily="18" charset="0"/>
+                        </a:rPr>
+                        <m:t>⇒</m:t>
+                      </m:r>
+                      <m:r>
+                        <a:rPr lang="en-US" sz="2000" b="0" i="1" smtClean="0">
+                          <a:latin typeface="Cambria Math" panose="02040503050406030204" pitchFamily="18" charset="0"/>
+                        </a:rPr>
+                        <m:t>𝑉𝑎𝑟</m:t>
+                      </m:r>
+                      <m:r>
+                        <a:rPr lang="en-US" sz="2000" b="0" i="1" smtClean="0">
+                          <a:latin typeface="Cambria Math" panose="02040503050406030204" pitchFamily="18" charset="0"/>
+                          <a:ea typeface="Cambria Math" panose="02040503050406030204" pitchFamily="18" charset="0"/>
+                        </a:rPr>
+                        <m:t>∝</m:t>
+                      </m:r>
+                      <m:sSup>
+                        <m:sSupPr>
+                          <m:ctrlPr>
+                            <a:rPr lang="en-US" sz="2000" b="0" i="1" smtClean="0">
+                              <a:latin typeface="Cambria Math" panose="02040503050406030204" pitchFamily="18" charset="0"/>
+                              <a:ea typeface="Cambria Math" panose="02040503050406030204" pitchFamily="18" charset="0"/>
+                            </a:rPr>
+                          </m:ctrlPr>
+                        </m:sSupPr>
+                        <m:e>
+                          <m:d>
+                            <m:dPr>
+                              <m:ctrlPr>
+                                <a:rPr lang="en-US" sz="2000" b="0" i="1" smtClean="0">
+                                  <a:latin typeface="Cambria Math" panose="02040503050406030204" pitchFamily="18" charset="0"/>
+                                  <a:ea typeface="Cambria Math" panose="02040503050406030204" pitchFamily="18" charset="0"/>
+                                </a:rPr>
+                              </m:ctrlPr>
+                            </m:dPr>
+                            <m:e>
+                              <m:f>
+                                <m:fPr>
+                                  <m:ctrlPr>
+                                    <a:rPr lang="en-US" sz="2000" b="0" i="1" smtClean="0">
+                                      <a:latin typeface="Cambria Math" panose="02040503050406030204" pitchFamily="18" charset="0"/>
+                                      <a:ea typeface="Cambria Math" panose="02040503050406030204" pitchFamily="18" charset="0"/>
+                                    </a:rPr>
+                                  </m:ctrlPr>
+                                </m:fPr>
+                                <m:num>
+                                  <m:r>
+                                    <a:rPr lang="en-US" sz="2000" b="0" i="1" smtClean="0">
+                                      <a:latin typeface="Cambria Math" panose="02040503050406030204" pitchFamily="18" charset="0"/>
+                                      <a:ea typeface="Cambria Math" panose="02040503050406030204" pitchFamily="18" charset="0"/>
+                                    </a:rPr>
+                                    <m:t>1</m:t>
+                                  </m:r>
+                                </m:num>
+                                <m:den>
+                                  <m:r>
+                                    <a:rPr lang="en-US" sz="2000" b="0" i="1" smtClean="0">
+                                      <a:latin typeface="Cambria Math" panose="02040503050406030204" pitchFamily="18" charset="0"/>
+                                      <a:ea typeface="Cambria Math" panose="02040503050406030204" pitchFamily="18" charset="0"/>
+                                    </a:rPr>
+                                    <m:t>𝑋</m:t>
+                                  </m:r>
+                                </m:den>
+                              </m:f>
+                            </m:e>
+                          </m:d>
+                        </m:e>
+                        <m:sup>
+                          <m:r>
+                            <a:rPr lang="en-US" sz="2000" b="0" i="1" smtClean="0">
+                              <a:latin typeface="Cambria Math" panose="02040503050406030204" pitchFamily="18" charset="0"/>
+                              <a:ea typeface="Cambria Math" panose="02040503050406030204" pitchFamily="18" charset="0"/>
+                            </a:rPr>
+                            <m:t>2</m:t>
+                          </m:r>
+                        </m:sup>
+                      </m:sSup>
+                      <m:r>
+                        <a:rPr lang="en-US" sz="2000" b="0" i="0" smtClean="0">
+                          <a:latin typeface="Cambria Math" panose="02040503050406030204" pitchFamily="18" charset="0"/>
+                          <a:ea typeface="Cambria Math" panose="02040503050406030204" pitchFamily="18" charset="0"/>
+                        </a:rPr>
+                        <m:t>.</m:t>
+                      </m:r>
+                      <m:r>
+                        <a:rPr lang="en-US" sz="2000" b="0" i="1" smtClean="0">
+                          <a:latin typeface="Cambria Math" panose="02040503050406030204" pitchFamily="18" charset="0"/>
+                        </a:rPr>
+                        <m:t>𝑋</m:t>
+                      </m:r>
+                      <m:d>
+                        <m:dPr>
+                          <m:ctrlPr>
+                            <a:rPr lang="en-US" sz="2000" b="0" i="1" smtClean="0">
+                              <a:latin typeface="Cambria Math" panose="02040503050406030204" pitchFamily="18" charset="0"/>
+                            </a:rPr>
+                          </m:ctrlPr>
+                        </m:dPr>
+                        <m:e>
+                          <m:r>
+                            <a:rPr lang="en-US" sz="2000" b="0" i="1" smtClean="0">
+                              <a:latin typeface="Cambria Math" panose="02040503050406030204" pitchFamily="18" charset="0"/>
+                            </a:rPr>
+                            <m:t>1−</m:t>
+                          </m:r>
+                          <m:f>
+                            <m:fPr>
+                              <m:ctrlPr>
+                                <a:rPr lang="en-US" sz="2000" b="0" i="1" smtClean="0">
+                                  <a:latin typeface="Cambria Math" panose="02040503050406030204" pitchFamily="18" charset="0"/>
+                                </a:rPr>
+                              </m:ctrlPr>
+                            </m:fPr>
+                            <m:num>
+                              <m:r>
+                                <a:rPr lang="en-US" sz="2000" b="0" i="1" smtClean="0">
+                                  <a:latin typeface="Cambria Math" panose="02040503050406030204" pitchFamily="18" charset="0"/>
+                                </a:rPr>
+                                <m:t>𝑋</m:t>
+                              </m:r>
+                            </m:num>
+                            <m:den>
+                              <m:r>
+                                <a:rPr lang="en-US" sz="2000" b="0" i="1" smtClean="0">
+                                  <a:latin typeface="Cambria Math" panose="02040503050406030204" pitchFamily="18" charset="0"/>
+                                </a:rPr>
+                                <m:t>𝑁</m:t>
+                              </m:r>
+                            </m:den>
+                          </m:f>
+                        </m:e>
+                      </m:d>
+                    </m:oMath>
+                  </m:oMathPara>
+                </a14:m>
+                <a:endParaRPr lang="en-US" sz="2000" b="0" dirty="0"/>
+              </a:p>
+              <a:p>
+                <a:pPr marL="0" lvl="0" indent="0">
+                  <a:buNone/>
+                </a:pPr>
+                <a:r>
+                  <a:rPr lang="en-US" sz="2000" dirty="0"/>
+                  <a:t>			</a:t>
+                </a:r>
+                <a14:m>
+                  <m:oMath xmlns:m="http://schemas.openxmlformats.org/officeDocument/2006/math">
+                    <m:r>
+                      <a:rPr lang="en-US" sz="2000" b="0" i="1" smtClean="0">
+                        <a:latin typeface="Cambria Math" panose="02040503050406030204" pitchFamily="18" charset="0"/>
+                      </a:rPr>
+                      <m:t>=</m:t>
+                    </m:r>
+                    <m:f>
+                      <m:fPr>
+                        <m:ctrlPr>
+                          <a:rPr lang="en-US" sz="2000" b="0" i="1" smtClean="0">
+                            <a:latin typeface="Cambria Math" panose="02040503050406030204" pitchFamily="18" charset="0"/>
+                          </a:rPr>
+                        </m:ctrlPr>
+                      </m:fPr>
+                      <m:num>
+                        <m:r>
+                          <a:rPr lang="en-US" sz="2000" b="0" i="1" smtClean="0">
+                            <a:latin typeface="Cambria Math" panose="02040503050406030204" pitchFamily="18" charset="0"/>
+                          </a:rPr>
+                          <m:t>𝑁</m:t>
+                        </m:r>
+                        <m:r>
+                          <a:rPr lang="en-US" sz="2000" b="0" i="1" smtClean="0">
+                            <a:latin typeface="Cambria Math" panose="02040503050406030204" pitchFamily="18" charset="0"/>
+                          </a:rPr>
+                          <m:t>−</m:t>
+                        </m:r>
+                        <m:r>
+                          <a:rPr lang="en-US" sz="2000" b="0" i="1" smtClean="0">
+                            <a:latin typeface="Cambria Math" panose="02040503050406030204" pitchFamily="18" charset="0"/>
+                          </a:rPr>
+                          <m:t>𝑋</m:t>
+                        </m:r>
+                      </m:num>
+                      <m:den>
+                        <m:r>
+                          <a:rPr lang="en-US" sz="2000" b="0" i="1" smtClean="0">
+                            <a:latin typeface="Cambria Math" panose="02040503050406030204" pitchFamily="18" charset="0"/>
+                          </a:rPr>
+                          <m:t>𝑁𝑋</m:t>
+                        </m:r>
+                      </m:den>
+                    </m:f>
+                  </m:oMath>
+                </a14:m>
+                <a:endParaRPr lang="en-US" sz="2000" dirty="0"/>
+              </a:p>
+              <a:p>
+                <a:pPr marL="0" lvl="0" indent="0">
+                  <a:buNone/>
+                </a:pPr>
+                <a:endParaRPr lang="en-US" sz="2000" dirty="0"/>
+              </a:p>
+              <a:p>
+                <a:pPr marL="0" lvl="0" indent="0">
+                  <a:buNone/>
+                </a:pPr>
+                <a:endParaRPr lang="en-US" sz="2000" dirty="0"/>
+              </a:p>
+            </p:txBody>
+          </p:sp>
+        </mc:Choice>
+        <mc:Fallback xmlns="">
+          <p:sp>
+            <p:nvSpPr>
+              <p:cNvPr id="3" name="Notes Placeholder 2"/>
+              <p:cNvSpPr>
+                <a:spLocks noGrp="1"/>
+              </p:cNvSpPr>
+              <p:nvPr>
+                <p:ph type="body" idx="1"/>
+              </p:nvPr>
+            </p:nvSpPr>
+            <p:spPr/>
+            <p:txBody>
+              <a:bodyPr/>
+              <a:lstStyle/>
+              <a:p>
+                <a:r>
+                  <a:rPr lang="en-US" sz="2000" dirty="0"/>
+                  <a:t>To see how the weights are calculated:</a:t>
+                </a:r>
+              </a:p>
+              <a:p>
+                <a:endParaRPr lang="en-US" sz="2000" dirty="0"/>
+              </a:p>
+              <a:p>
+                <a:pPr marL="457200" indent="-457200">
+                  <a:buAutoNum type="arabicPeriod"/>
+                </a:pPr>
+                <a:r>
+                  <a:rPr lang="en-US" sz="2000" b="0" i="0">
+                    <a:latin typeface="Cambria Math" panose="02040503050406030204" pitchFamily="18" charset="0"/>
+                  </a:rPr>
+                  <a:t>𝑀=log_2⁡(𝑋_2/𝑁_2 )−log_2⁡(𝑋_𝑟𝑒𝑓/𝑁_𝑟𝑒𝑓 )</a:t>
+                </a:r>
+                <a:endParaRPr lang="en-US" sz="2000" dirty="0"/>
+              </a:p>
+              <a:p>
+                <a:pPr marL="457200" indent="-457200">
+                  <a:buAutoNum type="arabicPeriod"/>
+                </a:pPr>
+                <a:r>
+                  <a:rPr lang="en-US" sz="2000" b="0" i="0">
+                    <a:latin typeface="Cambria Math" panose="02040503050406030204" pitchFamily="18" charset="0"/>
+                    <a:ea typeface="Cambria Math" panose="02040503050406030204" pitchFamily="18" charset="0"/>
+                  </a:rPr>
+                  <a:t>⇒</a:t>
+                </a:r>
+                <a:r>
+                  <a:rPr lang="en-US" sz="2000" b="0" i="0">
+                    <a:latin typeface="Cambria Math" panose="02040503050406030204" pitchFamily="18" charset="0"/>
+                  </a:rPr>
+                  <a:t>𝑉𝑎𝑟(𝑀)=𝑉𝑎𝑟_2+𝑉𝑎𝑟_𝑟𝑒𝑓,              </a:t>
+                </a:r>
+                <a:r>
+                  <a:rPr lang="en-US" sz="2000" dirty="0"/>
+                  <a:t>where     </a:t>
+                </a:r>
+                <a:r>
+                  <a:rPr lang="en-US" sz="2000" b="0" i="0">
+                    <a:latin typeface="Cambria Math" panose="02040503050406030204" pitchFamily="18" charset="0"/>
+                  </a:rPr>
+                  <a:t>𝑉𝑎𝑟_𝑟𝑒𝑓=𝑉𝑎𝑟(log_2⁡(𝑋_𝑟𝑒𝑓/𝑁_𝑟𝑒𝑓 ) )</a:t>
+                </a:r>
+                <a:endParaRPr lang="en-US" sz="2000" b="0" dirty="0"/>
+              </a:p>
+              <a:p>
+                <a:pPr marL="2743200" lvl="6" indent="0">
+                  <a:buNone/>
+                </a:pPr>
+                <a:r>
+                  <a:rPr lang="en-US" sz="2000" b="0" dirty="0"/>
+                  <a:t>   </a:t>
+                </a:r>
+                <a:r>
+                  <a:rPr lang="en-US" sz="2000" dirty="0"/>
+                  <a:t>and	</a:t>
+                </a:r>
+                <a:r>
+                  <a:rPr lang="en-US" sz="2000" b="0" i="0">
+                    <a:latin typeface="Cambria Math" panose="02040503050406030204" pitchFamily="18" charset="0"/>
+                  </a:rPr>
+                  <a:t>𝑉𝑎𝑟_2=𝑉𝑎𝑟(log_2⁡(𝑋_2/𝑁_2 ) )</a:t>
+                </a:r>
+                <a:r>
+                  <a:rPr lang="en-US" sz="2000" dirty="0"/>
+                  <a:t>.</a:t>
+                </a:r>
+              </a:p>
+              <a:p>
+                <a:pPr marL="0" lvl="0" indent="0">
+                  <a:buNone/>
+                </a:pPr>
+                <a:r>
+                  <a:rPr lang="en-US" sz="2000" dirty="0"/>
+                  <a:t>Assume </a:t>
+                </a:r>
+                <a:r>
+                  <a:rPr lang="en-US" sz="2000" b="0" i="0">
+                    <a:latin typeface="Cambria Math" panose="02040503050406030204" pitchFamily="18" charset="0"/>
+                  </a:rPr>
+                  <a:t>𝑁_2</a:t>
+                </a:r>
+                <a:r>
+                  <a:rPr lang="en-US" sz="2000" dirty="0"/>
+                  <a:t> and </a:t>
+                </a:r>
+                <a:r>
+                  <a:rPr lang="en-US" sz="2000" b="0" i="0">
+                    <a:latin typeface="Cambria Math" panose="02040503050406030204" pitchFamily="18" charset="0"/>
+                  </a:rPr>
+                  <a:t>𝑁_𝑟𝑒𝑓</a:t>
+                </a:r>
+                <a:r>
+                  <a:rPr lang="en-US" sz="2000" dirty="0"/>
+                  <a:t> are constant. </a:t>
+                </a:r>
+              </a:p>
+              <a:p>
+                <a:pPr marL="0" lvl="0" indent="0">
+                  <a:buNone/>
+                </a:pPr>
+                <a:endParaRPr lang="en-US" sz="2000" dirty="0"/>
+              </a:p>
+              <a:p>
+                <a:pPr marL="0" lvl="0" indent="0">
+                  <a:buNone/>
+                </a:pPr>
+                <a:r>
+                  <a:rPr lang="en-US" sz="2000" i="0">
+                    <a:latin typeface="Cambria Math" panose="02040503050406030204" pitchFamily="18" charset="0"/>
+                    <a:ea typeface="Cambria Math" panose="02040503050406030204" pitchFamily="18" charset="0"/>
+                  </a:rPr>
+                  <a:t>⇒</a:t>
+                </a:r>
+                <a:r>
+                  <a:rPr lang="en-US" sz="2000" b="0" i="0">
+                    <a:latin typeface="Cambria Math" panose="02040503050406030204" pitchFamily="18" charset="0"/>
+                  </a:rPr>
+                  <a:t>𝑉𝑎𝑟_2=𝑉𝑎𝑟(log_2⁡(𝑋_2 ) )</a:t>
+                </a:r>
+                <a:endParaRPr lang="en-US" sz="2000" dirty="0"/>
+              </a:p>
+              <a:p>
+                <a:pPr marL="0" lvl="0" indent="0">
+                  <a:buNone/>
+                </a:pPr>
+                <a:r>
+                  <a:rPr lang="en-US" sz="2000" b="0" i="0">
+                    <a:latin typeface="Cambria Math" panose="02040503050406030204" pitchFamily="18" charset="0"/>
+                    <a:ea typeface="Cambria Math" panose="02040503050406030204" pitchFamily="18" charset="0"/>
+                  </a:rPr>
+                  <a:t>and, </a:t>
+                </a:r>
+                <a:r>
+                  <a:rPr lang="en-US" sz="2000" b="0" i="0">
+                    <a:latin typeface="Cambria Math" panose="02040503050406030204" pitchFamily="18" charset="0"/>
+                  </a:rPr>
+                  <a:t>𝑉𝑎𝑟_𝑟𝑒𝑓=𝑉𝑎𝑟(log_2⁡(𝑋_𝑟𝑒𝑓 ) )</a:t>
+                </a:r>
+                <a:endParaRPr lang="en-US" sz="2000" dirty="0"/>
+              </a:p>
+              <a:p>
+                <a:pPr marL="0" lvl="0" indent="0">
+                  <a:buNone/>
+                </a:pPr>
+                <a:endParaRPr lang="en-US" sz="2000" dirty="0"/>
+              </a:p>
+              <a:p>
+                <a:pPr marL="0" lvl="0" indent="0">
+                  <a:buNone/>
+                </a:pPr>
+                <a:r>
+                  <a:rPr lang="en-US" sz="2000" dirty="0"/>
+                  <a:t>Note:</a:t>
+                </a:r>
+              </a:p>
+              <a:p>
+                <a:pPr marL="0" lvl="0" indent="0">
+                  <a:buNone/>
+                </a:pPr>
+                <a:endParaRPr lang="en-US" sz="2000" dirty="0"/>
+              </a:p>
+              <a:p>
+                <a:pPr marL="0" lvl="0" indent="0">
+                  <a:buNone/>
+                </a:pPr>
+                <a:r>
+                  <a:rPr lang="en-US" sz="2000" dirty="0"/>
+                  <a:t>a. </a:t>
+                </a:r>
+                <a:r>
+                  <a:rPr lang="en-US" sz="2000" b="0" i="0">
+                    <a:latin typeface="Cambria Math" panose="02040503050406030204" pitchFamily="18" charset="0"/>
+                  </a:rPr>
+                  <a:t>𝑉𝑎𝑟(𝑋)=𝑋(1−𝑋/𝑁)</a:t>
+                </a:r>
+                <a:r>
+                  <a:rPr lang="en-US" sz="2000" dirty="0"/>
+                  <a:t> if </a:t>
+                </a:r>
+                <a:r>
+                  <a:rPr lang="en-US" sz="2000" b="0" i="0">
+                    <a:latin typeface="Cambria Math" panose="02040503050406030204" pitchFamily="18" charset="0"/>
+                  </a:rPr>
+                  <a:t>𝑋</a:t>
+                </a:r>
+                <a:r>
+                  <a:rPr lang="en-US" sz="2000" dirty="0"/>
+                  <a:t> is binomially distributed.</a:t>
+                </a:r>
+              </a:p>
+              <a:p>
+                <a:pPr marL="0" lvl="0" indent="0">
+                  <a:buNone/>
+                </a:pPr>
+                <a:r>
+                  <a:rPr lang="en-US" sz="2000" dirty="0"/>
+                  <a:t>b. In general, if </a:t>
+                </a:r>
+                <a:r>
+                  <a:rPr lang="en-US" sz="2000" b="0" i="0">
+                    <a:latin typeface="Cambria Math" panose="02040503050406030204" pitchFamily="18" charset="0"/>
+                  </a:rPr>
+                  <a:t>𝑌=𝑎𝑋</a:t>
+                </a:r>
+                <a:r>
+                  <a:rPr lang="en-US" sz="2000" dirty="0"/>
+                  <a:t>, then </a:t>
+                </a:r>
+                <a:r>
+                  <a:rPr lang="en-US" sz="2000" b="0" i="0">
+                    <a:latin typeface="Cambria Math" panose="02040503050406030204" pitchFamily="18" charset="0"/>
+                  </a:rPr>
+                  <a:t>𝑉𝑎𝑟(𝑌)=𝑎^2 𝑉𝑎𝑟(𝑋)</a:t>
+                </a:r>
+                <a:r>
+                  <a:rPr lang="en-US" sz="2000" dirty="0"/>
+                  <a:t>.</a:t>
+                </a:r>
+              </a:p>
+              <a:p>
+                <a:pPr marL="0" lvl="0" indent="0">
+                  <a:buNone/>
+                </a:pPr>
+                <a:r>
+                  <a:rPr lang="en-US" sz="2000" dirty="0"/>
+                  <a:t>c. The slope of </a:t>
+                </a:r>
+                <a:r>
+                  <a:rPr lang="en-US" sz="2000" b="0" i="0">
+                    <a:latin typeface="Cambria Math" panose="02040503050406030204" pitchFamily="18" charset="0"/>
+                  </a:rPr>
+                  <a:t>log_2⁡〖(𝑥)〗</a:t>
+                </a:r>
+                <a:r>
+                  <a:rPr lang="en-US" sz="2000" dirty="0"/>
+                  <a:t> at some </a:t>
+                </a:r>
+                <a:r>
+                  <a:rPr lang="en-US" sz="2000" b="0" i="0">
+                    <a:latin typeface="Cambria Math" panose="02040503050406030204" pitchFamily="18" charset="0"/>
+                  </a:rPr>
+                  <a:t>𝑥_0</a:t>
+                </a:r>
+                <a:r>
+                  <a:rPr lang="en-US" sz="2000" dirty="0"/>
+                  <a:t> is proportional to </a:t>
+                </a:r>
+                <a:r>
+                  <a:rPr lang="en-US" sz="2000" b="0" i="0">
+                    <a:latin typeface="Cambria Math" panose="02040503050406030204" pitchFamily="18" charset="0"/>
+                  </a:rPr>
+                  <a:t>1/𝑥_0 </a:t>
+                </a:r>
+                <a:r>
+                  <a:rPr lang="en-US" sz="2000" dirty="0"/>
+                  <a:t>.</a:t>
+                </a:r>
+              </a:p>
+              <a:p>
+                <a:pPr marL="0" lvl="0" indent="0">
+                  <a:buNone/>
+                </a:pPr>
+                <a:endParaRPr lang="en-US" sz="2000" dirty="0"/>
+              </a:p>
+              <a:p>
+                <a:pPr marL="0" lvl="0" indent="0">
+                  <a:buNone/>
+                </a:pPr>
+                <a:r>
+                  <a:rPr lang="en-US" sz="2000" i="0">
+                    <a:latin typeface="Cambria Math" panose="02040503050406030204" pitchFamily="18" charset="0"/>
+                    <a:ea typeface="Cambria Math" panose="02040503050406030204" pitchFamily="18" charset="0"/>
+                  </a:rPr>
+                  <a:t>⇒</a:t>
+                </a:r>
+                <a:r>
+                  <a:rPr lang="en-US" sz="2000" b="0" i="0">
+                    <a:latin typeface="Cambria Math" panose="02040503050406030204" pitchFamily="18" charset="0"/>
+                  </a:rPr>
+                  <a:t>𝑉𝑎𝑟</a:t>
+                </a:r>
+                <a:r>
+                  <a:rPr lang="en-US" sz="2000" b="0" i="0">
+                    <a:latin typeface="Cambria Math" panose="02040503050406030204" pitchFamily="18" charset="0"/>
+                    <a:ea typeface="Cambria Math" panose="02040503050406030204" pitchFamily="18" charset="0"/>
+                  </a:rPr>
+                  <a:t>∝(1/𝑋)^2.</a:t>
+                </a:r>
+                <a:r>
+                  <a:rPr lang="en-US" sz="2000" b="0" i="0">
+                    <a:latin typeface="Cambria Math" panose="02040503050406030204" pitchFamily="18" charset="0"/>
+                  </a:rPr>
+                  <a:t>𝑋(1−𝑋/𝑁)</a:t>
+                </a:r>
+                <a:endParaRPr lang="en-US" sz="2000" b="0" dirty="0"/>
+              </a:p>
+              <a:p>
+                <a:pPr marL="0" lvl="0" indent="0">
+                  <a:buNone/>
+                </a:pPr>
+                <a:r>
+                  <a:rPr lang="en-US" sz="2000" dirty="0"/>
+                  <a:t>			</a:t>
+                </a:r>
+                <a:r>
+                  <a:rPr lang="en-US" sz="2000" b="0" i="0">
+                    <a:latin typeface="Cambria Math" panose="02040503050406030204" pitchFamily="18" charset="0"/>
+                  </a:rPr>
+                  <a:t>=(𝑁−𝑋)/𝑁𝑋</a:t>
+                </a:r>
+                <a:endParaRPr lang="en-US" sz="2000" dirty="0"/>
+              </a:p>
+              <a:p>
+                <a:pPr marL="0" lvl="0" indent="0">
+                  <a:buNone/>
+                </a:pPr>
+                <a:endParaRPr lang="en-US" sz="2000" dirty="0"/>
+              </a:p>
+              <a:p>
+                <a:pPr marL="0" lvl="0" indent="0">
+                  <a:buNone/>
+                </a:pPr>
+                <a:endParaRPr lang="en-US" sz="2000" dirty="0"/>
+              </a:p>
+            </p:txBody>
+          </p:sp>
+        </mc:Fallback>
+      </mc:AlternateContent>
       <p:sp>
         <p:nvSpPr>
           <p:cNvPr id="4" name="Slide Number Placeholder 3"/>
@@ -1211,7 +3203,7 @@
           <a:p>
             <a:fld id="{12573026-7AF8-9B4C-89E3-A4FB0E5697A1}" type="slidenum">
               <a:rPr lang="en-US" smtClean="0"/>
-              <a:t>14</a:t>
+              <a:t>15</a:t>
             </a:fld>
             <a:endParaRPr lang="en-US"/>
           </a:p>
@@ -1220,7 +3212,7 @@
     </p:spTree>
     <p:extLst>
       <p:ext uri="{BB962C8B-B14F-4D97-AF65-F5344CB8AC3E}">
-        <p14:creationId xmlns:p14="http://schemas.microsoft.com/office/powerpoint/2010/main" val="3182361171"/>
+        <p14:creationId xmlns:p14="http://schemas.microsoft.com/office/powerpoint/2010/main" val="3164934183"/>
       </p:ext>
     </p:extLst>
   </p:cSld>
@@ -1274,6 +3266,247 @@
           <a:bodyPr/>
           <a:lstStyle/>
           <a:p>
+            <a:r>
+              <a:rPr lang="en-US" sz="1200" b="0" i="0" u="none" strike="noStrike" kern="1200" dirty="0">
+                <a:solidFill>
+                  <a:schemeClr val="tx1"/>
+                </a:solidFill>
+                <a:effectLst/>
+                <a:latin typeface="+mn-lt"/>
+                <a:ea typeface="+mn-ea"/>
+                <a:cs typeface="+mn-cs"/>
+              </a:rPr>
+              <a:t>Anders, S, Huber, W (2010). Differential expression analysis for sequence count data. </a:t>
+            </a:r>
+            <a:r>
+              <a:rPr lang="en-US" sz="1200" b="0" i="1" u="none" strike="noStrike" kern="1200" dirty="0">
+                <a:solidFill>
+                  <a:schemeClr val="tx1"/>
+                </a:solidFill>
+                <a:effectLst/>
+                <a:latin typeface="+mn-lt"/>
+                <a:ea typeface="+mn-ea"/>
+                <a:cs typeface="+mn-cs"/>
+              </a:rPr>
+              <a:t>Genome Biology</a:t>
+            </a:r>
+            <a:r>
+              <a:rPr lang="en-US" sz="1200" b="0" i="0" u="none" strike="noStrike" kern="1200" dirty="0">
+                <a:solidFill>
+                  <a:schemeClr val="tx1"/>
+                </a:solidFill>
+                <a:effectLst/>
+                <a:latin typeface="+mn-lt"/>
+                <a:ea typeface="+mn-ea"/>
+                <a:cs typeface="+mn-cs"/>
+              </a:rPr>
+              <a:t> 11, R106.</a:t>
+            </a:r>
+          </a:p>
+          <a:p>
+            <a:endParaRPr lang="en-US" sz="1200" b="0" i="0" u="none" strike="noStrike" kern="1200" dirty="0">
+              <a:solidFill>
+                <a:schemeClr val="tx1"/>
+              </a:solidFill>
+              <a:effectLst/>
+              <a:latin typeface="+mn-lt"/>
+              <a:ea typeface="+mn-ea"/>
+              <a:cs typeface="+mn-cs"/>
+            </a:endParaRPr>
+          </a:p>
+          <a:p>
+            <a:r>
+              <a:rPr lang="en-US" sz="1200" b="0" i="0" u="none" strike="noStrike" kern="1200" dirty="0">
+                <a:solidFill>
+                  <a:schemeClr val="tx1"/>
+                </a:solidFill>
+                <a:effectLst/>
+                <a:latin typeface="+mn-lt"/>
+                <a:ea typeface="+mn-ea"/>
+                <a:cs typeface="+mn-cs"/>
+              </a:rPr>
+              <a:t>Bullard JH, </a:t>
+            </a:r>
+            <a:r>
+              <a:rPr lang="en-US" sz="1200" b="0" i="0" u="none" strike="noStrike" kern="1200" dirty="0" err="1">
+                <a:solidFill>
+                  <a:schemeClr val="tx1"/>
+                </a:solidFill>
+                <a:effectLst/>
+                <a:latin typeface="+mn-lt"/>
+                <a:ea typeface="+mn-ea"/>
+                <a:cs typeface="+mn-cs"/>
+              </a:rPr>
+              <a:t>Purdom</a:t>
+            </a:r>
+            <a:r>
+              <a:rPr lang="en-US" sz="1200" b="0" i="0" u="none" strike="noStrike" kern="1200" dirty="0">
+                <a:solidFill>
+                  <a:schemeClr val="tx1"/>
+                </a:solidFill>
+                <a:effectLst/>
+                <a:latin typeface="+mn-lt"/>
+                <a:ea typeface="+mn-ea"/>
+                <a:cs typeface="+mn-cs"/>
+              </a:rPr>
+              <a:t> E, Hansen KD, </a:t>
+            </a:r>
+            <a:r>
+              <a:rPr lang="en-US" sz="1200" b="0" i="0" u="none" strike="noStrike" kern="1200" dirty="0" err="1">
+                <a:solidFill>
+                  <a:schemeClr val="tx1"/>
+                </a:solidFill>
+                <a:effectLst/>
+                <a:latin typeface="+mn-lt"/>
+                <a:ea typeface="+mn-ea"/>
+                <a:cs typeface="+mn-cs"/>
+              </a:rPr>
+              <a:t>Dudoit</a:t>
+            </a:r>
+            <a:r>
+              <a:rPr lang="en-US" sz="1200" b="0" i="0" u="none" strike="noStrike" kern="1200" dirty="0">
+                <a:solidFill>
+                  <a:schemeClr val="tx1"/>
+                </a:solidFill>
+                <a:effectLst/>
+                <a:latin typeface="+mn-lt"/>
+                <a:ea typeface="+mn-ea"/>
+                <a:cs typeface="+mn-cs"/>
+              </a:rPr>
+              <a:t> S. (2010) Evaluation of statistical methods for normalization and differential expression in mRNA-</a:t>
+            </a:r>
+            <a:r>
+              <a:rPr lang="en-US" sz="1200" b="0" i="0" u="none" strike="noStrike" kern="1200" dirty="0" err="1">
+                <a:solidFill>
+                  <a:schemeClr val="tx1"/>
+                </a:solidFill>
+                <a:effectLst/>
+                <a:latin typeface="+mn-lt"/>
+                <a:ea typeface="+mn-ea"/>
+                <a:cs typeface="+mn-cs"/>
+              </a:rPr>
+              <a:t>Seq</a:t>
+            </a:r>
+            <a:r>
+              <a:rPr lang="en-US" sz="1200" b="0" i="0" u="none" strike="noStrike" kern="1200" dirty="0">
+                <a:solidFill>
+                  <a:schemeClr val="tx1"/>
+                </a:solidFill>
+                <a:effectLst/>
+                <a:latin typeface="+mn-lt"/>
+                <a:ea typeface="+mn-ea"/>
+                <a:cs typeface="+mn-cs"/>
+              </a:rPr>
+              <a:t> experiments. </a:t>
+            </a:r>
+            <a:r>
+              <a:rPr lang="en-US" sz="1200" b="0" i="1" u="none" strike="noStrike" kern="1200" dirty="0">
+                <a:solidFill>
+                  <a:schemeClr val="tx1"/>
+                </a:solidFill>
+                <a:effectLst/>
+                <a:latin typeface="+mn-lt"/>
+                <a:ea typeface="+mn-ea"/>
+                <a:cs typeface="+mn-cs"/>
+              </a:rPr>
+              <a:t>BMC Bioinformatics</a:t>
+            </a:r>
+            <a:r>
+              <a:rPr lang="en-US" sz="1200" b="0" i="0" u="none" strike="noStrike" kern="1200" dirty="0">
+                <a:solidFill>
+                  <a:schemeClr val="tx1"/>
+                </a:solidFill>
+                <a:effectLst/>
+                <a:latin typeface="+mn-lt"/>
+                <a:ea typeface="+mn-ea"/>
+                <a:cs typeface="+mn-cs"/>
+              </a:rPr>
+              <a:t> 11, 94.</a:t>
+            </a:r>
+            <a:endParaRPr lang="en-US" dirty="0"/>
+          </a:p>
+        </p:txBody>
+      </p:sp>
+      <p:sp>
+        <p:nvSpPr>
+          <p:cNvPr id="4" name="Slide Number Placeholder 3"/>
+          <p:cNvSpPr>
+            <a:spLocks noGrp="1"/>
+          </p:cNvSpPr>
+          <p:nvPr>
+            <p:ph type="sldNum" sz="quarter" idx="5"/>
+          </p:nvPr>
+        </p:nvSpPr>
+        <p:spPr/>
+        <p:txBody>
+          <a:bodyPr/>
+          <a:lstStyle/>
+          <a:p>
+            <a:fld id="{12573026-7AF8-9B4C-89E3-A4FB0E5697A1}" type="slidenum">
+              <a:rPr lang="en-US" smtClean="0"/>
+              <a:t>16</a:t>
+            </a:fld>
+            <a:endParaRPr lang="en-US"/>
+          </a:p>
+        </p:txBody>
+      </p:sp>
+    </p:spTree>
+    <p:extLst>
+      <p:ext uri="{BB962C8B-B14F-4D97-AF65-F5344CB8AC3E}">
+        <p14:creationId xmlns:p14="http://schemas.microsoft.com/office/powerpoint/2010/main" val="3182361171"/>
+      </p:ext>
+    </p:extLst>
+  </p:cSld>
+  <p:clrMapOvr>
+    <a:masterClrMapping/>
+  </p:clrMapOvr>
+</p:notes>
+</file>
+
+<file path=ppt/notesSlides/notesSlide8.xml><?xml version="1.0" encoding="utf-8"?>
+<p:notes xmlns:a="http://schemas.openxmlformats.org/drawingml/2006/main" xmlns:r="http://schemas.openxmlformats.org/officeDocument/2006/relationships" xmlns:p="http://schemas.openxmlformats.org/presentationml/2006/main">
+  <p:cSld>
+    <p:spTree>
+      <p:nvGrpSpPr>
+        <p:cNvPr id="1" name=""/>
+        <p:cNvGrpSpPr/>
+        <p:nvPr/>
+      </p:nvGrpSpPr>
+      <p:grpSpPr>
+        <a:xfrm>
+          <a:off x="0" y="0"/>
+          <a:ext cx="0" cy="0"/>
+          <a:chOff x="0" y="0"/>
+          <a:chExt cx="0" cy="0"/>
+        </a:xfrm>
+      </p:grpSpPr>
+      <p:sp>
+        <p:nvSpPr>
+          <p:cNvPr id="2" name="Slide Image Placeholder 1"/>
+          <p:cNvSpPr>
+            <a:spLocks noGrp="1" noRot="1" noChangeAspect="1"/>
+          </p:cNvSpPr>
+          <p:nvPr>
+            <p:ph type="sldImg"/>
+          </p:nvPr>
+        </p:nvSpPr>
+        <p:spPr/>
+      </p:sp>
+      <p:sp>
+        <p:nvSpPr>
+          <p:cNvPr id="3" name="Notes Placeholder 2"/>
+          <p:cNvSpPr>
+            <a:spLocks noGrp="1"/>
+          </p:cNvSpPr>
+          <p:nvPr>
+            <p:ph type="body" idx="1"/>
+          </p:nvPr>
+        </p:nvSpPr>
+        <p:spPr/>
+        <p:txBody>
+          <a:bodyPr/>
+          <a:lstStyle/>
+          <a:p>
             <a:pPr marL="0" marR="0" lvl="0" indent="0" algn="l" defTabSz="914400" rtl="0" eaLnBrk="1" fontAlgn="auto" latinLnBrk="0" hangingPunct="1">
               <a:lnSpc>
                 <a:spcPct val="100000"/>
@@ -1332,6 +3565,32 @@
               <a:t>/1200501653</a:t>
             </a:r>
           </a:p>
+          <a:p>
+            <a:endParaRPr lang="en-US" dirty="0"/>
+          </a:p>
+          <a:p>
+            <a:r>
+              <a:rPr lang="en-US" dirty="0"/>
+              <a:t>http://</a:t>
+            </a:r>
+            <a:r>
+              <a:rPr lang="en-US" dirty="0" err="1"/>
+              <a:t>seqanswers.com</a:t>
+            </a:r>
+            <a:r>
+              <a:rPr lang="en-US" dirty="0"/>
+              <a:t>/forums/</a:t>
+            </a:r>
+            <a:r>
+              <a:rPr lang="en-US" dirty="0" err="1"/>
+              <a:t>showthread.php?t</a:t>
+            </a:r>
+            <a:r>
+              <a:rPr lang="en-US"/>
+              <a:t>=5591</a:t>
+            </a:r>
+            <a:endParaRPr lang="en-US" dirty="0"/>
+          </a:p>
         </p:txBody>
       </p:sp>
       <p:sp>
@@ -1351,7 +3610,7 @@
           <a:p>
             <a:fld id="{12573026-7AF8-9B4C-89E3-A4FB0E5697A1}" type="slidenum">
               <a:rPr lang="en-US" smtClean="0"/>
-              <a:t>15</a:t>
+              <a:t>17</a:t>
             </a:fld>
             <a:endParaRPr lang="en-US"/>
           </a:p>
@@ -1517,7 +3776,7 @@
           <a:p>
             <a:fld id="{ED78ABE4-71DA-EF42-9B6B-EF221EC5F264}" type="datetimeFigureOut">
               <a:rPr lang="en-US" smtClean="0"/>
-              <a:t>3/25/20</a:t>
+              <a:t>7/19/20</a:t>
             </a:fld>
             <a:endParaRPr lang="en-US"/>
           </a:p>
@@ -1715,7 +3974,7 @@
           <a:p>
             <a:fld id="{ED78ABE4-71DA-EF42-9B6B-EF221EC5F264}" type="datetimeFigureOut">
               <a:rPr lang="en-US" smtClean="0"/>
-              <a:t>3/25/20</a:t>
+              <a:t>7/19/20</a:t>
             </a:fld>
             <a:endParaRPr lang="en-US"/>
           </a:p>
@@ -1923,7 +4182,7 @@
           <a:p>
             <a:fld id="{ED78ABE4-71DA-EF42-9B6B-EF221EC5F264}" type="datetimeFigureOut">
               <a:rPr lang="en-US" smtClean="0"/>
-              <a:t>3/25/20</a:t>
+              <a:t>7/19/20</a:t>
             </a:fld>
             <a:endParaRPr lang="en-US"/>
           </a:p>
@@ -2676,7 +4935,7 @@
           <a:p>
             <a:fld id="{ED78ABE4-71DA-EF42-9B6B-EF221EC5F264}" type="datetimeFigureOut">
               <a:rPr lang="en-US" smtClean="0"/>
-              <a:t>3/25/20</a:t>
+              <a:t>7/19/20</a:t>
             </a:fld>
             <a:endParaRPr lang="en-US"/>
           </a:p>
@@ -2951,7 +5210,7 @@
           <a:p>
             <a:fld id="{ED78ABE4-71DA-EF42-9B6B-EF221EC5F264}" type="datetimeFigureOut">
               <a:rPr lang="en-US" smtClean="0"/>
-              <a:t>3/25/20</a:t>
+              <a:t>7/19/20</a:t>
             </a:fld>
             <a:endParaRPr lang="en-US"/>
           </a:p>
@@ -3216,7 +5475,7 @@
           <a:p>
             <a:fld id="{ED78ABE4-71DA-EF42-9B6B-EF221EC5F264}" type="datetimeFigureOut">
               <a:rPr lang="en-US" smtClean="0"/>
-              <a:t>3/25/20</a:t>
+              <a:t>7/19/20</a:t>
             </a:fld>
             <a:endParaRPr lang="en-US"/>
           </a:p>
@@ -3628,7 +5887,7 @@
           <a:p>
             <a:fld id="{ED78ABE4-71DA-EF42-9B6B-EF221EC5F264}" type="datetimeFigureOut">
               <a:rPr lang="en-US" smtClean="0"/>
-              <a:t>3/25/20</a:t>
+              <a:t>7/19/20</a:t>
             </a:fld>
             <a:endParaRPr lang="en-US"/>
           </a:p>
@@ -3769,7 +6028,7 @@
           <a:p>
             <a:fld id="{ED78ABE4-71DA-EF42-9B6B-EF221EC5F264}" type="datetimeFigureOut">
               <a:rPr lang="en-US" smtClean="0"/>
-              <a:t>3/25/20</a:t>
+              <a:t>7/19/20</a:t>
             </a:fld>
             <a:endParaRPr lang="en-US"/>
           </a:p>
@@ -3882,7 +6141,7 @@
           <a:p>
             <a:fld id="{ED78ABE4-71DA-EF42-9B6B-EF221EC5F264}" type="datetimeFigureOut">
               <a:rPr lang="en-US" smtClean="0"/>
-              <a:t>3/25/20</a:t>
+              <a:t>7/19/20</a:t>
             </a:fld>
             <a:endParaRPr lang="en-US"/>
           </a:p>
@@ -4193,7 +6452,7 @@
           <a:p>
             <a:fld id="{ED78ABE4-71DA-EF42-9B6B-EF221EC5F264}" type="datetimeFigureOut">
               <a:rPr lang="en-US" smtClean="0"/>
-              <a:t>3/25/20</a:t>
+              <a:t>7/19/20</a:t>
             </a:fld>
             <a:endParaRPr lang="en-US"/>
           </a:p>
@@ -4481,7 +6740,7 @@
           <a:p>
             <a:fld id="{ED78ABE4-71DA-EF42-9B6B-EF221EC5F264}" type="datetimeFigureOut">
               <a:rPr lang="en-US" smtClean="0"/>
-              <a:t>3/25/20</a:t>
+              <a:t>7/19/20</a:t>
             </a:fld>
             <a:endParaRPr lang="en-US"/>
           </a:p>
@@ -4722,7 +6981,7 @@
           <a:p>
             <a:fld id="{ED78ABE4-71DA-EF42-9B6B-EF221EC5F264}" type="datetimeFigureOut">
               <a:rPr lang="en-US" smtClean="0"/>
-              <a:t>3/25/20</a:t>
+              <a:t>7/19/20</a:t>
             </a:fld>
             <a:endParaRPr lang="en-US"/>
           </a:p>
@@ -5412,6 +7671,296 @@
 </file>
 
 <file path=ppt/slides/slide11.xml><?xml version="1.0" encoding="utf-8"?>
+<p:sld xmlns:a="http://schemas.openxmlformats.org/drawingml/2006/main" xmlns:r="http://schemas.openxmlformats.org/officeDocument/2006/relationships" xmlns:p="http://schemas.openxmlformats.org/presentationml/2006/main">
+  <p:cSld>
+    <p:spTree>
+      <p:nvGrpSpPr>
+        <p:cNvPr id="1" name=""/>
+        <p:cNvGrpSpPr/>
+        <p:nvPr/>
+      </p:nvGrpSpPr>
+      <p:grpSpPr>
+        <a:xfrm>
+          <a:off x="0" y="0"/>
+          <a:ext cx="0" cy="0"/>
+          <a:chOff x="0" y="0"/>
+          <a:chExt cx="0" cy="0"/>
+        </a:xfrm>
+      </p:grpSpPr>
+      <p:sp>
+        <p:nvSpPr>
+          <p:cNvPr id="2" name="Text Placeholder 1">
+            <a:extLst>
+              <a:ext uri="{FF2B5EF4-FFF2-40B4-BE49-F238E27FC236}">
+                <a16:creationId xmlns:a16="http://schemas.microsoft.com/office/drawing/2014/main" id="{2B4B7ADD-DACD-9A41-96FA-1A3B82DF2046}"/>
+              </a:ext>
+            </a:extLst>
+          </p:cNvPr>
+          <p:cNvSpPr>
+            <a:spLocks noGrp="1"/>
+          </p:cNvSpPr>
+          <p:nvPr>
+            <p:ph type="body" sz="quarter" idx="10"/>
+          </p:nvPr>
+        </p:nvSpPr>
+        <p:spPr>
+          <a:xfrm>
+            <a:off x="838200" y="1876484"/>
+            <a:ext cx="10515600" cy="4772076"/>
+          </a:xfrm>
+        </p:spPr>
+        <p:txBody>
+          <a:bodyPr/>
+          <a:lstStyle/>
+          <a:p>
+            <a:r>
+              <a:rPr lang="en-US" dirty="0" err="1"/>
+              <a:t>edgeR</a:t>
+            </a:r>
+            <a:r>
+              <a:rPr lang="en-US" dirty="0"/>
+              <a:t> utilizes a theoretical model that captures some of the known processes leading to noise in counts data. (null model)</a:t>
+            </a:r>
+          </a:p>
+          <a:p>
+            <a:endParaRPr lang="en-US" sz="300" dirty="0"/>
+          </a:p>
+          <a:p>
+            <a:r>
+              <a:rPr lang="en-US" dirty="0"/>
+              <a:t>Assume that the data is generated according to this model.</a:t>
+            </a:r>
+          </a:p>
+          <a:p>
+            <a:endParaRPr lang="en-US" sz="300" dirty="0"/>
+          </a:p>
+          <a:p>
+            <a:r>
+              <a:rPr lang="en-US" dirty="0"/>
+              <a:t>Given any observed level of difference in expression levels of a gene, compute the probability that the observation will result from the null model. (p value)</a:t>
+            </a:r>
+          </a:p>
+          <a:p>
+            <a:endParaRPr lang="en-US" sz="300" dirty="0"/>
+          </a:p>
+          <a:p>
+            <a:r>
+              <a:rPr lang="en-US" dirty="0"/>
+              <a:t>If the probability is very low (e.g., p &lt; 0.05), infer that something may be happening that we did not account for in the null model. (e.g., biological processes in L cells for milk production)</a:t>
+            </a:r>
+          </a:p>
+        </p:txBody>
+      </p:sp>
+      <p:sp>
+        <p:nvSpPr>
+          <p:cNvPr id="3" name="Title 2">
+            <a:extLst>
+              <a:ext uri="{FF2B5EF4-FFF2-40B4-BE49-F238E27FC236}">
+                <a16:creationId xmlns:a16="http://schemas.microsoft.com/office/drawing/2014/main" id="{DF235657-6594-FC41-A7D7-F5C715236767}"/>
+              </a:ext>
+            </a:extLst>
+          </p:cNvPr>
+          <p:cNvSpPr>
+            <a:spLocks noGrp="1"/>
+          </p:cNvSpPr>
+          <p:nvPr>
+            <p:ph type="title"/>
+          </p:nvPr>
+        </p:nvSpPr>
+        <p:spPr/>
+        <p:txBody>
+          <a:bodyPr/>
+          <a:lstStyle/>
+          <a:p>
+            <a:r>
+              <a:rPr lang="en-US" dirty="0"/>
+              <a:t>Approach to identify DE genes:</a:t>
+            </a:r>
+          </a:p>
+        </p:txBody>
+      </p:sp>
+    </p:spTree>
+    <p:extLst>
+      <p:ext uri="{BB962C8B-B14F-4D97-AF65-F5344CB8AC3E}">
+        <p14:creationId xmlns:p14="http://schemas.microsoft.com/office/powerpoint/2010/main" val="1640265366"/>
+      </p:ext>
+    </p:extLst>
+  </p:cSld>
+  <p:clrMapOvr>
+    <a:masterClrMapping/>
+  </p:clrMapOvr>
+</p:sld>
+</file>
+
+<file path=ppt/slides/slide12.xml><?xml version="1.0" encoding="utf-8"?>
+<p:sld xmlns:a="http://schemas.openxmlformats.org/drawingml/2006/main" xmlns:r="http://schemas.openxmlformats.org/officeDocument/2006/relationships" xmlns:p="http://schemas.openxmlformats.org/presentationml/2006/main">
+  <p:cSld>
+    <p:spTree>
+      <p:nvGrpSpPr>
+        <p:cNvPr id="1" name=""/>
+        <p:cNvGrpSpPr/>
+        <p:nvPr/>
+      </p:nvGrpSpPr>
+      <p:grpSpPr>
+        <a:xfrm>
+          <a:off x="0" y="0"/>
+          <a:ext cx="0" cy="0"/>
+          <a:chOff x="0" y="0"/>
+          <a:chExt cx="0" cy="0"/>
+        </a:xfrm>
+      </p:grpSpPr>
+      <p:sp>
+        <p:nvSpPr>
+          <p:cNvPr id="2" name="Text Placeholder 1">
+            <a:extLst>
+              <a:ext uri="{FF2B5EF4-FFF2-40B4-BE49-F238E27FC236}">
+                <a16:creationId xmlns:a16="http://schemas.microsoft.com/office/drawing/2014/main" id="{B6A3DDBE-2995-2146-9550-6B3A9484B1F2}"/>
+              </a:ext>
+            </a:extLst>
+          </p:cNvPr>
+          <p:cNvSpPr>
+            <a:spLocks noGrp="1"/>
+          </p:cNvSpPr>
+          <p:nvPr>
+            <p:ph type="body" sz="quarter" idx="10"/>
+          </p:nvPr>
+        </p:nvSpPr>
+        <p:spPr>
+          <a:xfrm>
+            <a:off x="838200" y="1767997"/>
+            <a:ext cx="10515600" cy="5447645"/>
+          </a:xfrm>
+        </p:spPr>
+        <p:txBody>
+          <a:bodyPr/>
+          <a:lstStyle/>
+          <a:p>
+            <a:r>
+              <a:rPr lang="en-US" dirty="0"/>
+              <a:t>P value represents the chance that we may be wrong in calling something significantly differential. Example:</a:t>
+            </a:r>
+          </a:p>
+          <a:p>
+            <a:pPr lvl="1"/>
+            <a:r>
+              <a:rPr lang="en-US" sz="2000" dirty="0"/>
+              <a:t>P = 0.01 means 1% chance that we may be wrong.</a:t>
+            </a:r>
+          </a:p>
+          <a:p>
+            <a:pPr lvl="1"/>
+            <a:r>
+              <a:rPr lang="en-US" sz="2000" dirty="0"/>
+              <a:t>P = 0.50 means 50% chance that we may be wrong.</a:t>
+            </a:r>
+          </a:p>
+          <a:p>
+            <a:endParaRPr lang="en-US" sz="300" dirty="0"/>
+          </a:p>
+          <a:p>
+            <a:r>
+              <a:rPr lang="en-US" dirty="0"/>
+              <a:t>More than 20k genes under consideration</a:t>
+            </a:r>
+          </a:p>
+          <a:p>
+            <a:pPr marL="0" indent="0">
+              <a:buNone/>
+            </a:pPr>
+            <a:r>
+              <a:rPr lang="en-US" dirty="0"/>
+              <a:t>     </a:t>
+            </a:r>
+            <a:r>
+              <a:rPr lang="en-US" sz="2000" dirty="0"/>
+              <a:t>=&gt; if a certain difference in expression levels has only 1% chance of happening given the null model, it might be observed for 200 genes even if the null model were true for all the genes.</a:t>
+            </a:r>
+          </a:p>
+          <a:p>
+            <a:pPr marL="0" indent="0">
+              <a:buNone/>
+            </a:pPr>
+            <a:r>
+              <a:rPr lang="en-US" sz="2000" dirty="0"/>
+              <a:t>       =&gt; 200+ false positives</a:t>
+            </a:r>
+          </a:p>
+          <a:p>
+            <a:pPr marL="0" indent="0">
+              <a:buNone/>
+            </a:pPr>
+            <a:endParaRPr lang="en-US" sz="300" dirty="0"/>
+          </a:p>
+          <a:p>
+            <a:r>
+              <a:rPr lang="en-US" sz="2400" dirty="0"/>
+              <a:t>Hence, there is a need to adjust the p-values.</a:t>
+            </a:r>
+          </a:p>
+          <a:p>
+            <a:pPr lvl="1"/>
+            <a:r>
+              <a:rPr lang="en-US" sz="2000" dirty="0"/>
+              <a:t>The more genes we test, the more we must adjust.</a:t>
+            </a:r>
+          </a:p>
+          <a:p>
+            <a:pPr lvl="1"/>
+            <a:r>
+              <a:rPr lang="en-US" sz="2000" dirty="0"/>
+              <a:t>Reduce the number of tests by filtering out “uninteresting” genes. </a:t>
+            </a:r>
+          </a:p>
+          <a:p>
+            <a:pPr marL="0" indent="0">
+              <a:buNone/>
+            </a:pPr>
+            <a:endParaRPr lang="en-US" dirty="0"/>
+          </a:p>
+        </p:txBody>
+      </p:sp>
+      <p:sp>
+        <p:nvSpPr>
+          <p:cNvPr id="3" name="Title 2">
+            <a:extLst>
+              <a:ext uri="{FF2B5EF4-FFF2-40B4-BE49-F238E27FC236}">
+                <a16:creationId xmlns:a16="http://schemas.microsoft.com/office/drawing/2014/main" id="{B4A4239D-159D-F246-BC44-BF03DB023746}"/>
+              </a:ext>
+            </a:extLst>
+          </p:cNvPr>
+          <p:cNvSpPr>
+            <a:spLocks noGrp="1"/>
+          </p:cNvSpPr>
+          <p:nvPr>
+            <p:ph type="title"/>
+          </p:nvPr>
+        </p:nvSpPr>
+        <p:spPr/>
+        <p:txBody>
+          <a:bodyPr/>
+          <a:lstStyle/>
+          <a:p>
+            <a:r>
+              <a:rPr lang="en-US" dirty="0"/>
+              <a:t>Need to correct for multiple testing</a:t>
+            </a:r>
+          </a:p>
+        </p:txBody>
+      </p:sp>
+    </p:spTree>
+    <p:extLst>
+      <p:ext uri="{BB962C8B-B14F-4D97-AF65-F5344CB8AC3E}">
+        <p14:creationId xmlns:p14="http://schemas.microsoft.com/office/powerpoint/2010/main" val="1972339051"/>
+      </p:ext>
+    </p:extLst>
+  </p:cSld>
+  <p:clrMapOvr>
+    <a:masterClrMapping/>
+  </p:clrMapOvr>
+</p:sld>
+</file>
+
+<file path=ppt/slides/slide13.xml><?xml version="1.0" encoding="utf-8"?>
 <p:sld xmlns:a="http://schemas.openxmlformats.org/drawingml/2006/main" xmlns:r="http://schemas.openxmlformats.org/officeDocument/2006/relationships" xmlns:p="http://schemas.openxmlformats.org/presentationml/2006/main">
   <p:cSld>
     <p:spTree>
@@ -6532,7 +9081,7 @@
 </p:sld>
 </file>
 
-<file path=ppt/slides/slide12.xml><?xml version="1.0" encoding="utf-8"?>
+<file path=ppt/slides/slide14.xml><?xml version="1.0" encoding="utf-8"?>
 <p:sld xmlns:a="http://schemas.openxmlformats.org/drawingml/2006/main" xmlns:r="http://schemas.openxmlformats.org/officeDocument/2006/relationships" xmlns:p="http://schemas.openxmlformats.org/presentationml/2006/main">
   <p:cSld>
     <p:spTree>
@@ -6899,7 +9448,7 @@
 </p:sld>
 </file>
 
-<file path=ppt/slides/slide13.xml><?xml version="1.0" encoding="utf-8"?>
+<file path=ppt/slides/slide15.xml><?xml version="1.0" encoding="utf-8"?>
 <p:sld xmlns:a="http://schemas.openxmlformats.org/drawingml/2006/main" xmlns:r="http://schemas.openxmlformats.org/officeDocument/2006/relationships" xmlns:p="http://schemas.openxmlformats.org/presentationml/2006/main">
   <p:cSld>
     <p:spTree>
@@ -7089,7 +9638,7 @@
                 <a:ext cx="10515600" cy="4396588"/>
               </a:xfrm>
               <a:blipFill>
-                <a:blip r:embed="rId2"/>
+                <a:blip r:embed="rId3"/>
                 <a:stretch>
                   <a:fillRect t="-3458" r="-724"/>
                 </a:stretch>
@@ -7142,278 +9691,6 @@
     <p:extLst>
       <p:ext uri="{BB962C8B-B14F-4D97-AF65-F5344CB8AC3E}">
         <p14:creationId xmlns:p14="http://schemas.microsoft.com/office/powerpoint/2010/main" val="1029115087"/>
-      </p:ext>
-    </p:extLst>
-  </p:cSld>
-  <p:clrMapOvr>
-    <a:masterClrMapping/>
-  </p:clrMapOvr>
-</p:sld>
-</file>
-
-<file path=ppt/slides/slide14.xml><?xml version="1.0" encoding="utf-8"?>
-<p:sld xmlns:a="http://schemas.openxmlformats.org/drawingml/2006/main" xmlns:r="http://schemas.openxmlformats.org/officeDocument/2006/relationships" xmlns:p="http://schemas.openxmlformats.org/presentationml/2006/main">
-  <p:cSld>
-    <p:spTree>
-      <p:nvGrpSpPr>
-        <p:cNvPr id="1" name=""/>
-        <p:cNvGrpSpPr/>
-        <p:nvPr/>
-      </p:nvGrpSpPr>
-      <p:grpSpPr>
-        <a:xfrm>
-          <a:off x="0" y="0"/>
-          <a:ext cx="0" cy="0"/>
-          <a:chOff x="0" y="0"/>
-          <a:chExt cx="0" cy="0"/>
-        </a:xfrm>
-      </p:grpSpPr>
-      <p:sp>
-        <p:nvSpPr>
-          <p:cNvPr id="2" name="Text Placeholder 1">
-            <a:extLst>
-              <a:ext uri="{FF2B5EF4-FFF2-40B4-BE49-F238E27FC236}">
-                <a16:creationId xmlns:a16="http://schemas.microsoft.com/office/drawing/2014/main" id="{4D069B29-891B-BE48-B724-2D48F20D3F0C}"/>
-              </a:ext>
-            </a:extLst>
-          </p:cNvPr>
-          <p:cNvSpPr>
-            <a:spLocks noGrp="1"/>
-          </p:cNvSpPr>
-          <p:nvPr>
-            <p:ph type="body" sz="quarter" idx="10"/>
-          </p:nvPr>
-        </p:nvSpPr>
-        <p:spPr>
-          <a:xfrm>
-            <a:off x="838200" y="1876483"/>
-            <a:ext cx="10515600" cy="4592026"/>
-          </a:xfrm>
-        </p:spPr>
-        <p:txBody>
-          <a:bodyPr/>
-          <a:lstStyle/>
-          <a:p>
-            <a:r>
-              <a:rPr lang="en-US" dirty="0"/>
-              <a:t>RLE approach by Anders and Huber (2010)</a:t>
-            </a:r>
-          </a:p>
-          <a:p>
-            <a:pPr lvl="1"/>
-            <a:r>
-              <a:rPr lang="en-US" dirty="0"/>
-              <a:t>Reference: geometric mean of all samples</a:t>
-            </a:r>
-          </a:p>
-          <a:p>
-            <a:pPr lvl="1"/>
-            <a:r>
-              <a:rPr lang="en-US" dirty="0"/>
-              <a:t>Normalization factor: median ratio of each sample to the reference</a:t>
-            </a:r>
-          </a:p>
-          <a:p>
-            <a:pPr lvl="1"/>
-            <a:r>
-              <a:rPr lang="en-US" dirty="0"/>
-              <a:t>Identical to TMM approach</a:t>
-            </a:r>
-          </a:p>
-          <a:p>
-            <a:pPr lvl="1"/>
-            <a:r>
-              <a:rPr lang="en-US" dirty="0"/>
-              <a:t>See link in description for complete reference</a:t>
-            </a:r>
-          </a:p>
-          <a:p>
-            <a:pPr lvl="1"/>
-            <a:endParaRPr lang="en-US" dirty="0"/>
-          </a:p>
-          <a:p>
-            <a:r>
-              <a:rPr lang="en-US" dirty="0"/>
-              <a:t>Upper quartile normalization by Bullard et al (2010)</a:t>
-            </a:r>
-          </a:p>
-          <a:p>
-            <a:pPr lvl="1"/>
-            <a:r>
-              <a:rPr lang="en-US" dirty="0"/>
-              <a:t>Normalization factor: 75% quantile of the counts for each sample</a:t>
-            </a:r>
-          </a:p>
-          <a:p>
-            <a:pPr lvl="1"/>
-            <a:r>
-              <a:rPr lang="en-US" dirty="0"/>
-              <a:t>Not recommended in general</a:t>
-            </a:r>
-          </a:p>
-          <a:p>
-            <a:pPr lvl="1"/>
-            <a:r>
-              <a:rPr lang="en-US"/>
-              <a:t>See link in description for complete reference</a:t>
-            </a:r>
-            <a:endParaRPr lang="en-US" dirty="0"/>
-          </a:p>
-          <a:p>
-            <a:endParaRPr lang="en-US" dirty="0"/>
-          </a:p>
-        </p:txBody>
-      </p:sp>
-      <p:sp>
-        <p:nvSpPr>
-          <p:cNvPr id="3" name="Title 2">
-            <a:extLst>
-              <a:ext uri="{FF2B5EF4-FFF2-40B4-BE49-F238E27FC236}">
-                <a16:creationId xmlns:a16="http://schemas.microsoft.com/office/drawing/2014/main" id="{78F90BBE-48F1-0B40-AA05-BB7E9451A6B5}"/>
-              </a:ext>
-            </a:extLst>
-          </p:cNvPr>
-          <p:cNvSpPr>
-            <a:spLocks noGrp="1"/>
-          </p:cNvSpPr>
-          <p:nvPr>
-            <p:ph type="title"/>
-          </p:nvPr>
-        </p:nvSpPr>
-        <p:spPr/>
-        <p:txBody>
-          <a:bodyPr/>
-          <a:lstStyle/>
-          <a:p>
-            <a:r>
-              <a:rPr lang="en-US" dirty="0"/>
-              <a:t>Other approaches to normalization</a:t>
-            </a:r>
-          </a:p>
-        </p:txBody>
-      </p:sp>
-    </p:spTree>
-    <p:extLst>
-      <p:ext uri="{BB962C8B-B14F-4D97-AF65-F5344CB8AC3E}">
-        <p14:creationId xmlns:p14="http://schemas.microsoft.com/office/powerpoint/2010/main" val="4055911197"/>
-      </p:ext>
-    </p:extLst>
-  </p:cSld>
-  <p:clrMapOvr>
-    <a:masterClrMapping/>
-  </p:clrMapOvr>
-</p:sld>
-</file>
-
-<file path=ppt/slides/slide15.xml><?xml version="1.0" encoding="utf-8"?>
-<p:sld xmlns:a="http://schemas.openxmlformats.org/drawingml/2006/main" xmlns:r="http://schemas.openxmlformats.org/officeDocument/2006/relationships" xmlns:p="http://schemas.openxmlformats.org/presentationml/2006/main">
-  <p:cSld>
-    <p:spTree>
-      <p:nvGrpSpPr>
-        <p:cNvPr id="1" name=""/>
-        <p:cNvGrpSpPr/>
-        <p:nvPr/>
-      </p:nvGrpSpPr>
-      <p:grpSpPr>
-        <a:xfrm>
-          <a:off x="0" y="0"/>
-          <a:ext cx="0" cy="0"/>
-          <a:chOff x="0" y="0"/>
-          <a:chExt cx="0" cy="0"/>
-        </a:xfrm>
-      </p:grpSpPr>
-      <p:sp>
-        <p:nvSpPr>
-          <p:cNvPr id="2" name="Text Placeholder 1">
-            <a:extLst>
-              <a:ext uri="{FF2B5EF4-FFF2-40B4-BE49-F238E27FC236}">
-                <a16:creationId xmlns:a16="http://schemas.microsoft.com/office/drawing/2014/main" id="{7B05D9FF-081C-1D4A-9610-36CF7A529C72}"/>
-              </a:ext>
-            </a:extLst>
-          </p:cNvPr>
-          <p:cNvSpPr>
-            <a:spLocks noGrp="1"/>
-          </p:cNvSpPr>
-          <p:nvPr>
-            <p:ph type="body" sz="quarter" idx="10"/>
-          </p:nvPr>
-        </p:nvSpPr>
-        <p:spPr>
-          <a:xfrm>
-            <a:off x="838200" y="1876483"/>
-            <a:ext cx="10515600" cy="2583271"/>
-          </a:xfrm>
-        </p:spPr>
-        <p:txBody>
-          <a:bodyPr/>
-          <a:lstStyle/>
-          <a:p>
-            <a:r>
-              <a:rPr lang="en-US" dirty="0"/>
-              <a:t>For an intuitive explanation by Bradley </a:t>
-            </a:r>
-            <a:r>
-              <a:rPr lang="en-US" dirty="0" err="1"/>
-              <a:t>Efron</a:t>
-            </a:r>
-            <a:r>
-              <a:rPr lang="en-US" dirty="0"/>
-              <a:t>, see link in description</a:t>
-            </a:r>
-          </a:p>
-          <a:p>
-            <a:endParaRPr lang="en-US" dirty="0"/>
-          </a:p>
-          <a:p>
-            <a:r>
-              <a:rPr lang="en-US" dirty="0"/>
-              <a:t>Original paper: Robbins, Herbert. </a:t>
-            </a:r>
-            <a:r>
-              <a:rPr lang="en-US" i="1" dirty="0"/>
-              <a:t>An Empirical Bayes Approach to Statistics.</a:t>
-            </a:r>
-            <a:r>
-              <a:rPr lang="en-US" dirty="0"/>
-              <a:t> (see description for complete reference)</a:t>
-            </a:r>
-          </a:p>
-        </p:txBody>
-      </p:sp>
-      <p:sp>
-        <p:nvSpPr>
-          <p:cNvPr id="3" name="Title 2">
-            <a:extLst>
-              <a:ext uri="{FF2B5EF4-FFF2-40B4-BE49-F238E27FC236}">
-                <a16:creationId xmlns:a16="http://schemas.microsoft.com/office/drawing/2014/main" id="{E1C335AD-367B-9440-BC1E-B6CD4993EE4B}"/>
-              </a:ext>
-            </a:extLst>
-          </p:cNvPr>
-          <p:cNvSpPr>
-            <a:spLocks noGrp="1"/>
-          </p:cNvSpPr>
-          <p:nvPr>
-            <p:ph type="title"/>
-          </p:nvPr>
-        </p:nvSpPr>
-        <p:spPr/>
-        <p:txBody>
-          <a:bodyPr>
-            <a:normAutofit/>
-          </a:bodyPr>
-          <a:lstStyle/>
-          <a:p>
-            <a:r>
-              <a:rPr lang="en-US" sz="3200" dirty="0"/>
-              <a:t>Empirical Bayes estimates of dispersion parameters: Learning from the experience of others</a:t>
-            </a:r>
-          </a:p>
-        </p:txBody>
-      </p:sp>
-    </p:spTree>
-    <p:extLst>
-      <p:ext uri="{BB962C8B-B14F-4D97-AF65-F5344CB8AC3E}">
-        <p14:creationId xmlns:p14="http://schemas.microsoft.com/office/powerpoint/2010/main" val="3900548909"/>
       </p:ext>
     </p:extLst>
   </p:cSld>
@@ -7442,6 +9719,278 @@
       </p:grpSpPr>
       <p:sp>
         <p:nvSpPr>
+          <p:cNvPr id="2" name="Text Placeholder 1">
+            <a:extLst>
+              <a:ext uri="{FF2B5EF4-FFF2-40B4-BE49-F238E27FC236}">
+                <a16:creationId xmlns:a16="http://schemas.microsoft.com/office/drawing/2014/main" id="{4D069B29-891B-BE48-B724-2D48F20D3F0C}"/>
+              </a:ext>
+            </a:extLst>
+          </p:cNvPr>
+          <p:cNvSpPr>
+            <a:spLocks noGrp="1"/>
+          </p:cNvSpPr>
+          <p:nvPr>
+            <p:ph type="body" sz="quarter" idx="10"/>
+          </p:nvPr>
+        </p:nvSpPr>
+        <p:spPr>
+          <a:xfrm>
+            <a:off x="838200" y="1876483"/>
+            <a:ext cx="10515600" cy="4592026"/>
+          </a:xfrm>
+        </p:spPr>
+        <p:txBody>
+          <a:bodyPr/>
+          <a:lstStyle/>
+          <a:p>
+            <a:r>
+              <a:rPr lang="en-US" dirty="0"/>
+              <a:t>RLE approach by Anders and Huber (2010)</a:t>
+            </a:r>
+          </a:p>
+          <a:p>
+            <a:pPr lvl="1"/>
+            <a:r>
+              <a:rPr lang="en-US" dirty="0"/>
+              <a:t>Reference: geometric mean of all samples</a:t>
+            </a:r>
+          </a:p>
+          <a:p>
+            <a:pPr lvl="1"/>
+            <a:r>
+              <a:rPr lang="en-US" dirty="0"/>
+              <a:t>Normalization factor: median ratio of each sample to the reference</a:t>
+            </a:r>
+          </a:p>
+          <a:p>
+            <a:pPr lvl="1"/>
+            <a:r>
+              <a:rPr lang="en-US" dirty="0"/>
+              <a:t>Identical to TMM approach</a:t>
+            </a:r>
+          </a:p>
+          <a:p>
+            <a:pPr lvl="1"/>
+            <a:r>
+              <a:rPr lang="en-US" dirty="0"/>
+              <a:t>See link in description for complete reference</a:t>
+            </a:r>
+          </a:p>
+          <a:p>
+            <a:pPr lvl="1"/>
+            <a:endParaRPr lang="en-US" dirty="0"/>
+          </a:p>
+          <a:p>
+            <a:r>
+              <a:rPr lang="en-US" dirty="0"/>
+              <a:t>Upper quartile normalization by Bullard et al (2010)</a:t>
+            </a:r>
+          </a:p>
+          <a:p>
+            <a:pPr lvl="1"/>
+            <a:r>
+              <a:rPr lang="en-US" dirty="0"/>
+              <a:t>Normalization factor: 75% quantile of the counts for each sample</a:t>
+            </a:r>
+          </a:p>
+          <a:p>
+            <a:pPr lvl="1"/>
+            <a:r>
+              <a:rPr lang="en-US" dirty="0"/>
+              <a:t>Not recommended in general</a:t>
+            </a:r>
+          </a:p>
+          <a:p>
+            <a:pPr lvl="1"/>
+            <a:r>
+              <a:rPr lang="en-US"/>
+              <a:t>See link in description for complete reference</a:t>
+            </a:r>
+            <a:endParaRPr lang="en-US" dirty="0"/>
+          </a:p>
+          <a:p>
+            <a:endParaRPr lang="en-US" dirty="0"/>
+          </a:p>
+        </p:txBody>
+      </p:sp>
+      <p:sp>
+        <p:nvSpPr>
+          <p:cNvPr id="3" name="Title 2">
+            <a:extLst>
+              <a:ext uri="{FF2B5EF4-FFF2-40B4-BE49-F238E27FC236}">
+                <a16:creationId xmlns:a16="http://schemas.microsoft.com/office/drawing/2014/main" id="{78F90BBE-48F1-0B40-AA05-BB7E9451A6B5}"/>
+              </a:ext>
+            </a:extLst>
+          </p:cNvPr>
+          <p:cNvSpPr>
+            <a:spLocks noGrp="1"/>
+          </p:cNvSpPr>
+          <p:nvPr>
+            <p:ph type="title"/>
+          </p:nvPr>
+        </p:nvSpPr>
+        <p:spPr/>
+        <p:txBody>
+          <a:bodyPr/>
+          <a:lstStyle/>
+          <a:p>
+            <a:r>
+              <a:rPr lang="en-US" dirty="0"/>
+              <a:t>Other approaches to normalization</a:t>
+            </a:r>
+          </a:p>
+        </p:txBody>
+      </p:sp>
+    </p:spTree>
+    <p:extLst>
+      <p:ext uri="{BB962C8B-B14F-4D97-AF65-F5344CB8AC3E}">
+        <p14:creationId xmlns:p14="http://schemas.microsoft.com/office/powerpoint/2010/main" val="4055911197"/>
+      </p:ext>
+    </p:extLst>
+  </p:cSld>
+  <p:clrMapOvr>
+    <a:masterClrMapping/>
+  </p:clrMapOvr>
+</p:sld>
+</file>
+
+<file path=ppt/slides/slide17.xml><?xml version="1.0" encoding="utf-8"?>
+<p:sld xmlns:a="http://schemas.openxmlformats.org/drawingml/2006/main" xmlns:r="http://schemas.openxmlformats.org/officeDocument/2006/relationships" xmlns:p="http://schemas.openxmlformats.org/presentationml/2006/main">
+  <p:cSld>
+    <p:spTree>
+      <p:nvGrpSpPr>
+        <p:cNvPr id="1" name=""/>
+        <p:cNvGrpSpPr/>
+        <p:nvPr/>
+      </p:nvGrpSpPr>
+      <p:grpSpPr>
+        <a:xfrm>
+          <a:off x="0" y="0"/>
+          <a:ext cx="0" cy="0"/>
+          <a:chOff x="0" y="0"/>
+          <a:chExt cx="0" cy="0"/>
+        </a:xfrm>
+      </p:grpSpPr>
+      <p:sp>
+        <p:nvSpPr>
+          <p:cNvPr id="2" name="Text Placeholder 1">
+            <a:extLst>
+              <a:ext uri="{FF2B5EF4-FFF2-40B4-BE49-F238E27FC236}">
+                <a16:creationId xmlns:a16="http://schemas.microsoft.com/office/drawing/2014/main" id="{7B05D9FF-081C-1D4A-9610-36CF7A529C72}"/>
+              </a:ext>
+            </a:extLst>
+          </p:cNvPr>
+          <p:cNvSpPr>
+            <a:spLocks noGrp="1"/>
+          </p:cNvSpPr>
+          <p:nvPr>
+            <p:ph type="body" sz="quarter" idx="10"/>
+          </p:nvPr>
+        </p:nvSpPr>
+        <p:spPr>
+          <a:xfrm>
+            <a:off x="838200" y="1876483"/>
+            <a:ext cx="10515600" cy="2583271"/>
+          </a:xfrm>
+        </p:spPr>
+        <p:txBody>
+          <a:bodyPr/>
+          <a:lstStyle/>
+          <a:p>
+            <a:r>
+              <a:rPr lang="en-US" dirty="0"/>
+              <a:t>For an intuitive explanation by Bradley </a:t>
+            </a:r>
+            <a:r>
+              <a:rPr lang="en-US" dirty="0" err="1"/>
+              <a:t>Efron</a:t>
+            </a:r>
+            <a:r>
+              <a:rPr lang="en-US" dirty="0"/>
+              <a:t>, see link in description</a:t>
+            </a:r>
+          </a:p>
+          <a:p>
+            <a:endParaRPr lang="en-US" dirty="0"/>
+          </a:p>
+          <a:p>
+            <a:r>
+              <a:rPr lang="en-US" dirty="0"/>
+              <a:t>Original paper: Robbins, Herbert. </a:t>
+            </a:r>
+            <a:r>
+              <a:rPr lang="en-US" i="1" dirty="0"/>
+              <a:t>An Empirical Bayes Approach to Statistics.</a:t>
+            </a:r>
+            <a:r>
+              <a:rPr lang="en-US" dirty="0"/>
+              <a:t> (see description for complete reference)</a:t>
+            </a:r>
+          </a:p>
+        </p:txBody>
+      </p:sp>
+      <p:sp>
+        <p:nvSpPr>
+          <p:cNvPr id="3" name="Title 2">
+            <a:extLst>
+              <a:ext uri="{FF2B5EF4-FFF2-40B4-BE49-F238E27FC236}">
+                <a16:creationId xmlns:a16="http://schemas.microsoft.com/office/drawing/2014/main" id="{E1C335AD-367B-9440-BC1E-B6CD4993EE4B}"/>
+              </a:ext>
+            </a:extLst>
+          </p:cNvPr>
+          <p:cNvSpPr>
+            <a:spLocks noGrp="1"/>
+          </p:cNvSpPr>
+          <p:nvPr>
+            <p:ph type="title"/>
+          </p:nvPr>
+        </p:nvSpPr>
+        <p:spPr/>
+        <p:txBody>
+          <a:bodyPr>
+            <a:normAutofit/>
+          </a:bodyPr>
+          <a:lstStyle/>
+          <a:p>
+            <a:r>
+              <a:rPr lang="en-US" sz="3200" dirty="0"/>
+              <a:t>Empirical Bayes estimates of dispersion parameters: Learning from the experience of others</a:t>
+            </a:r>
+          </a:p>
+        </p:txBody>
+      </p:sp>
+    </p:spTree>
+    <p:extLst>
+      <p:ext uri="{BB962C8B-B14F-4D97-AF65-F5344CB8AC3E}">
+        <p14:creationId xmlns:p14="http://schemas.microsoft.com/office/powerpoint/2010/main" val="3900548909"/>
+      </p:ext>
+    </p:extLst>
+  </p:cSld>
+  <p:clrMapOvr>
+    <a:masterClrMapping/>
+  </p:clrMapOvr>
+</p:sld>
+</file>
+
+<file path=ppt/slides/slide18.xml><?xml version="1.0" encoding="utf-8"?>
+<p:sld xmlns:a="http://schemas.openxmlformats.org/drawingml/2006/main" xmlns:r="http://schemas.openxmlformats.org/officeDocument/2006/relationships" xmlns:p="http://schemas.openxmlformats.org/presentationml/2006/main">
+  <p:cSld>
+    <p:spTree>
+      <p:nvGrpSpPr>
+        <p:cNvPr id="1" name=""/>
+        <p:cNvGrpSpPr/>
+        <p:nvPr/>
+      </p:nvGrpSpPr>
+      <p:grpSpPr>
+        <a:xfrm>
+          <a:off x="0" y="0"/>
+          <a:ext cx="0" cy="0"/>
+          <a:chOff x="0" y="0"/>
+          <a:chExt cx="0" cy="0"/>
+        </a:xfrm>
+      </p:grpSpPr>
+      <p:sp>
+        <p:nvSpPr>
           <p:cNvPr id="6" name="Text Placeholder 5">
             <a:extLst>
               <a:ext uri="{FF2B5EF4-FFF2-40B4-BE49-F238E27FC236}">
@@ -7479,8 +10028,12 @@
           </a:p>
           <a:p>
             <a:r>
+              <a:rPr lang="en-US"/>
+              <a:t>~3 </a:t>
+            </a:r>
+            <a:r>
               <a:rPr lang="en-US" dirty="0"/>
-              <a:t>~5 min.</a:t>
+              <a:t>min.</a:t>
             </a:r>
           </a:p>
         </p:txBody>
@@ -7526,7 +10079,7 @@
 </p:sld>
 </file>
 
-<file path=ppt/slides/slide17.xml><?xml version="1.0" encoding="utf-8"?>
+<file path=ppt/slides/slide19.xml><?xml version="1.0" encoding="utf-8"?>
 <p:sld xmlns:a="http://schemas.openxmlformats.org/drawingml/2006/main" xmlns:r="http://schemas.openxmlformats.org/officeDocument/2006/relationships" xmlns:p="http://schemas.openxmlformats.org/presentationml/2006/main">
   <p:cSld>
     <p:spTree>
@@ -8147,13 +10700,18 @@
               <a:buChar char="•"/>
             </a:pPr>
             <a:r>
-              <a:rPr lang="en-US" dirty="0">
+              <a:rPr lang="en-US">
                 <a:latin typeface="Helvetica" charset="0"/>
                 <a:ea typeface="Times New Roman" charset="0"/>
                 <a:cs typeface="Arial" charset="0"/>
               </a:rPr>
-              <a:t>Reading material in Dropbox:</a:t>
-            </a:r>
+              <a:t>Reading material:</a:t>
+            </a:r>
+            <a:endParaRPr lang="en-US" dirty="0">
+              <a:latin typeface="Helvetica" charset="0"/>
+              <a:ea typeface="Times New Roman" charset="0"/>
+              <a:cs typeface="Arial" charset="0"/>
+            </a:endParaRPr>
           </a:p>
           <a:p>
             <a:pPr>

</xml_diff>

<commit_message>
Minor updates to the slide deck and scripts
</commit_message>
<xml_diff>
--- a/intermediate-r-rna-seq/Intermediate_RNA-seq.pptx
+++ b/intermediate-r-rna-seq/Intermediate_RNA-seq.pptx
@@ -5,7 +5,7 @@
     <p:sldMasterId id="2147483648" r:id="rId1"/>
   </p:sldMasterIdLst>
   <p:notesMasterIdLst>
-    <p:notesMasterId r:id="rId21"/>
+    <p:notesMasterId r:id="rId26"/>
   </p:notesMasterIdLst>
   <p:sldIdLst>
     <p:sldId id="471" r:id="rId2"/>
@@ -13,8 +13,8 @@
     <p:sldId id="531" r:id="rId4"/>
     <p:sldId id="530" r:id="rId5"/>
     <p:sldId id="617" r:id="rId6"/>
-    <p:sldId id="643" r:id="rId7"/>
-    <p:sldId id="630" r:id="rId8"/>
+    <p:sldId id="630" r:id="rId7"/>
+    <p:sldId id="643" r:id="rId8"/>
     <p:sldId id="615" r:id="rId9"/>
     <p:sldId id="631" r:id="rId10"/>
     <p:sldId id="633" r:id="rId11"/>
@@ -24,9 +24,14 @@
     <p:sldId id="637" r:id="rId15"/>
     <p:sldId id="638" r:id="rId16"/>
     <p:sldId id="639" r:id="rId17"/>
-    <p:sldId id="642" r:id="rId18"/>
-    <p:sldId id="528" r:id="rId19"/>
-    <p:sldId id="645" r:id="rId20"/>
+    <p:sldId id="651" r:id="rId18"/>
+    <p:sldId id="648" r:id="rId19"/>
+    <p:sldId id="650" r:id="rId20"/>
+    <p:sldId id="652" r:id="rId21"/>
+    <p:sldId id="642" r:id="rId22"/>
+    <p:sldId id="653" r:id="rId23"/>
+    <p:sldId id="528" r:id="rId24"/>
+    <p:sldId id="645" r:id="rId25"/>
   </p:sldIdLst>
   <p:sldSz cx="12192000" cy="6858000"/>
   <p:notesSz cx="6858000" cy="9144000"/>
@@ -215,7 +220,7 @@
           <a:p>
             <a:fld id="{86774E32-DB12-6143-B5EF-64609B596D14}" type="datetimeFigureOut">
               <a:rPr lang="en-US" smtClean="0"/>
-              <a:t>7/19/20</a:t>
+              <a:t>7/21/20</a:t>
             </a:fld>
             <a:endParaRPr lang="en-US"/>
           </a:p>
@@ -567,6 +572,171 @@
 </p:notes>
 </file>
 
+<file path=ppt/notesSlides/notesSlide10.xml><?xml version="1.0" encoding="utf-8"?>
+<p:notes xmlns:a="http://schemas.openxmlformats.org/drawingml/2006/main" xmlns:r="http://schemas.openxmlformats.org/officeDocument/2006/relationships" xmlns:p="http://schemas.openxmlformats.org/presentationml/2006/main">
+  <p:cSld>
+    <p:spTree>
+      <p:nvGrpSpPr>
+        <p:cNvPr id="1" name=""/>
+        <p:cNvGrpSpPr/>
+        <p:nvPr/>
+      </p:nvGrpSpPr>
+      <p:grpSpPr>
+        <a:xfrm>
+          <a:off x="0" y="0"/>
+          <a:ext cx="0" cy="0"/>
+          <a:chOff x="0" y="0"/>
+          <a:chExt cx="0" cy="0"/>
+        </a:xfrm>
+      </p:grpSpPr>
+      <p:sp>
+        <p:nvSpPr>
+          <p:cNvPr id="2" name="Slide Image Placeholder 1"/>
+          <p:cNvSpPr>
+            <a:spLocks noGrp="1" noRot="1" noChangeAspect="1"/>
+          </p:cNvSpPr>
+          <p:nvPr>
+            <p:ph type="sldImg"/>
+          </p:nvPr>
+        </p:nvSpPr>
+        <p:spPr/>
+      </p:sp>
+      <p:sp>
+        <p:nvSpPr>
+          <p:cNvPr id="3" name="Notes Placeholder 2"/>
+          <p:cNvSpPr>
+            <a:spLocks noGrp="1"/>
+          </p:cNvSpPr>
+          <p:nvPr>
+            <p:ph type="body" idx="1"/>
+          </p:nvPr>
+        </p:nvSpPr>
+        <p:spPr/>
+        <p:txBody>
+          <a:bodyPr/>
+          <a:lstStyle/>
+          <a:p>
+            <a:pPr marL="0" marR="0" lvl="0" indent="0" algn="l" defTabSz="914400" rtl="0" eaLnBrk="1" fontAlgn="auto" latinLnBrk="0" hangingPunct="1">
+              <a:lnSpc>
+                <a:spcPct val="100000"/>
+              </a:lnSpc>
+              <a:spcBef>
+                <a:spcPts val="0"/>
+              </a:spcBef>
+              <a:spcAft>
+                <a:spcPts val="0"/>
+              </a:spcAft>
+              <a:buClrTx/>
+              <a:buSzTx/>
+              <a:buFontTx/>
+              <a:buNone/>
+              <a:tabLst/>
+              <a:defRPr/>
+            </a:pPr>
+            <a:r>
+              <a:rPr lang="en-US" dirty="0">
+                <a:hlinkClick r:id="rId3"/>
+              </a:rPr>
+              <a:t>https://smartech.gatech.edu/bitstream/handle/1853/35125/efron_videostream.html?sequence=8&amp;isAllowed=y</a:t>
+            </a:r>
+            <a:endParaRPr lang="en-US" dirty="0"/>
+          </a:p>
+          <a:p>
+            <a:endParaRPr lang="en-US" dirty="0"/>
+          </a:p>
+          <a:p>
+            <a:r>
+              <a:rPr lang="en-US" dirty="0"/>
+              <a:t>Robbins, Herbert. </a:t>
+            </a:r>
+            <a:r>
+              <a:rPr lang="en-US" i="1" dirty="0"/>
+              <a:t>An Empirical Bayes Approach to Statistics.</a:t>
+            </a:r>
+            <a:r>
+              <a:rPr lang="en-US" dirty="0"/>
+              <a:t> Proceedings of the Third Berkeley Symposium on Mathematical Statistics and Probability, Volume 1: Contributions to the Theory of Statistics, 157--163, University of California Press, Berkeley, Calif., 1956. https://</a:t>
+            </a:r>
+            <a:r>
+              <a:rPr lang="en-US" dirty="0" err="1"/>
+              <a:t>projecteuclid.org</a:t>
+            </a:r>
+            <a:r>
+              <a:rPr lang="en-US" dirty="0"/>
+              <a:t>/</a:t>
+            </a:r>
+            <a:r>
+              <a:rPr lang="en-US" dirty="0" err="1"/>
+              <a:t>euclid.bsmsp</a:t>
+            </a:r>
+            <a:r>
+              <a:rPr lang="en-US" dirty="0"/>
+              <a:t>/1200501653</a:t>
+            </a:r>
+          </a:p>
+          <a:p>
+            <a:endParaRPr lang="en-US" dirty="0"/>
+          </a:p>
+          <a:p>
+            <a:r>
+              <a:rPr lang="en-US" dirty="0"/>
+              <a:t>http://</a:t>
+            </a:r>
+            <a:r>
+              <a:rPr lang="en-US" dirty="0" err="1"/>
+              <a:t>seqanswers.com</a:t>
+            </a:r>
+            <a:r>
+              <a:rPr lang="en-US" dirty="0"/>
+              <a:t>/forums/</a:t>
+            </a:r>
+            <a:r>
+              <a:rPr lang="en-US" dirty="0" err="1"/>
+              <a:t>showthread.php?t</a:t>
+            </a:r>
+            <a:r>
+              <a:rPr lang="en-US" dirty="0"/>
+              <a:t>=5591</a:t>
+            </a:r>
+          </a:p>
+        </p:txBody>
+      </p:sp>
+      <p:sp>
+        <p:nvSpPr>
+          <p:cNvPr id="4" name="Slide Number Placeholder 3"/>
+          <p:cNvSpPr>
+            <a:spLocks noGrp="1"/>
+          </p:cNvSpPr>
+          <p:nvPr>
+            <p:ph type="sldNum" sz="quarter" idx="5"/>
+          </p:nvPr>
+        </p:nvSpPr>
+        <p:spPr/>
+        <p:txBody>
+          <a:bodyPr/>
+          <a:lstStyle/>
+          <a:p>
+            <a:fld id="{12573026-7AF8-9B4C-89E3-A4FB0E5697A1}" type="slidenum">
+              <a:rPr lang="en-US" smtClean="0"/>
+              <a:t>21</a:t>
+            </a:fld>
+            <a:endParaRPr lang="en-US"/>
+          </a:p>
+        </p:txBody>
+      </p:sp>
+    </p:spTree>
+    <p:extLst>
+      <p:ext uri="{BB962C8B-B14F-4D97-AF65-F5344CB8AC3E}">
+        <p14:creationId xmlns:p14="http://schemas.microsoft.com/office/powerpoint/2010/main" val="2226592206"/>
+      </p:ext>
+    </p:extLst>
+  </p:cSld>
+  <p:clrMapOvr>
+    <a:masterClrMapping/>
+  </p:clrMapOvr>
+</p:notes>
+</file>
+
 <file path=ppt/notesSlides/notesSlide2.xml><?xml version="1.0" encoding="utf-8"?>
 <p:notes xmlns:a="http://schemas.openxmlformats.org/drawingml/2006/main" xmlns:r="http://schemas.openxmlformats.org/officeDocument/2006/relationships" xmlns:p="http://schemas.openxmlformats.org/presentationml/2006/main">
   <p:cSld>
@@ -803,7 +973,7 @@
           <a:p>
             <a:fld id="{12573026-7AF8-9B4C-89E3-A4FB0E5697A1}" type="slidenum">
               <a:rPr lang="en-US" smtClean="0"/>
-              <a:t>7</a:t>
+              <a:t>6</a:t>
             </a:fld>
             <a:endParaRPr lang="en-US"/>
           </a:p>
@@ -3507,89 +3677,35 @@
           <a:bodyPr/>
           <a:lstStyle/>
           <a:p>
-            <a:pPr marL="0" marR="0" lvl="0" indent="0" algn="l" defTabSz="914400" rtl="0" eaLnBrk="1" fontAlgn="auto" latinLnBrk="0" hangingPunct="1">
-              <a:lnSpc>
-                <a:spcPct val="100000"/>
-              </a:lnSpc>
-              <a:spcBef>
-                <a:spcPts val="0"/>
-              </a:spcBef>
-              <a:spcAft>
-                <a:spcPts val="0"/>
-              </a:spcAft>
-              <a:buClrTx/>
-              <a:buSzTx/>
-              <a:buFontTx/>
-              <a:buNone/>
-              <a:tabLst/>
-              <a:defRPr/>
-            </a:pPr>
-            <a:r>
-              <a:rPr lang="en-US" dirty="0">
-                <a:hlinkClick r:id="rId3"/>
-              </a:rPr>
-              <a:t>https://smartech.gatech.edu/bitstream/handle/1853/35125/efron_videostream.html?sequence=8&amp;isAllowed=y</a:t>
-            </a:r>
-            <a:endParaRPr lang="en-US" dirty="0"/>
-          </a:p>
-          <a:p>
-            <a:endParaRPr lang="en-US" dirty="0"/>
-          </a:p>
-          <a:p>
-            <a:r>
-              <a:rPr lang="en-US" dirty="0"/>
-              <a:t>Robbins, Herbert. </a:t>
-            </a:r>
-            <a:r>
-              <a:rPr lang="en-US" i="1" dirty="0"/>
-              <a:t>An Empirical Bayes Approach to Statistics.</a:t>
-            </a:r>
-            <a:r>
-              <a:rPr lang="en-US" dirty="0"/>
-              <a:t> Proceedings of the Third Berkeley Symposium on Mathematical Statistics and Probability, Volume 1: Contributions to the Theory of Statistics, 157--163, University of California Press, Berkeley, Calif., 1956. https://</a:t>
-            </a:r>
-            <a:r>
-              <a:rPr lang="en-US" dirty="0" err="1"/>
-              <a:t>projecteuclid.org</a:t>
-            </a:r>
-            <a:r>
-              <a:rPr lang="en-US" dirty="0"/>
-              <a:t>/</a:t>
-            </a:r>
-            <a:r>
-              <a:rPr lang="en-US" dirty="0" err="1"/>
-              <a:t>euclid.bsmsp</a:t>
-            </a:r>
-            <a:r>
-              <a:rPr lang="en-US" dirty="0"/>
-              <a:t>/1200501653</a:t>
-            </a:r>
-          </a:p>
-          <a:p>
-            <a:endParaRPr lang="en-US" dirty="0"/>
-          </a:p>
-          <a:p>
-            <a:r>
-              <a:rPr lang="en-US" dirty="0"/>
-              <a:t>http://</a:t>
-            </a:r>
-            <a:r>
-              <a:rPr lang="en-US" dirty="0" err="1"/>
-              <a:t>seqanswers.com</a:t>
-            </a:r>
-            <a:r>
-              <a:rPr lang="en-US" dirty="0"/>
-              <a:t>/forums/</a:t>
-            </a:r>
-            <a:r>
-              <a:rPr lang="en-US" dirty="0" err="1"/>
-              <a:t>showthread.php?t</a:t>
-            </a:r>
-            <a:r>
-              <a:rPr lang="en-US"/>
-              <a:t>=5591</a:t>
-            </a:r>
-            <a:endParaRPr lang="en-US" dirty="0"/>
+            <a:r>
+              <a:rPr lang="en-US" sz="700" dirty="0"/>
+              <a:t>For multidimensional scaling and PCA:</a:t>
+            </a:r>
+          </a:p>
+          <a:p>
+            <a:endParaRPr lang="en-US" sz="700" dirty="0"/>
+          </a:p>
+          <a:p>
+            <a:r>
+              <a:rPr lang="en-US" sz="700" dirty="0"/>
+              <a:t>Look up Ali </a:t>
+            </a:r>
+            <a:r>
+              <a:rPr lang="en-US" sz="700" dirty="0" err="1"/>
+              <a:t>Ghodsi’s</a:t>
+            </a:r>
+            <a:r>
+              <a:rPr lang="en-US" sz="700" dirty="0"/>
+              <a:t> lectures on </a:t>
+            </a:r>
+            <a:r>
+              <a:rPr lang="en-US" sz="700" dirty="0" err="1"/>
+              <a:t>youtube</a:t>
+            </a:r>
+            <a:r>
+              <a:rPr lang="en-US" sz="700" dirty="0"/>
+              <a:t>.</a:t>
+            </a:r>
           </a:p>
         </p:txBody>
       </p:sp>
@@ -3610,7 +3726,7 @@
           <a:p>
             <a:fld id="{12573026-7AF8-9B4C-89E3-A4FB0E5697A1}" type="slidenum">
               <a:rPr lang="en-US" smtClean="0"/>
-              <a:t>17</a:t>
+              <a:t>19</a:t>
             </a:fld>
             <a:endParaRPr lang="en-US"/>
           </a:p>
@@ -3619,7 +3735,107 @@
     </p:spTree>
     <p:extLst>
       <p:ext uri="{BB962C8B-B14F-4D97-AF65-F5344CB8AC3E}">
-        <p14:creationId xmlns:p14="http://schemas.microsoft.com/office/powerpoint/2010/main" val="2226592206"/>
+        <p14:creationId xmlns:p14="http://schemas.microsoft.com/office/powerpoint/2010/main" val="3407570659"/>
+      </p:ext>
+    </p:extLst>
+  </p:cSld>
+  <p:clrMapOvr>
+    <a:masterClrMapping/>
+  </p:clrMapOvr>
+</p:notes>
+</file>
+
+<file path=ppt/notesSlides/notesSlide9.xml><?xml version="1.0" encoding="utf-8"?>
+<p:notes xmlns:a="http://schemas.openxmlformats.org/drawingml/2006/main" xmlns:r="http://schemas.openxmlformats.org/officeDocument/2006/relationships" xmlns:p="http://schemas.openxmlformats.org/presentationml/2006/main">
+  <p:cSld>
+    <p:spTree>
+      <p:nvGrpSpPr>
+        <p:cNvPr id="1" name=""/>
+        <p:cNvGrpSpPr/>
+        <p:nvPr/>
+      </p:nvGrpSpPr>
+      <p:grpSpPr>
+        <a:xfrm>
+          <a:off x="0" y="0"/>
+          <a:ext cx="0" cy="0"/>
+          <a:chOff x="0" y="0"/>
+          <a:chExt cx="0" cy="0"/>
+        </a:xfrm>
+      </p:grpSpPr>
+      <p:sp>
+        <p:nvSpPr>
+          <p:cNvPr id="2" name="Slide Image Placeholder 1"/>
+          <p:cNvSpPr>
+            <a:spLocks noGrp="1" noRot="1" noChangeAspect="1"/>
+          </p:cNvSpPr>
+          <p:nvPr>
+            <p:ph type="sldImg"/>
+          </p:nvPr>
+        </p:nvSpPr>
+        <p:spPr/>
+      </p:sp>
+      <p:sp>
+        <p:nvSpPr>
+          <p:cNvPr id="3" name="Notes Placeholder 2"/>
+          <p:cNvSpPr>
+            <a:spLocks noGrp="1"/>
+          </p:cNvSpPr>
+          <p:nvPr>
+            <p:ph type="body" idx="1"/>
+          </p:nvPr>
+        </p:nvSpPr>
+        <p:spPr/>
+        <p:txBody>
+          <a:bodyPr/>
+          <a:lstStyle/>
+          <a:p>
+            <a:r>
+              <a:rPr lang="en-US" dirty="0"/>
+              <a:t>Book suggestion: In all likelihood by </a:t>
+            </a:r>
+            <a:r>
+              <a:rPr lang="en-US" dirty="0" err="1"/>
+              <a:t>Yudi</a:t>
+            </a:r>
+            <a:r>
+              <a:rPr lang="en-US" dirty="0"/>
+              <a:t> </a:t>
+            </a:r>
+            <a:r>
+              <a:rPr lang="en-US" dirty="0" err="1"/>
+              <a:t>Pawitan</a:t>
+            </a:r>
+            <a:endParaRPr lang="en-US" dirty="0"/>
+          </a:p>
+        </p:txBody>
+      </p:sp>
+      <p:sp>
+        <p:nvSpPr>
+          <p:cNvPr id="4" name="Slide Number Placeholder 3"/>
+          <p:cNvSpPr>
+            <a:spLocks noGrp="1"/>
+          </p:cNvSpPr>
+          <p:nvPr>
+            <p:ph type="sldNum" sz="quarter" idx="5"/>
+          </p:nvPr>
+        </p:nvSpPr>
+        <p:spPr/>
+        <p:txBody>
+          <a:bodyPr/>
+          <a:lstStyle/>
+          <a:p>
+            <a:fld id="{12573026-7AF8-9B4C-89E3-A4FB0E5697A1}" type="slidenum">
+              <a:rPr lang="en-US" smtClean="0"/>
+              <a:t>20</a:t>
+            </a:fld>
+            <a:endParaRPr lang="en-US"/>
+          </a:p>
+        </p:txBody>
+      </p:sp>
+    </p:spTree>
+    <p:extLst>
+      <p:ext uri="{BB962C8B-B14F-4D97-AF65-F5344CB8AC3E}">
+        <p14:creationId xmlns:p14="http://schemas.microsoft.com/office/powerpoint/2010/main" val="4204703649"/>
       </p:ext>
     </p:extLst>
   </p:cSld>
@@ -3776,7 +3992,7 @@
           <a:p>
             <a:fld id="{ED78ABE4-71DA-EF42-9B6B-EF221EC5F264}" type="datetimeFigureOut">
               <a:rPr lang="en-US" smtClean="0"/>
-              <a:t>7/19/20</a:t>
+              <a:t>7/21/20</a:t>
             </a:fld>
             <a:endParaRPr lang="en-US"/>
           </a:p>
@@ -3974,7 +4190,7 @@
           <a:p>
             <a:fld id="{ED78ABE4-71DA-EF42-9B6B-EF221EC5F264}" type="datetimeFigureOut">
               <a:rPr lang="en-US" smtClean="0"/>
-              <a:t>7/19/20</a:t>
+              <a:t>7/21/20</a:t>
             </a:fld>
             <a:endParaRPr lang="en-US"/>
           </a:p>
@@ -4182,7 +4398,7 @@
           <a:p>
             <a:fld id="{ED78ABE4-71DA-EF42-9B6B-EF221EC5F264}" type="datetimeFigureOut">
               <a:rPr lang="en-US" smtClean="0"/>
-              <a:t>7/19/20</a:t>
+              <a:t>7/21/20</a:t>
             </a:fld>
             <a:endParaRPr lang="en-US"/>
           </a:p>
@@ -4935,7 +5151,7 @@
           <a:p>
             <a:fld id="{ED78ABE4-71DA-EF42-9B6B-EF221EC5F264}" type="datetimeFigureOut">
               <a:rPr lang="en-US" smtClean="0"/>
-              <a:t>7/19/20</a:t>
+              <a:t>7/21/20</a:t>
             </a:fld>
             <a:endParaRPr lang="en-US"/>
           </a:p>
@@ -5210,7 +5426,7 @@
           <a:p>
             <a:fld id="{ED78ABE4-71DA-EF42-9B6B-EF221EC5F264}" type="datetimeFigureOut">
               <a:rPr lang="en-US" smtClean="0"/>
-              <a:t>7/19/20</a:t>
+              <a:t>7/21/20</a:t>
             </a:fld>
             <a:endParaRPr lang="en-US"/>
           </a:p>
@@ -5475,7 +5691,7 @@
           <a:p>
             <a:fld id="{ED78ABE4-71DA-EF42-9B6B-EF221EC5F264}" type="datetimeFigureOut">
               <a:rPr lang="en-US" smtClean="0"/>
-              <a:t>7/19/20</a:t>
+              <a:t>7/21/20</a:t>
             </a:fld>
             <a:endParaRPr lang="en-US"/>
           </a:p>
@@ -5887,7 +6103,7 @@
           <a:p>
             <a:fld id="{ED78ABE4-71DA-EF42-9B6B-EF221EC5F264}" type="datetimeFigureOut">
               <a:rPr lang="en-US" smtClean="0"/>
-              <a:t>7/19/20</a:t>
+              <a:t>7/21/20</a:t>
             </a:fld>
             <a:endParaRPr lang="en-US"/>
           </a:p>
@@ -6028,7 +6244,7 @@
           <a:p>
             <a:fld id="{ED78ABE4-71DA-EF42-9B6B-EF221EC5F264}" type="datetimeFigureOut">
               <a:rPr lang="en-US" smtClean="0"/>
-              <a:t>7/19/20</a:t>
+              <a:t>7/21/20</a:t>
             </a:fld>
             <a:endParaRPr lang="en-US"/>
           </a:p>
@@ -6141,7 +6357,7 @@
           <a:p>
             <a:fld id="{ED78ABE4-71DA-EF42-9B6B-EF221EC5F264}" type="datetimeFigureOut">
               <a:rPr lang="en-US" smtClean="0"/>
-              <a:t>7/19/20</a:t>
+              <a:t>7/21/20</a:t>
             </a:fld>
             <a:endParaRPr lang="en-US"/>
           </a:p>
@@ -6452,7 +6668,7 @@
           <a:p>
             <a:fld id="{ED78ABE4-71DA-EF42-9B6B-EF221EC5F264}" type="datetimeFigureOut">
               <a:rPr lang="en-US" smtClean="0"/>
-              <a:t>7/19/20</a:t>
+              <a:t>7/21/20</a:t>
             </a:fld>
             <a:endParaRPr lang="en-US"/>
           </a:p>
@@ -6740,7 +6956,7 @@
           <a:p>
             <a:fld id="{ED78ABE4-71DA-EF42-9B6B-EF221EC5F264}" type="datetimeFigureOut">
               <a:rPr lang="en-US" smtClean="0"/>
-              <a:t>7/19/20</a:t>
+              <a:t>7/21/20</a:t>
             </a:fld>
             <a:endParaRPr lang="en-US"/>
           </a:p>
@@ -6981,7 +7197,7 @@
           <a:p>
             <a:fld id="{ED78ABE4-71DA-EF42-9B6B-EF221EC5F264}" type="datetimeFigureOut">
               <a:rPr lang="en-US" smtClean="0"/>
-              <a:t>7/19/20</a:t>
+              <a:t>7/21/20</a:t>
             </a:fld>
             <a:endParaRPr lang="en-US"/>
           </a:p>
@@ -7737,7 +7953,15 @@
           <a:p>
             <a:r>
               <a:rPr lang="en-US" dirty="0"/>
-              <a:t>Given any observed level of difference in expression levels of a gene, compute the probability that the observation will result from the null model. (p value)</a:t>
+              <a:t>Given any observed level of difference </a:t>
+            </a:r>
+            <a:r>
+              <a:rPr lang="en-US"/>
+              <a:t>in mean expression </a:t>
+            </a:r>
+            <a:r>
+              <a:rPr lang="en-US" dirty="0"/>
+              <a:t>levels of a gene, compute the probability that the observation will result from the null model. (p value)</a:t>
             </a:r>
           </a:p>
           <a:p>
@@ -9873,10 +10097,10 @@
       </p:grpSpPr>
       <p:sp>
         <p:nvSpPr>
-          <p:cNvPr id="2" name="Text Placeholder 1">
+          <p:cNvPr id="4" name="Title 3">
             <a:extLst>
               <a:ext uri="{FF2B5EF4-FFF2-40B4-BE49-F238E27FC236}">
-                <a16:creationId xmlns:a16="http://schemas.microsoft.com/office/drawing/2014/main" id="{7B05D9FF-081C-1D4A-9610-36CF7A529C72}"/>
+                <a16:creationId xmlns:a16="http://schemas.microsoft.com/office/drawing/2014/main" id="{4F80F9D1-0C01-8D4C-BFFD-B899DB77DBB3}"/>
               </a:ext>
             </a:extLst>
           </p:cNvPr>
@@ -9884,57 +10108,27 @@
             <a:spLocks noGrp="1"/>
           </p:cNvSpPr>
           <p:nvPr>
-            <p:ph type="body" sz="quarter" idx="10"/>
-          </p:nvPr>
-        </p:nvSpPr>
-        <p:spPr>
-          <a:xfrm>
-            <a:off x="838200" y="1876483"/>
-            <a:ext cx="10515600" cy="2583271"/>
-          </a:xfrm>
-        </p:spPr>
+            <p:ph type="title"/>
+          </p:nvPr>
+        </p:nvSpPr>
+        <p:spPr/>
         <p:txBody>
           <a:bodyPr/>
           <a:lstStyle/>
           <a:p>
             <a:r>
               <a:rPr lang="en-US" dirty="0"/>
-              <a:t>For an intuitive explanation by Bradley </a:t>
-            </a:r>
-            <a:r>
-              <a:rPr lang="en-US" dirty="0" err="1"/>
-              <a:t>Efron</a:t>
-            </a:r>
-            <a:r>
-              <a:rPr lang="en-US" dirty="0"/>
-              <a:t>, see link in description</a:t>
-            </a:r>
-          </a:p>
-          <a:p>
-            <a:endParaRPr lang="en-US" dirty="0"/>
-          </a:p>
-          <a:p>
-            <a:r>
-              <a:rPr lang="en-US" dirty="0"/>
-              <a:t>Original paper: Robbins, Herbert. </a:t>
-            </a:r>
-            <a:r>
-              <a:rPr lang="en-US" i="1" dirty="0"/>
-              <a:t>An Empirical Bayes Approach to Statistics.</a:t>
-            </a:r>
-            <a:r>
-              <a:rPr lang="en-US" dirty="0"/>
-              <a:t> (see description for complete reference)</a:t>
-            </a:r>
-          </a:p>
-        </p:txBody>
-      </p:sp>
-      <p:sp>
-        <p:nvSpPr>
-          <p:cNvPr id="3" name="Title 2">
+              <a:t>MDS and PCA plots</a:t>
+            </a:r>
+          </a:p>
+        </p:txBody>
+      </p:sp>
+      <p:sp>
+        <p:nvSpPr>
+          <p:cNvPr id="5" name="Text Placeholder 4">
             <a:extLst>
               <a:ext uri="{FF2B5EF4-FFF2-40B4-BE49-F238E27FC236}">
-                <a16:creationId xmlns:a16="http://schemas.microsoft.com/office/drawing/2014/main" id="{E1C335AD-367B-9440-BC1E-B6CD4993EE4B}"/>
+                <a16:creationId xmlns:a16="http://schemas.microsoft.com/office/drawing/2014/main" id="{D9368741-074A-424F-AB66-EB90F5B449C2}"/>
               </a:ext>
             </a:extLst>
           </p:cNvPr>
@@ -9942,27 +10136,22 @@
             <a:spLocks noGrp="1"/>
           </p:cNvSpPr>
           <p:nvPr>
-            <p:ph type="title"/>
+            <p:ph type="body" idx="1"/>
           </p:nvPr>
         </p:nvSpPr>
         <p:spPr/>
         <p:txBody>
-          <a:bodyPr>
-            <a:normAutofit/>
-          </a:bodyPr>
+          <a:bodyPr/>
           <a:lstStyle/>
           <a:p>
-            <a:r>
-              <a:rPr lang="en-US" sz="3200" dirty="0"/>
-              <a:t>Empirical Bayes estimates of dispersion parameters: Learning from the experience of others</a:t>
-            </a:r>
+            <a:endParaRPr lang="en-US"/>
           </a:p>
         </p:txBody>
       </p:sp>
     </p:spTree>
     <p:extLst>
       <p:ext uri="{BB962C8B-B14F-4D97-AF65-F5344CB8AC3E}">
-        <p14:creationId xmlns:p14="http://schemas.microsoft.com/office/powerpoint/2010/main" val="3900548909"/>
+        <p14:creationId xmlns:p14="http://schemas.microsoft.com/office/powerpoint/2010/main" val="3889334098"/>
       </p:ext>
     </p:extLst>
   </p:cSld>
@@ -9991,10 +10180,10 @@
       </p:grpSpPr>
       <p:sp>
         <p:nvSpPr>
-          <p:cNvPr id="6" name="Text Placeholder 5">
+          <p:cNvPr id="3" name="Title 2">
             <a:extLst>
               <a:ext uri="{FF2B5EF4-FFF2-40B4-BE49-F238E27FC236}">
-                <a16:creationId xmlns:a16="http://schemas.microsoft.com/office/drawing/2014/main" id="{02741519-BE24-CD46-917C-973842317CBC}"/>
+                <a16:creationId xmlns:a16="http://schemas.microsoft.com/office/drawing/2014/main" id="{29B4F703-94FB-9D4D-B02D-1863120FA1D9}"/>
               </a:ext>
             </a:extLst>
           </p:cNvPr>
@@ -10002,66 +10191,130 @@
             <a:spLocks noGrp="1"/>
           </p:cNvSpPr>
           <p:nvPr>
-            <p:ph type="body" sz="quarter" idx="10"/>
+            <p:ph type="title"/>
           </p:nvPr>
         </p:nvSpPr>
         <p:spPr>
           <a:xfrm>
-            <a:off x="838200" y="1876483"/>
-            <a:ext cx="10515600" cy="1419876"/>
+            <a:off x="838200" y="365125"/>
+            <a:ext cx="10515600" cy="1325563"/>
           </a:xfrm>
         </p:spPr>
         <p:txBody>
-          <a:bodyPr/>
+          <a:bodyPr>
+            <a:normAutofit/>
+          </a:bodyPr>
           <a:lstStyle/>
           <a:p>
             <a:r>
-              <a:rPr lang="en-US" dirty="0">
-                <a:hlinkClick r:id="rId2"/>
-              </a:rPr>
-              <a:t>https://bioinformatics-course-feedback.questionpro.com/</a:t>
-            </a:r>
-            <a:endParaRPr lang="en-US" dirty="0"/>
-          </a:p>
-          <a:p>
-            <a:endParaRPr lang="en-US" dirty="0"/>
-          </a:p>
-          <a:p>
-            <a:r>
-              <a:rPr lang="en-US"/>
-              <a:t>~3 </a:t>
-            </a:r>
-            <a:r>
-              <a:rPr lang="en-US" dirty="0"/>
-              <a:t>min.</a:t>
-            </a:r>
-          </a:p>
-        </p:txBody>
-      </p:sp>
-      <p:sp>
-        <p:nvSpPr>
-          <p:cNvPr id="5" name="Title 4">
+              <a:rPr lang="en-US" sz="2800" dirty="0"/>
+              <a:t>Expression level of Casein varies in a way that is strongly indicative of the effect of </a:t>
+            </a:r>
+            <a:r>
+              <a:rPr lang="en-US" sz="2800" dirty="0" err="1"/>
+              <a:t>CellType</a:t>
+            </a:r>
+            <a:r>
+              <a:rPr lang="en-US" sz="2800" dirty="0"/>
+              <a:t> and Status.</a:t>
+            </a:r>
+          </a:p>
+        </p:txBody>
+      </p:sp>
+      <p:pic>
+        <p:nvPicPr>
+          <p:cNvPr id="13" name="Picture 12">
             <a:extLst>
               <a:ext uri="{FF2B5EF4-FFF2-40B4-BE49-F238E27FC236}">
-                <a16:creationId xmlns:a16="http://schemas.microsoft.com/office/drawing/2014/main" id="{EA243F3D-84FD-1B47-961E-CAF8E18955BD}"/>
+                <a16:creationId xmlns:a16="http://schemas.microsoft.com/office/drawing/2014/main" id="{FAF6A67D-C776-F34C-B6C0-22E633A7E392}"/>
               </a:ext>
             </a:extLst>
           </p:cNvPr>
-          <p:cNvSpPr>
-            <a:spLocks noGrp="1"/>
-          </p:cNvSpPr>
-          <p:nvPr>
-            <p:ph type="title"/>
-          </p:nvPr>
-        </p:nvSpPr>
-        <p:spPr/>
-        <p:txBody>
-          <a:bodyPr/>
+          <p:cNvPicPr>
+            <a:picLocks noChangeAspect="1"/>
+          </p:cNvPicPr>
+          <p:nvPr/>
+        </p:nvPicPr>
+        <p:blipFill>
+          <a:blip r:embed="rId2"/>
+          <a:stretch>
+            <a:fillRect/>
+          </a:stretch>
+        </p:blipFill>
+        <p:spPr>
+          <a:xfrm>
+            <a:off x="4610102" y="1856942"/>
+            <a:ext cx="4450773" cy="4595812"/>
+          </a:xfrm>
+          <a:prstGeom prst="rect">
+            <a:avLst/>
+          </a:prstGeom>
+        </p:spPr>
+      </p:pic>
+      <p:sp>
+        <p:nvSpPr>
+          <p:cNvPr id="18" name="TextBox 17">
+            <a:extLst>
+              <a:ext uri="{FF2B5EF4-FFF2-40B4-BE49-F238E27FC236}">
+                <a16:creationId xmlns:a16="http://schemas.microsoft.com/office/drawing/2014/main" id="{7AEFFB0F-4A92-DB49-860E-44F438BCC65A}"/>
+              </a:ext>
+            </a:extLst>
+          </p:cNvPr>
+          <p:cNvSpPr txBox="1"/>
+          <p:nvPr/>
+        </p:nvSpPr>
+        <p:spPr>
+          <a:xfrm>
+            <a:off x="1565564" y="2673927"/>
+            <a:ext cx="1925781" cy="2585323"/>
+          </a:xfrm>
+          <a:prstGeom prst="rect">
+            <a:avLst/>
+          </a:prstGeom>
+          <a:noFill/>
+        </p:spPr>
+        <p:txBody>
+          <a:bodyPr wrap="square" rtlCol="0">
+            <a:spAutoFit/>
+          </a:bodyPr>
           <a:lstStyle/>
           <a:p>
             <a:r>
               <a:rPr lang="en-US" dirty="0"/>
-              <a:t>Your feedback is important to us!</a:t>
+              <a:t>Why are the </a:t>
+            </a:r>
+            <a:r>
+              <a:rPr lang="en-US" dirty="0" err="1"/>
+              <a:t>B.lactating</a:t>
+            </a:r>
+            <a:r>
+              <a:rPr lang="en-US" dirty="0"/>
+              <a:t> samples not close to </a:t>
+            </a:r>
+            <a:r>
+              <a:rPr lang="en-US" dirty="0" err="1"/>
+              <a:t>B.virgin</a:t>
+            </a:r>
+            <a:r>
+              <a:rPr lang="en-US" dirty="0"/>
+              <a:t> and </a:t>
+            </a:r>
+            <a:r>
+              <a:rPr lang="en-US" dirty="0" err="1"/>
+              <a:t>B.pregnant</a:t>
+            </a:r>
+            <a:r>
+              <a:rPr lang="en-US" dirty="0"/>
+              <a:t> samples? </a:t>
+            </a:r>
+          </a:p>
+          <a:p>
+            <a:endParaRPr lang="en-US" dirty="0"/>
+          </a:p>
+          <a:p>
+            <a:r>
+              <a:rPr lang="en-US" dirty="0"/>
+              <a:t>Could it be due to batch effects?</a:t>
             </a:r>
           </a:p>
         </p:txBody>
@@ -10069,7 +10322,7 @@
     </p:spTree>
     <p:extLst>
       <p:ext uri="{BB962C8B-B14F-4D97-AF65-F5344CB8AC3E}">
-        <p14:creationId xmlns:p14="http://schemas.microsoft.com/office/powerpoint/2010/main" val="856610576"/>
+        <p14:creationId xmlns:p14="http://schemas.microsoft.com/office/powerpoint/2010/main" val="2665387973"/>
       </p:ext>
     </p:extLst>
   </p:cSld>
@@ -10098,43 +10351,68 @@
       </p:grpSpPr>
       <p:sp>
         <p:nvSpPr>
-          <p:cNvPr id="7" name="TextBox 6">
+          <p:cNvPr id="3" name="Title 2">
             <a:extLst>
               <a:ext uri="{FF2B5EF4-FFF2-40B4-BE49-F238E27FC236}">
-                <a16:creationId xmlns:a16="http://schemas.microsoft.com/office/drawing/2014/main" id="{E91B6B1A-4123-924B-B2D9-B4EDDF2A060B}"/>
+                <a16:creationId xmlns:a16="http://schemas.microsoft.com/office/drawing/2014/main" id="{29B4F703-94FB-9D4D-B02D-1863120FA1D9}"/>
               </a:ext>
             </a:extLst>
           </p:cNvPr>
-          <p:cNvSpPr txBox="1"/>
+          <p:cNvSpPr>
+            <a:spLocks noGrp="1"/>
+          </p:cNvSpPr>
+          <p:nvPr>
+            <p:ph type="title"/>
+          </p:nvPr>
+        </p:nvSpPr>
+        <p:spPr/>
+        <p:txBody>
+          <a:bodyPr>
+            <a:normAutofit/>
+          </a:bodyPr>
+          <a:lstStyle/>
+          <a:p>
+            <a:r>
+              <a:rPr lang="en-US" sz="2800" dirty="0"/>
+              <a:t>In general, the way expression appears to vary across samples could be dominated by noise, batch effects, real signal, etc.</a:t>
+            </a:r>
+          </a:p>
+        </p:txBody>
+      </p:sp>
+      <p:pic>
+        <p:nvPicPr>
+          <p:cNvPr id="15" name="Picture 14">
+            <a:extLst>
+              <a:ext uri="{FF2B5EF4-FFF2-40B4-BE49-F238E27FC236}">
+                <a16:creationId xmlns:a16="http://schemas.microsoft.com/office/drawing/2014/main" id="{C7ACFB3A-BF38-904D-80C9-9DD22F71D3DB}"/>
+              </a:ext>
+            </a:extLst>
+          </p:cNvPr>
+          <p:cNvPicPr>
+            <a:picLocks noChangeAspect="1"/>
+          </p:cNvPicPr>
           <p:nvPr/>
-        </p:nvSpPr>
+        </p:nvPicPr>
+        <p:blipFill>
+          <a:blip r:embed="rId3"/>
+          <a:stretch>
+            <a:fillRect/>
+          </a:stretch>
+        </p:blipFill>
         <p:spPr>
           <a:xfrm>
-            <a:off x="4752109" y="2604655"/>
-            <a:ext cx="5001491" cy="769441"/>
+            <a:off x="3823854" y="1856942"/>
+            <a:ext cx="4814455" cy="4595812"/>
           </a:xfrm>
           <a:prstGeom prst="rect">
             <a:avLst/>
           </a:prstGeom>
-          <a:noFill/>
         </p:spPr>
-        <p:txBody>
-          <a:bodyPr wrap="square" rtlCol="0">
-            <a:spAutoFit/>
-          </a:bodyPr>
-          <a:lstStyle/>
-          <a:p>
-            <a:r>
-              <a:rPr lang="en-US" sz="4400" dirty="0"/>
-              <a:t>Thank you.</a:t>
-            </a:r>
-          </a:p>
-        </p:txBody>
-      </p:sp>
+      </p:pic>
     </p:spTree>
     <p:extLst>
       <p:ext uri="{BB962C8B-B14F-4D97-AF65-F5344CB8AC3E}">
-        <p14:creationId xmlns:p14="http://schemas.microsoft.com/office/powerpoint/2010/main" val="23816048"/>
+        <p14:creationId xmlns:p14="http://schemas.microsoft.com/office/powerpoint/2010/main" val="1574300046"/>
       </p:ext>
     </p:extLst>
   </p:cSld>
@@ -10251,6 +10529,584 @@
     <p:extLst>
       <p:ext uri="{BB962C8B-B14F-4D97-AF65-F5344CB8AC3E}">
         <p14:creationId xmlns:p14="http://schemas.microsoft.com/office/powerpoint/2010/main" val="1792621336"/>
+      </p:ext>
+    </p:extLst>
+  </p:cSld>
+  <p:clrMapOvr>
+    <a:masterClrMapping/>
+  </p:clrMapOvr>
+</p:sld>
+</file>
+
+<file path=ppt/slides/slide20.xml><?xml version="1.0" encoding="utf-8"?>
+<p:sld xmlns:a="http://schemas.openxmlformats.org/drawingml/2006/main" xmlns:r="http://schemas.openxmlformats.org/officeDocument/2006/relationships" xmlns:p="http://schemas.openxmlformats.org/presentationml/2006/main">
+  <p:cSld>
+    <p:spTree>
+      <p:nvGrpSpPr>
+        <p:cNvPr id="1" name=""/>
+        <p:cNvGrpSpPr/>
+        <p:nvPr/>
+      </p:nvGrpSpPr>
+      <p:grpSpPr>
+        <a:xfrm>
+          <a:off x="0" y="0"/>
+          <a:ext cx="0" cy="0"/>
+          <a:chOff x="0" y="0"/>
+          <a:chExt cx="0" cy="0"/>
+        </a:xfrm>
+      </p:grpSpPr>
+      <p:sp>
+        <p:nvSpPr>
+          <p:cNvPr id="3" name="Title 2">
+            <a:extLst>
+              <a:ext uri="{FF2B5EF4-FFF2-40B4-BE49-F238E27FC236}">
+                <a16:creationId xmlns:a16="http://schemas.microsoft.com/office/drawing/2014/main" id="{BC883C63-0BB3-0046-997D-4002F677CC46}"/>
+              </a:ext>
+            </a:extLst>
+          </p:cNvPr>
+          <p:cNvSpPr>
+            <a:spLocks noGrp="1"/>
+          </p:cNvSpPr>
+          <p:nvPr>
+            <p:ph type="title"/>
+          </p:nvPr>
+        </p:nvSpPr>
+        <p:spPr/>
+        <p:txBody>
+          <a:bodyPr>
+            <a:normAutofit/>
+          </a:bodyPr>
+          <a:lstStyle/>
+          <a:p>
+            <a:r>
+              <a:rPr lang="en-US" dirty="0"/>
+              <a:t>Maximum Likelihood Estimates: </a:t>
+            </a:r>
+            <a:br>
+              <a:rPr lang="en-US" dirty="0"/>
+            </a:br>
+            <a:r>
+              <a:rPr lang="en-US" sz="2400" dirty="0"/>
+              <a:t>What’s the parameter value that makes the observed data the most likely observation?</a:t>
+            </a:r>
+          </a:p>
+        </p:txBody>
+      </p:sp>
+      <p:pic>
+        <p:nvPicPr>
+          <p:cNvPr id="5" name="Picture 4">
+            <a:extLst>
+              <a:ext uri="{FF2B5EF4-FFF2-40B4-BE49-F238E27FC236}">
+                <a16:creationId xmlns:a16="http://schemas.microsoft.com/office/drawing/2014/main" id="{93F908A5-6A3F-D846-B94E-B96BC3270313}"/>
+              </a:ext>
+            </a:extLst>
+          </p:cNvPr>
+          <p:cNvPicPr>
+            <a:picLocks noChangeAspect="1"/>
+          </p:cNvPicPr>
+          <p:nvPr/>
+        </p:nvPicPr>
+        <p:blipFill>
+          <a:blip r:embed="rId3"/>
+          <a:stretch>
+            <a:fillRect/>
+          </a:stretch>
+        </p:blipFill>
+        <p:spPr>
+          <a:xfrm>
+            <a:off x="1163780" y="2008907"/>
+            <a:ext cx="5151005" cy="4071505"/>
+          </a:xfrm>
+          <a:prstGeom prst="rect">
+            <a:avLst/>
+          </a:prstGeom>
+        </p:spPr>
+      </p:pic>
+      <p:sp>
+        <p:nvSpPr>
+          <p:cNvPr id="6" name="TextBox 5">
+            <a:extLst>
+              <a:ext uri="{FF2B5EF4-FFF2-40B4-BE49-F238E27FC236}">
+                <a16:creationId xmlns:a16="http://schemas.microsoft.com/office/drawing/2014/main" id="{92AE3B45-40B8-0147-B815-5641E786F43F}"/>
+              </a:ext>
+            </a:extLst>
+          </p:cNvPr>
+          <p:cNvSpPr txBox="1"/>
+          <p:nvPr/>
+        </p:nvSpPr>
+        <p:spPr>
+          <a:xfrm>
+            <a:off x="7051964" y="2147455"/>
+            <a:ext cx="4156363" cy="2862322"/>
+          </a:xfrm>
+          <a:prstGeom prst="rect">
+            <a:avLst/>
+          </a:prstGeom>
+          <a:noFill/>
+        </p:spPr>
+        <p:txBody>
+          <a:bodyPr wrap="square" rtlCol="0">
+            <a:spAutoFit/>
+          </a:bodyPr>
+          <a:lstStyle/>
+          <a:p>
+            <a:r>
+              <a:rPr lang="en-US" dirty="0"/>
+              <a:t>Let’s run a “thought” experiment:</a:t>
+            </a:r>
+          </a:p>
+          <a:p>
+            <a:pPr marL="285750" indent="-285750">
+              <a:buFont typeface="Arial" panose="020B0604020202020204" pitchFamily="34" charset="0"/>
+              <a:buChar char="•"/>
+            </a:pPr>
+            <a:endParaRPr lang="en-US" dirty="0"/>
+          </a:p>
+          <a:p>
+            <a:pPr marL="285750" indent="-285750">
+              <a:buFont typeface="Arial" panose="020B0604020202020204" pitchFamily="34" charset="0"/>
+              <a:buChar char="•"/>
+            </a:pPr>
+            <a:r>
+              <a:rPr lang="en-US" dirty="0"/>
+              <a:t>Say, we randomly pick 10 mRNA molecules from a sample.</a:t>
+            </a:r>
+          </a:p>
+          <a:p>
+            <a:pPr marL="285750" indent="-285750">
+              <a:buFont typeface="Arial" panose="020B0604020202020204" pitchFamily="34" charset="0"/>
+              <a:buChar char="•"/>
+            </a:pPr>
+            <a:endParaRPr lang="en-US" dirty="0"/>
+          </a:p>
+          <a:p>
+            <a:pPr marL="285750" indent="-285750">
+              <a:buFont typeface="Arial" panose="020B0604020202020204" pitchFamily="34" charset="0"/>
+              <a:buChar char="•"/>
+            </a:pPr>
+            <a:r>
+              <a:rPr lang="en-US" dirty="0"/>
+              <a:t>We observe that 8 of them come from YFG.</a:t>
+            </a:r>
+          </a:p>
+          <a:p>
+            <a:pPr marL="285750" indent="-285750">
+              <a:buFont typeface="Arial" panose="020B0604020202020204" pitchFamily="34" charset="0"/>
+              <a:buChar char="•"/>
+            </a:pPr>
+            <a:endParaRPr lang="en-US" dirty="0"/>
+          </a:p>
+          <a:p>
+            <a:pPr marL="285750" indent="-285750">
+              <a:buFont typeface="Arial" panose="020B0604020202020204" pitchFamily="34" charset="0"/>
+              <a:buChar char="•"/>
+            </a:pPr>
+            <a:r>
+              <a:rPr lang="en-US" dirty="0"/>
+              <a:t>What is the proportion of YFG molecules out of all the mRNAs?</a:t>
+            </a:r>
+          </a:p>
+        </p:txBody>
+      </p:sp>
+    </p:spTree>
+    <p:extLst>
+      <p:ext uri="{BB962C8B-B14F-4D97-AF65-F5344CB8AC3E}">
+        <p14:creationId xmlns:p14="http://schemas.microsoft.com/office/powerpoint/2010/main" val="3179560677"/>
+      </p:ext>
+    </p:extLst>
+  </p:cSld>
+  <p:clrMapOvr>
+    <a:masterClrMapping/>
+  </p:clrMapOvr>
+</p:sld>
+</file>
+
+<file path=ppt/slides/slide21.xml><?xml version="1.0" encoding="utf-8"?>
+<p:sld xmlns:a="http://schemas.openxmlformats.org/drawingml/2006/main" xmlns:r="http://schemas.openxmlformats.org/officeDocument/2006/relationships" xmlns:p="http://schemas.openxmlformats.org/presentationml/2006/main">
+  <p:cSld>
+    <p:spTree>
+      <p:nvGrpSpPr>
+        <p:cNvPr id="1" name=""/>
+        <p:cNvGrpSpPr/>
+        <p:nvPr/>
+      </p:nvGrpSpPr>
+      <p:grpSpPr>
+        <a:xfrm>
+          <a:off x="0" y="0"/>
+          <a:ext cx="0" cy="0"/>
+          <a:chOff x="0" y="0"/>
+          <a:chExt cx="0" cy="0"/>
+        </a:xfrm>
+      </p:grpSpPr>
+      <p:sp>
+        <p:nvSpPr>
+          <p:cNvPr id="2" name="Text Placeholder 1">
+            <a:extLst>
+              <a:ext uri="{FF2B5EF4-FFF2-40B4-BE49-F238E27FC236}">
+                <a16:creationId xmlns:a16="http://schemas.microsoft.com/office/drawing/2014/main" id="{7B05D9FF-081C-1D4A-9610-36CF7A529C72}"/>
+              </a:ext>
+            </a:extLst>
+          </p:cNvPr>
+          <p:cNvSpPr>
+            <a:spLocks noGrp="1"/>
+          </p:cNvSpPr>
+          <p:nvPr>
+            <p:ph type="body" sz="quarter" idx="10"/>
+          </p:nvPr>
+        </p:nvSpPr>
+        <p:spPr>
+          <a:xfrm>
+            <a:off x="838200" y="1876483"/>
+            <a:ext cx="10515600" cy="2583271"/>
+          </a:xfrm>
+        </p:spPr>
+        <p:txBody>
+          <a:bodyPr/>
+          <a:lstStyle/>
+          <a:p>
+            <a:r>
+              <a:rPr lang="en-US" dirty="0"/>
+              <a:t>For an intuitive explanation by Bradley </a:t>
+            </a:r>
+            <a:r>
+              <a:rPr lang="en-US" dirty="0" err="1"/>
+              <a:t>Efron</a:t>
+            </a:r>
+            <a:r>
+              <a:rPr lang="en-US" dirty="0"/>
+              <a:t>, see link in description</a:t>
+            </a:r>
+          </a:p>
+          <a:p>
+            <a:endParaRPr lang="en-US" dirty="0"/>
+          </a:p>
+          <a:p>
+            <a:r>
+              <a:rPr lang="en-US" dirty="0"/>
+              <a:t>Original paper: Robbins, Herbert. </a:t>
+            </a:r>
+            <a:r>
+              <a:rPr lang="en-US" i="1" dirty="0"/>
+              <a:t>An Empirical Bayes Approach to Statistics.</a:t>
+            </a:r>
+            <a:r>
+              <a:rPr lang="en-US" dirty="0"/>
+              <a:t> (see description for complete reference)</a:t>
+            </a:r>
+          </a:p>
+        </p:txBody>
+      </p:sp>
+      <p:sp>
+        <p:nvSpPr>
+          <p:cNvPr id="3" name="Title 2">
+            <a:extLst>
+              <a:ext uri="{FF2B5EF4-FFF2-40B4-BE49-F238E27FC236}">
+                <a16:creationId xmlns:a16="http://schemas.microsoft.com/office/drawing/2014/main" id="{E1C335AD-367B-9440-BC1E-B6CD4993EE4B}"/>
+              </a:ext>
+            </a:extLst>
+          </p:cNvPr>
+          <p:cNvSpPr>
+            <a:spLocks noGrp="1"/>
+          </p:cNvSpPr>
+          <p:nvPr>
+            <p:ph type="title"/>
+          </p:nvPr>
+        </p:nvSpPr>
+        <p:spPr/>
+        <p:txBody>
+          <a:bodyPr>
+            <a:normAutofit/>
+          </a:bodyPr>
+          <a:lstStyle/>
+          <a:p>
+            <a:r>
+              <a:rPr lang="en-US" sz="3200" dirty="0"/>
+              <a:t>Empirical Bayes estimates of dispersion parameters: Learning from the experience of others</a:t>
+            </a:r>
+          </a:p>
+        </p:txBody>
+      </p:sp>
+    </p:spTree>
+    <p:extLst>
+      <p:ext uri="{BB962C8B-B14F-4D97-AF65-F5344CB8AC3E}">
+        <p14:creationId xmlns:p14="http://schemas.microsoft.com/office/powerpoint/2010/main" val="3900548909"/>
+      </p:ext>
+    </p:extLst>
+  </p:cSld>
+  <p:clrMapOvr>
+    <a:masterClrMapping/>
+  </p:clrMapOvr>
+</p:sld>
+</file>
+
+<file path=ppt/slides/slide22.xml><?xml version="1.0" encoding="utf-8"?>
+<p:sld xmlns:a="http://schemas.openxmlformats.org/drawingml/2006/main" xmlns:r="http://schemas.openxmlformats.org/officeDocument/2006/relationships" xmlns:p="http://schemas.openxmlformats.org/presentationml/2006/main">
+  <p:cSld>
+    <p:spTree>
+      <p:nvGrpSpPr>
+        <p:cNvPr id="1" name=""/>
+        <p:cNvGrpSpPr/>
+        <p:nvPr/>
+      </p:nvGrpSpPr>
+      <p:grpSpPr>
+        <a:xfrm>
+          <a:off x="0" y="0"/>
+          <a:ext cx="0" cy="0"/>
+          <a:chOff x="0" y="0"/>
+          <a:chExt cx="0" cy="0"/>
+        </a:xfrm>
+      </p:grpSpPr>
+      <p:sp>
+        <p:nvSpPr>
+          <p:cNvPr id="2" name="Text Placeholder 1">
+            <a:extLst>
+              <a:ext uri="{FF2B5EF4-FFF2-40B4-BE49-F238E27FC236}">
+                <a16:creationId xmlns:a16="http://schemas.microsoft.com/office/drawing/2014/main" id="{25FDF4C8-E49A-DE47-B97C-B177D685F222}"/>
+              </a:ext>
+            </a:extLst>
+          </p:cNvPr>
+          <p:cNvSpPr>
+            <a:spLocks noGrp="1"/>
+          </p:cNvSpPr>
+          <p:nvPr>
+            <p:ph type="body" sz="quarter" idx="10"/>
+          </p:nvPr>
+        </p:nvSpPr>
+        <p:spPr>
+          <a:xfrm>
+            <a:off x="838200" y="1876483"/>
+            <a:ext cx="10515600" cy="1419876"/>
+          </a:xfrm>
+        </p:spPr>
+        <p:txBody>
+          <a:bodyPr/>
+          <a:lstStyle/>
+          <a:p>
+            <a:r>
+              <a:rPr lang="en-US" dirty="0"/>
+              <a:t>Intro to Pathway Modeling </a:t>
+            </a:r>
+          </a:p>
+          <a:p>
+            <a:endParaRPr lang="en-US" dirty="0"/>
+          </a:p>
+          <a:p>
+            <a:r>
+              <a:rPr lang="en-US" dirty="0"/>
+              <a:t>Whole Genome </a:t>
+            </a:r>
+            <a:r>
+              <a:rPr lang="en-US"/>
+              <a:t>Sequence Analysis</a:t>
+            </a:r>
+            <a:endParaRPr lang="en-US" dirty="0"/>
+          </a:p>
+        </p:txBody>
+      </p:sp>
+      <p:sp>
+        <p:nvSpPr>
+          <p:cNvPr id="3" name="Title 2">
+            <a:extLst>
+              <a:ext uri="{FF2B5EF4-FFF2-40B4-BE49-F238E27FC236}">
+                <a16:creationId xmlns:a16="http://schemas.microsoft.com/office/drawing/2014/main" id="{F67A359E-0CC3-8F43-A978-4168A27EC42B}"/>
+              </a:ext>
+            </a:extLst>
+          </p:cNvPr>
+          <p:cNvSpPr>
+            <a:spLocks noGrp="1"/>
+          </p:cNvSpPr>
+          <p:nvPr>
+            <p:ph type="title"/>
+          </p:nvPr>
+        </p:nvSpPr>
+        <p:spPr/>
+        <p:txBody>
+          <a:bodyPr/>
+          <a:lstStyle/>
+          <a:p>
+            <a:r>
+              <a:rPr lang="en-US" dirty="0"/>
+              <a:t>Upcoming workshops</a:t>
+            </a:r>
+          </a:p>
+        </p:txBody>
+      </p:sp>
+    </p:spTree>
+    <p:extLst>
+      <p:ext uri="{BB962C8B-B14F-4D97-AF65-F5344CB8AC3E}">
+        <p14:creationId xmlns:p14="http://schemas.microsoft.com/office/powerpoint/2010/main" val="955015603"/>
+      </p:ext>
+    </p:extLst>
+  </p:cSld>
+  <p:clrMapOvr>
+    <a:masterClrMapping/>
+  </p:clrMapOvr>
+</p:sld>
+</file>
+
+<file path=ppt/slides/slide23.xml><?xml version="1.0" encoding="utf-8"?>
+<p:sld xmlns:a="http://schemas.openxmlformats.org/drawingml/2006/main" xmlns:r="http://schemas.openxmlformats.org/officeDocument/2006/relationships" xmlns:p="http://schemas.openxmlformats.org/presentationml/2006/main">
+  <p:cSld>
+    <p:spTree>
+      <p:nvGrpSpPr>
+        <p:cNvPr id="1" name=""/>
+        <p:cNvGrpSpPr/>
+        <p:nvPr/>
+      </p:nvGrpSpPr>
+      <p:grpSpPr>
+        <a:xfrm>
+          <a:off x="0" y="0"/>
+          <a:ext cx="0" cy="0"/>
+          <a:chOff x="0" y="0"/>
+          <a:chExt cx="0" cy="0"/>
+        </a:xfrm>
+      </p:grpSpPr>
+      <p:sp>
+        <p:nvSpPr>
+          <p:cNvPr id="6" name="Text Placeholder 5">
+            <a:extLst>
+              <a:ext uri="{FF2B5EF4-FFF2-40B4-BE49-F238E27FC236}">
+                <a16:creationId xmlns:a16="http://schemas.microsoft.com/office/drawing/2014/main" id="{02741519-BE24-CD46-917C-973842317CBC}"/>
+              </a:ext>
+            </a:extLst>
+          </p:cNvPr>
+          <p:cNvSpPr>
+            <a:spLocks noGrp="1"/>
+          </p:cNvSpPr>
+          <p:nvPr>
+            <p:ph type="body" sz="quarter" idx="10"/>
+          </p:nvPr>
+        </p:nvSpPr>
+        <p:spPr>
+          <a:xfrm>
+            <a:off x="838200" y="1876483"/>
+            <a:ext cx="10515600" cy="1419876"/>
+          </a:xfrm>
+        </p:spPr>
+        <p:txBody>
+          <a:bodyPr/>
+          <a:lstStyle/>
+          <a:p>
+            <a:r>
+              <a:rPr lang="en-US" dirty="0">
+                <a:hlinkClick r:id="rId2"/>
+              </a:rPr>
+              <a:t>https://bioinformatics-course-feedback.questionpro.com/</a:t>
+            </a:r>
+            <a:endParaRPr lang="en-US" dirty="0"/>
+          </a:p>
+          <a:p>
+            <a:endParaRPr lang="en-US" dirty="0"/>
+          </a:p>
+          <a:p>
+            <a:r>
+              <a:rPr lang="en-US"/>
+              <a:t>~3 </a:t>
+            </a:r>
+            <a:r>
+              <a:rPr lang="en-US" dirty="0"/>
+              <a:t>min.</a:t>
+            </a:r>
+          </a:p>
+        </p:txBody>
+      </p:sp>
+      <p:sp>
+        <p:nvSpPr>
+          <p:cNvPr id="5" name="Title 4">
+            <a:extLst>
+              <a:ext uri="{FF2B5EF4-FFF2-40B4-BE49-F238E27FC236}">
+                <a16:creationId xmlns:a16="http://schemas.microsoft.com/office/drawing/2014/main" id="{EA243F3D-84FD-1B47-961E-CAF8E18955BD}"/>
+              </a:ext>
+            </a:extLst>
+          </p:cNvPr>
+          <p:cNvSpPr>
+            <a:spLocks noGrp="1"/>
+          </p:cNvSpPr>
+          <p:nvPr>
+            <p:ph type="title"/>
+          </p:nvPr>
+        </p:nvSpPr>
+        <p:spPr/>
+        <p:txBody>
+          <a:bodyPr/>
+          <a:lstStyle/>
+          <a:p>
+            <a:r>
+              <a:rPr lang="en-US" dirty="0"/>
+              <a:t>Your feedback is important to us!</a:t>
+            </a:r>
+          </a:p>
+        </p:txBody>
+      </p:sp>
+    </p:spTree>
+    <p:extLst>
+      <p:ext uri="{BB962C8B-B14F-4D97-AF65-F5344CB8AC3E}">
+        <p14:creationId xmlns:p14="http://schemas.microsoft.com/office/powerpoint/2010/main" val="856610576"/>
+      </p:ext>
+    </p:extLst>
+  </p:cSld>
+  <p:clrMapOvr>
+    <a:masterClrMapping/>
+  </p:clrMapOvr>
+</p:sld>
+</file>
+
+<file path=ppt/slides/slide24.xml><?xml version="1.0" encoding="utf-8"?>
+<p:sld xmlns:a="http://schemas.openxmlformats.org/drawingml/2006/main" xmlns:r="http://schemas.openxmlformats.org/officeDocument/2006/relationships" xmlns:p="http://schemas.openxmlformats.org/presentationml/2006/main">
+  <p:cSld>
+    <p:spTree>
+      <p:nvGrpSpPr>
+        <p:cNvPr id="1" name=""/>
+        <p:cNvGrpSpPr/>
+        <p:nvPr/>
+      </p:nvGrpSpPr>
+      <p:grpSpPr>
+        <a:xfrm>
+          <a:off x="0" y="0"/>
+          <a:ext cx="0" cy="0"/>
+          <a:chOff x="0" y="0"/>
+          <a:chExt cx="0" cy="0"/>
+        </a:xfrm>
+      </p:grpSpPr>
+      <p:sp>
+        <p:nvSpPr>
+          <p:cNvPr id="7" name="TextBox 6">
+            <a:extLst>
+              <a:ext uri="{FF2B5EF4-FFF2-40B4-BE49-F238E27FC236}">
+                <a16:creationId xmlns:a16="http://schemas.microsoft.com/office/drawing/2014/main" id="{E91B6B1A-4123-924B-B2D9-B4EDDF2A060B}"/>
+              </a:ext>
+            </a:extLst>
+          </p:cNvPr>
+          <p:cNvSpPr txBox="1"/>
+          <p:nvPr/>
+        </p:nvSpPr>
+        <p:spPr>
+          <a:xfrm>
+            <a:off x="4752109" y="2604655"/>
+            <a:ext cx="5001491" cy="769441"/>
+          </a:xfrm>
+          <a:prstGeom prst="rect">
+            <a:avLst/>
+          </a:prstGeom>
+          <a:noFill/>
+        </p:spPr>
+        <p:txBody>
+          <a:bodyPr wrap="square" rtlCol="0">
+            <a:spAutoFit/>
+          </a:bodyPr>
+          <a:lstStyle/>
+          <a:p>
+            <a:r>
+              <a:rPr lang="en-US" sz="4400" dirty="0"/>
+              <a:t>Thank you.</a:t>
+            </a:r>
+          </a:p>
+        </p:txBody>
+      </p:sp>
+    </p:spTree>
+    <p:extLst>
+      <p:ext uri="{BB962C8B-B14F-4D97-AF65-F5344CB8AC3E}">
+        <p14:creationId xmlns:p14="http://schemas.microsoft.com/office/powerpoint/2010/main" val="23816048"/>
       </p:ext>
     </p:extLst>
   </p:cSld>
@@ -12773,160 +13629,6 @@
           <a:chExt cx="0" cy="0"/>
         </a:xfrm>
       </p:grpSpPr>
-      <p:sp>
-        <p:nvSpPr>
-          <p:cNvPr id="6" name="Text Placeholder 5">
-            <a:extLst>
-              <a:ext uri="{FF2B5EF4-FFF2-40B4-BE49-F238E27FC236}">
-                <a16:creationId xmlns:a16="http://schemas.microsoft.com/office/drawing/2014/main" id="{E26ED6B3-21C3-F947-8FA6-886342F3C4F3}"/>
-              </a:ext>
-            </a:extLst>
-          </p:cNvPr>
-          <p:cNvSpPr>
-            <a:spLocks noGrp="1"/>
-          </p:cNvSpPr>
-          <p:nvPr>
-            <p:ph type="body" sz="quarter" idx="10"/>
-          </p:nvPr>
-        </p:nvSpPr>
-        <p:spPr>
-          <a:xfrm>
-            <a:off x="838200" y="1876483"/>
-            <a:ext cx="10515600" cy="5032147"/>
-          </a:xfrm>
-        </p:spPr>
-        <p:txBody>
-          <a:bodyPr/>
-          <a:lstStyle/>
-          <a:p>
-            <a:r>
-              <a:rPr lang="en-US" dirty="0"/>
-              <a:t>Load and reformat the data</a:t>
-            </a:r>
-          </a:p>
-          <a:p>
-            <a:r>
-              <a:rPr lang="en-US" dirty="0"/>
-              <a:t>Exploratory visualization : MA plot</a:t>
-            </a:r>
-          </a:p>
-          <a:p>
-            <a:r>
-              <a:rPr lang="en-US" dirty="0"/>
-              <a:t>Create </a:t>
-            </a:r>
-            <a:r>
-              <a:rPr lang="en-US" dirty="0" err="1"/>
-              <a:t>DGElist</a:t>
-            </a:r>
-            <a:r>
-              <a:rPr lang="en-US" dirty="0"/>
-              <a:t> object and retrieve gene symbols</a:t>
-            </a:r>
-          </a:p>
-          <a:p>
-            <a:r>
-              <a:rPr lang="en-US" dirty="0"/>
-              <a:t>Filter genes with inadequate information</a:t>
-            </a:r>
-          </a:p>
-          <a:p>
-            <a:r>
-              <a:rPr lang="en-US" dirty="0"/>
-              <a:t>Normalize counts : </a:t>
-            </a:r>
-            <a:r>
-              <a:rPr lang="en-US" i="1" dirty="0"/>
-              <a:t>What’s under the hood?</a:t>
-            </a:r>
-          </a:p>
-          <a:p>
-            <a:r>
-              <a:rPr lang="en-US" dirty="0"/>
-              <a:t>Exploratory visualization : MDS and PCA plots</a:t>
-            </a:r>
-          </a:p>
-          <a:p>
-            <a:r>
-              <a:rPr lang="en-US" dirty="0"/>
-              <a:t>Define and fit a model</a:t>
-            </a:r>
-          </a:p>
-          <a:p>
-            <a:r>
-              <a:rPr lang="en-US" dirty="0"/>
-              <a:t>Hypothesis testing (four example hypotheses)</a:t>
-            </a:r>
-          </a:p>
-          <a:p>
-            <a:r>
-              <a:rPr lang="en-US" dirty="0"/>
-              <a:t>Save results as a table and explore in Excel</a:t>
-            </a:r>
-          </a:p>
-          <a:p>
-            <a:endParaRPr lang="en-US" dirty="0"/>
-          </a:p>
-        </p:txBody>
-      </p:sp>
-      <p:sp>
-        <p:nvSpPr>
-          <p:cNvPr id="5" name="Title 4">
-            <a:extLst>
-              <a:ext uri="{FF2B5EF4-FFF2-40B4-BE49-F238E27FC236}">
-                <a16:creationId xmlns:a16="http://schemas.microsoft.com/office/drawing/2014/main" id="{0C2E8E30-DCF0-5E45-942E-5016C9EDD1F7}"/>
-              </a:ext>
-            </a:extLst>
-          </p:cNvPr>
-          <p:cNvSpPr>
-            <a:spLocks noGrp="1"/>
-          </p:cNvSpPr>
-          <p:nvPr>
-            <p:ph type="title"/>
-          </p:nvPr>
-        </p:nvSpPr>
-        <p:spPr/>
-        <p:txBody>
-          <a:bodyPr/>
-          <a:lstStyle/>
-          <a:p>
-            <a:r>
-              <a:rPr lang="en-US" dirty="0"/>
-              <a:t>Outline</a:t>
-            </a:r>
-          </a:p>
-        </p:txBody>
-      </p:sp>
-    </p:spTree>
-    <p:extLst>
-      <p:ext uri="{BB962C8B-B14F-4D97-AF65-F5344CB8AC3E}">
-        <p14:creationId xmlns:p14="http://schemas.microsoft.com/office/powerpoint/2010/main" val="3392382980"/>
-      </p:ext>
-    </p:extLst>
-  </p:cSld>
-  <p:clrMapOvr>
-    <a:masterClrMapping/>
-  </p:clrMapOvr>
-</p:sld>
-</file>
-
-<file path=ppt/slides/slide7.xml><?xml version="1.0" encoding="utf-8"?>
-<p:sld xmlns:a="http://schemas.openxmlformats.org/drawingml/2006/main" xmlns:r="http://schemas.openxmlformats.org/officeDocument/2006/relationships" xmlns:p="http://schemas.openxmlformats.org/presentationml/2006/main">
-  <p:cSld>
-    <p:spTree>
-      <p:nvGrpSpPr>
-        <p:cNvPr id="1" name=""/>
-        <p:cNvGrpSpPr/>
-        <p:nvPr/>
-      </p:nvGrpSpPr>
-      <p:grpSpPr>
-        <a:xfrm>
-          <a:off x="0" y="0"/>
-          <a:ext cx="0" cy="0"/>
-          <a:chOff x="0" y="0"/>
-          <a:chExt cx="0" cy="0"/>
-        </a:xfrm>
-      </p:grpSpPr>
       <p:pic>
         <p:nvPicPr>
           <p:cNvPr id="5" name="Picture 4">
@@ -12989,6 +13691,160 @@
     <p:extLst>
       <p:ext uri="{BB962C8B-B14F-4D97-AF65-F5344CB8AC3E}">
         <p14:creationId xmlns:p14="http://schemas.microsoft.com/office/powerpoint/2010/main" val="743567310"/>
+      </p:ext>
+    </p:extLst>
+  </p:cSld>
+  <p:clrMapOvr>
+    <a:masterClrMapping/>
+  </p:clrMapOvr>
+</p:sld>
+</file>
+
+<file path=ppt/slides/slide7.xml><?xml version="1.0" encoding="utf-8"?>
+<p:sld xmlns:a="http://schemas.openxmlformats.org/drawingml/2006/main" xmlns:r="http://schemas.openxmlformats.org/officeDocument/2006/relationships" xmlns:p="http://schemas.openxmlformats.org/presentationml/2006/main">
+  <p:cSld>
+    <p:spTree>
+      <p:nvGrpSpPr>
+        <p:cNvPr id="1" name=""/>
+        <p:cNvGrpSpPr/>
+        <p:nvPr/>
+      </p:nvGrpSpPr>
+      <p:grpSpPr>
+        <a:xfrm>
+          <a:off x="0" y="0"/>
+          <a:ext cx="0" cy="0"/>
+          <a:chOff x="0" y="0"/>
+          <a:chExt cx="0" cy="0"/>
+        </a:xfrm>
+      </p:grpSpPr>
+      <p:sp>
+        <p:nvSpPr>
+          <p:cNvPr id="6" name="Text Placeholder 5">
+            <a:extLst>
+              <a:ext uri="{FF2B5EF4-FFF2-40B4-BE49-F238E27FC236}">
+                <a16:creationId xmlns:a16="http://schemas.microsoft.com/office/drawing/2014/main" id="{E26ED6B3-21C3-F947-8FA6-886342F3C4F3}"/>
+              </a:ext>
+            </a:extLst>
+          </p:cNvPr>
+          <p:cNvSpPr>
+            <a:spLocks noGrp="1"/>
+          </p:cNvSpPr>
+          <p:nvPr>
+            <p:ph type="body" sz="quarter" idx="10"/>
+          </p:nvPr>
+        </p:nvSpPr>
+        <p:spPr>
+          <a:xfrm>
+            <a:off x="838200" y="1876483"/>
+            <a:ext cx="10515600" cy="5032147"/>
+          </a:xfrm>
+        </p:spPr>
+        <p:txBody>
+          <a:bodyPr/>
+          <a:lstStyle/>
+          <a:p>
+            <a:r>
+              <a:rPr lang="en-US" dirty="0"/>
+              <a:t>Load and reformat the data</a:t>
+            </a:r>
+          </a:p>
+          <a:p>
+            <a:r>
+              <a:rPr lang="en-US" dirty="0"/>
+              <a:t>Exploratory visualization : MA plot</a:t>
+            </a:r>
+          </a:p>
+          <a:p>
+            <a:r>
+              <a:rPr lang="en-US" dirty="0"/>
+              <a:t>Create </a:t>
+            </a:r>
+            <a:r>
+              <a:rPr lang="en-US" dirty="0" err="1"/>
+              <a:t>DGElist</a:t>
+            </a:r>
+            <a:r>
+              <a:rPr lang="en-US" dirty="0"/>
+              <a:t> object and retrieve gene symbols</a:t>
+            </a:r>
+          </a:p>
+          <a:p>
+            <a:r>
+              <a:rPr lang="en-US" dirty="0"/>
+              <a:t>Filter genes with inadequate information</a:t>
+            </a:r>
+          </a:p>
+          <a:p>
+            <a:r>
+              <a:rPr lang="en-US" dirty="0"/>
+              <a:t>Normalize counts : </a:t>
+            </a:r>
+            <a:r>
+              <a:rPr lang="en-US" i="1" dirty="0"/>
+              <a:t>What’s under the hood?</a:t>
+            </a:r>
+          </a:p>
+          <a:p>
+            <a:r>
+              <a:rPr lang="en-US" dirty="0"/>
+              <a:t>Exploratory visualization : MDS and PCA plots</a:t>
+            </a:r>
+          </a:p>
+          <a:p>
+            <a:r>
+              <a:rPr lang="en-US" dirty="0"/>
+              <a:t>Define and fit a model</a:t>
+            </a:r>
+          </a:p>
+          <a:p>
+            <a:r>
+              <a:rPr lang="en-US" dirty="0"/>
+              <a:t>Hypothesis testing (four example hypotheses)</a:t>
+            </a:r>
+          </a:p>
+          <a:p>
+            <a:r>
+              <a:rPr lang="en-US" dirty="0"/>
+              <a:t>Save results as a table and explore in Excel</a:t>
+            </a:r>
+          </a:p>
+          <a:p>
+            <a:endParaRPr lang="en-US" dirty="0"/>
+          </a:p>
+        </p:txBody>
+      </p:sp>
+      <p:sp>
+        <p:nvSpPr>
+          <p:cNvPr id="5" name="Title 4">
+            <a:extLst>
+              <a:ext uri="{FF2B5EF4-FFF2-40B4-BE49-F238E27FC236}">
+                <a16:creationId xmlns:a16="http://schemas.microsoft.com/office/drawing/2014/main" id="{0C2E8E30-DCF0-5E45-942E-5016C9EDD1F7}"/>
+              </a:ext>
+            </a:extLst>
+          </p:cNvPr>
+          <p:cNvSpPr>
+            <a:spLocks noGrp="1"/>
+          </p:cNvSpPr>
+          <p:nvPr>
+            <p:ph type="title"/>
+          </p:nvPr>
+        </p:nvSpPr>
+        <p:spPr/>
+        <p:txBody>
+          <a:bodyPr/>
+          <a:lstStyle/>
+          <a:p>
+            <a:r>
+              <a:rPr lang="en-US" dirty="0"/>
+              <a:t>Outline</a:t>
+            </a:r>
+          </a:p>
+        </p:txBody>
+      </p:sp>
+    </p:spTree>
+    <p:extLst>
+      <p:ext uri="{BB962C8B-B14F-4D97-AF65-F5344CB8AC3E}">
+        <p14:creationId xmlns:p14="http://schemas.microsoft.com/office/powerpoint/2010/main" val="3392382980"/>
       </p:ext>
     </p:extLst>
   </p:cSld>

</xml_diff>